<commit_message>
share new SDK EULA schematic
thanks to vrousseau design review
</commit_message>
<xml_diff>
--- a/SDKUserGuide/images/sdk_eula_content.pptx
+++ b/SDKUserGuide/images/sdk_eula_content.pptx
@@ -5,13 +5,17 @@
     <p:sldMasterId id="2147483660" r:id="rId1"/>
   </p:sldMasterIdLst>
   <p:notesMasterIdLst>
-    <p:notesMasterId r:id="rId3"/>
+    <p:notesMasterId r:id="rId7"/>
   </p:notesMasterIdLst>
   <p:handoutMasterIdLst>
-    <p:handoutMasterId r:id="rId4"/>
+    <p:handoutMasterId r:id="rId8"/>
   </p:handoutMasterIdLst>
   <p:sldIdLst>
-    <p:sldId id="278" r:id="rId2"/>
+    <p:sldId id="280" r:id="rId2"/>
+    <p:sldId id="283" r:id="rId3"/>
+    <p:sldId id="278" r:id="rId4"/>
+    <p:sldId id="282" r:id="rId5"/>
+    <p:sldId id="281" r:id="rId6"/>
   </p:sldIdLst>
   <p:sldSz cx="12192000" cy="6858000"/>
   <p:notesSz cx="6858000" cy="9144000"/>
@@ -472,38 +476,37 @@
           <a:p>
             <a:pPr lvl="0"/>
             <a:r>
-              <a:rPr lang="en-US" dirty="0" smtClean="0"/>
+              <a:rPr lang="en-US" dirty="0"/>
               <a:t>Click to edit Master text styles</a:t>
             </a:r>
           </a:p>
           <a:p>
             <a:pPr lvl="1"/>
             <a:r>
-              <a:rPr lang="en-US" dirty="0" smtClean="0"/>
+              <a:rPr lang="en-US" dirty="0"/>
               <a:t>Second level</a:t>
             </a:r>
           </a:p>
           <a:p>
             <a:pPr lvl="2"/>
             <a:r>
-              <a:rPr lang="en-US" dirty="0" smtClean="0"/>
+              <a:rPr lang="en-US" dirty="0"/>
               <a:t>Third level</a:t>
             </a:r>
           </a:p>
           <a:p>
             <a:pPr lvl="3"/>
             <a:r>
-              <a:rPr lang="en-US" dirty="0" smtClean="0"/>
+              <a:rPr lang="en-US" dirty="0"/>
               <a:t>Fourth level</a:t>
             </a:r>
           </a:p>
           <a:p>
             <a:pPr lvl="4"/>
             <a:r>
-              <a:rPr lang="en-US" dirty="0" smtClean="0"/>
+              <a:rPr lang="en-US" dirty="0"/>
               <a:t>Fifth level</a:t>
             </a:r>
-            <a:endParaRPr lang="en-US" dirty="0"/>
           </a:p>
         </p:txBody>
       </p:sp>
@@ -731,7 +734,7 @@
           </a:lstStyle>
           <a:p>
             <a:r>
-              <a:rPr lang="en-US" smtClean="0"/>
+              <a:rPr lang="en-US"/>
               <a:t>Click to edit Master title style</a:t>
             </a:r>
             <a:endParaRPr lang="en-US" dirty="0"/>
@@ -851,7 +854,7 @@
           </a:lstStyle>
           <a:p>
             <a:r>
-              <a:rPr lang="en-US" smtClean="0"/>
+              <a:rPr lang="en-US"/>
               <a:t>Click to edit Master subtitle style</a:t>
             </a:r>
             <a:endParaRPr lang="en-US" dirty="0"/>
@@ -881,7 +884,7 @@
           <a:p>
             <a:pPr algn="ctr"/>
             <a:r>
-              <a:rPr lang="en-US" sz="1200" b="0" i="0" dirty="0" smtClean="0">
+              <a:rPr lang="en-US" sz="1200" b="0" i="0" dirty="0">
                 <a:solidFill>
                   <a:schemeClr val="tx2"/>
                 </a:solidFill>
@@ -934,13 +937,6 @@
   <p:clrMapOvr>
     <a:masterClrMapping/>
   </p:clrMapOvr>
-  <p:timing>
-    <p:tnLst>
-      <p:par>
-        <p:cTn id="1" dur="indefinite" restart="never" nodeType="tmRoot"/>
-      </p:par>
-    </p:tnLst>
-  </p:timing>
 </p:sldLayout>
 </file>
 
@@ -1018,35 +1014,35 @@
           <a:p>
             <a:pPr lvl="0"/>
             <a:r>
-              <a:rPr lang="en-US" smtClean="0"/>
+              <a:rPr lang="en-US"/>
               <a:t>Click to edit Master text styles</a:t>
             </a:r>
           </a:p>
           <a:p>
             <a:pPr lvl="1"/>
             <a:r>
-              <a:rPr lang="en-US" smtClean="0"/>
+              <a:rPr lang="en-US"/>
               <a:t>Second level</a:t>
             </a:r>
           </a:p>
           <a:p>
             <a:pPr lvl="2"/>
             <a:r>
-              <a:rPr lang="en-US" smtClean="0"/>
+              <a:rPr lang="en-US"/>
               <a:t>Third level</a:t>
             </a:r>
           </a:p>
           <a:p>
             <a:pPr lvl="3"/>
             <a:r>
-              <a:rPr lang="en-US" smtClean="0"/>
+              <a:rPr lang="en-US"/>
               <a:t>Fourth level</a:t>
             </a:r>
           </a:p>
           <a:p>
             <a:pPr lvl="4"/>
             <a:r>
-              <a:rPr lang="en-US" smtClean="0"/>
+              <a:rPr lang="en-US"/>
               <a:t>Fifth level</a:t>
             </a:r>
             <a:endParaRPr lang="en-US" dirty="0"/>
@@ -1114,7 +1110,7 @@
           <a:p>
             <a:pPr lvl="0"/>
             <a:r>
-              <a:rPr lang="en-US" smtClean="0"/>
+              <a:rPr lang="en-US"/>
               <a:t>Click to edit Master text styles</a:t>
             </a:r>
           </a:p>
@@ -1147,7 +1143,7 @@
           </a:lstStyle>
           <a:p>
             <a:r>
-              <a:rPr lang="en-US" smtClean="0"/>
+              <a:rPr lang="en-US"/>
               <a:t>Click to edit Master title style</a:t>
             </a:r>
             <a:endParaRPr lang="fr-FR" dirty="0"/>
@@ -1252,13 +1248,6 @@
   <p:clrMapOvr>
     <a:masterClrMapping/>
   </p:clrMapOvr>
-  <p:timing>
-    <p:tnLst>
-      <p:par>
-        <p:cTn id="1" dur="indefinite" restart="never" nodeType="tmRoot"/>
-      </p:par>
-    </p:tnLst>
-  </p:timing>
 </p:sldLayout>
 </file>
 
@@ -1304,7 +1293,7 @@
           </a:lstStyle>
           <a:p>
             <a:r>
-              <a:rPr lang="en-US" smtClean="0"/>
+              <a:rPr lang="en-US"/>
               <a:t>Click to edit Master title style</a:t>
             </a:r>
             <a:endParaRPr lang="fr-FR" dirty="0"/>
@@ -1379,7 +1368,7 @@
           <a:lstStyle/>
           <a:p>
             <a:r>
-              <a:rPr lang="en-US" smtClean="0"/>
+              <a:rPr lang="en-US"/>
               <a:t>Drag picture to placeholder or click icon to add</a:t>
             </a:r>
             <a:endParaRPr lang="fr-FR" dirty="0"/>
@@ -1437,13 +1426,6 @@
   <p:clrMapOvr>
     <a:masterClrMapping/>
   </p:clrMapOvr>
-  <p:timing>
-    <p:tnLst>
-      <p:par>
-        <p:cTn id="1" dur="indefinite" restart="never" nodeType="tmRoot"/>
-      </p:par>
-    </p:tnLst>
-  </p:timing>
 </p:sldLayout>
 </file>
 
@@ -1532,7 +1514,7 @@
           <a:lstStyle/>
           <a:p>
             <a:r>
-              <a:rPr lang="en-US" smtClean="0"/>
+              <a:rPr lang="en-US"/>
               <a:t>Drag picture to placeholder or click icon to add</a:t>
             </a:r>
             <a:endParaRPr lang="fr-FR" dirty="0"/>
@@ -1590,13 +1572,6 @@
   <p:clrMapOvr>
     <a:masterClrMapping/>
   </p:clrMapOvr>
-  <p:timing>
-    <p:tnLst>
-      <p:par>
-        <p:cTn id="1" dur="indefinite" restart="never" nodeType="tmRoot"/>
-      </p:par>
-    </p:tnLst>
-  </p:timing>
 </p:sldLayout>
 </file>
 
@@ -1758,20 +1733,17 @@
           </a:lstStyle>
           <a:p>
             <a:r>
-              <a:rPr lang="en-US" sz="6600" dirty="0" smtClean="0"/>
+              <a:rPr lang="en-US" sz="6600" dirty="0"/>
               <a:t>THANK YOU </a:t>
             </a:r>
           </a:p>
           <a:p>
             <a:r>
-              <a:rPr lang="en-US" sz="2800" dirty="0" smtClean="0">
+              <a:rPr lang="en-US" sz="2800" dirty="0">
                 <a:latin typeface="+mn-lt"/>
               </a:rPr>
               <a:t>FOR YOUR ATTENTION!</a:t>
             </a:r>
-            <a:endParaRPr lang="en-US" sz="2800" dirty="0">
-              <a:latin typeface="+mn-lt"/>
-            </a:endParaRPr>
           </a:p>
         </p:txBody>
       </p:sp>
@@ -1815,6 +1787,128 @@
   <p:clrMapOvr>
     <a:masterClrMapping/>
   </p:clrMapOvr>
+</p:sldLayout>
+</file>
+
+<file path=ppt/slideLayouts/slideLayout14.xml><?xml version="1.0" encoding="utf-8"?>
+<p:sldLayout xmlns:a="http://schemas.openxmlformats.org/drawingml/2006/main" xmlns:r="http://schemas.openxmlformats.org/officeDocument/2006/relationships" xmlns:p="http://schemas.openxmlformats.org/presentationml/2006/main">
+  <p:cSld name="Blank">
+    <p:spTree>
+      <p:nvGrpSpPr>
+        <p:cNvPr id="1" name=""/>
+        <p:cNvGrpSpPr/>
+        <p:nvPr/>
+      </p:nvGrpSpPr>
+      <p:grpSpPr>
+        <a:xfrm>
+          <a:off x="0" y="0"/>
+          <a:ext cx="0" cy="0"/>
+          <a:chOff x="0" y="0"/>
+          <a:chExt cx="0" cy="0"/>
+        </a:xfrm>
+      </p:grpSpPr>
+      <p:sp>
+        <p:nvSpPr>
+          <p:cNvPr id="2" name="Date Placeholder 10"/>
+          <p:cNvSpPr>
+            <a:spLocks noGrp="1"/>
+          </p:cNvSpPr>
+          <p:nvPr>
+            <p:ph type="dt" sz="half" idx="10"/>
+          </p:nvPr>
+        </p:nvSpPr>
+        <p:spPr>
+          <a:xfrm>
+            <a:off x="10032628" y="6453337"/>
+            <a:ext cx="1296144" cy="144016"/>
+          </a:xfrm>
+          <a:prstGeom prst="rect">
+            <a:avLst/>
+          </a:prstGeom>
+        </p:spPr>
+        <p:txBody>
+          <a:bodyPr lIns="0" tIns="0" rIns="0" bIns="0"/>
+          <a:lstStyle>
+            <a:lvl1pPr algn="r">
+              <a:defRPr sz="800" b="1">
+                <a:solidFill>
+                  <a:schemeClr val="tx1">
+                    <a:lumMod val="60000"/>
+                    <a:lumOff val="40000"/>
+                  </a:schemeClr>
+                </a:solidFill>
+                <a:latin typeface="Source Sans Pro" charset="0"/>
+                <a:ea typeface="Source Sans Pro" charset="0"/>
+                <a:cs typeface="Source Sans Pro" charset="0"/>
+              </a:defRPr>
+            </a:lvl1pPr>
+          </a:lstStyle>
+          <a:p>
+            <a:fld id="{22DD8F49-BF83-0E4D-8954-2DA98C3220A2}" type="datetime6">
+              <a:rPr lang="fr-FR" smtClean="0"/>
+              <a:pPr/>
+              <a:t>avril 22</a:t>
+            </a:fld>
+            <a:endParaRPr lang="en-US" dirty="0"/>
+          </a:p>
+        </p:txBody>
+      </p:sp>
+      <p:sp>
+        <p:nvSpPr>
+          <p:cNvPr id="3" name="Footer Placeholder 5"/>
+          <p:cNvSpPr>
+            <a:spLocks noGrp="1"/>
+          </p:cNvSpPr>
+          <p:nvPr>
+            <p:ph type="ftr" sz="quarter" idx="11"/>
+          </p:nvPr>
+        </p:nvSpPr>
+        <p:spPr>
+          <a:xfrm>
+            <a:off x="548375" y="6453337"/>
+            <a:ext cx="5212080" cy="144016"/>
+          </a:xfrm>
+          <a:prstGeom prst="rect">
+            <a:avLst/>
+          </a:prstGeom>
+        </p:spPr>
+        <p:txBody>
+          <a:bodyPr lIns="0" tIns="0" rIns="0" bIns="0"/>
+          <a:lstStyle>
+            <a:lvl1pPr>
+              <a:defRPr sz="900" b="1" i="0">
+                <a:solidFill>
+                  <a:schemeClr val="tx1">
+                    <a:lumMod val="60000"/>
+                    <a:lumOff val="40000"/>
+                  </a:schemeClr>
+                </a:solidFill>
+                <a:latin typeface="Source Sans Pro" charset="0"/>
+                <a:ea typeface="Source Sans Pro" charset="0"/>
+                <a:cs typeface="Source Sans Pro" charset="0"/>
+              </a:defRPr>
+            </a:lvl1pPr>
+          </a:lstStyle>
+          <a:p>
+            <a:r>
+              <a:rPr lang="pt-BR"/>
+              <a:t>© MICROEJ 2021 - C O N F I D E N T I A L</a:t>
+            </a:r>
+            <a:endParaRPr lang="en-US" dirty="0"/>
+          </a:p>
+        </p:txBody>
+      </p:sp>
+    </p:spTree>
+    <p:extLst>
+      <p:ext uri="{BB962C8B-B14F-4D97-AF65-F5344CB8AC3E}">
+        <p14:creationId xmlns:p14="http://schemas.microsoft.com/office/powerpoint/2010/main" val="635793647"/>
+      </p:ext>
+    </p:extLst>
+  </p:cSld>
+  <p:clrMapOvr>
+    <a:masterClrMapping/>
+  </p:clrMapOvr>
+  <p:hf hdr="0" ftr="0"/>
 </p:sldLayout>
 </file>
 
@@ -1866,7 +1960,7 @@
           <a:p>
             <a:pPr algn="ctr"/>
             <a:r>
-              <a:rPr lang="en-US" sz="1200" b="0" i="0" dirty="0" smtClean="0">
+              <a:rPr lang="en-US" sz="1200" b="0" i="0" dirty="0">
                 <a:solidFill>
                   <a:schemeClr val="accent1">
                     <a:lumMod val="40000"/>
@@ -1946,7 +2040,7 @@
           </a:lstStyle>
           <a:p>
             <a:r>
-              <a:rPr lang="en-US" smtClean="0"/>
+              <a:rPr lang="en-US"/>
               <a:t>Click to edit Master title style</a:t>
             </a:r>
             <a:endParaRPr lang="en-US" dirty="0"/>
@@ -2071,7 +2165,7 @@
           </a:lstStyle>
           <a:p>
             <a:r>
-              <a:rPr lang="en-US" smtClean="0"/>
+              <a:rPr lang="en-US"/>
               <a:t>Click to edit Master subtitle style</a:t>
             </a:r>
             <a:endParaRPr lang="en-US" dirty="0"/>
@@ -2088,13 +2182,6 @@
   <p:clrMapOvr>
     <a:overrideClrMapping bg1="lt1" tx1="dk1" bg2="lt2" tx2="dk2" accent1="accent1" accent2="accent2" accent3="accent3" accent4="accent4" accent5="accent5" accent6="accent6" hlink="hlink" folHlink="folHlink"/>
   </p:clrMapOvr>
-  <p:timing>
-    <p:tnLst>
-      <p:par>
-        <p:cTn id="1" dur="indefinite" restart="never" nodeType="tmRoot"/>
-      </p:par>
-    </p:tnLst>
-  </p:timing>
 </p:sldLayout>
 </file>
 
@@ -2177,7 +2264,7 @@
           </a:lstStyle>
           <a:p>
             <a:r>
-              <a:rPr lang="en-US" smtClean="0"/>
+              <a:rPr lang="en-US"/>
               <a:t>Click to edit Master title style</a:t>
             </a:r>
             <a:endParaRPr lang="en-US" dirty="0"/>
@@ -2297,7 +2384,7 @@
           </a:lstStyle>
           <a:p>
             <a:r>
-              <a:rPr lang="en-US" smtClean="0"/>
+              <a:rPr lang="en-US"/>
               <a:t>Click to edit Master subtitle style</a:t>
             </a:r>
             <a:endParaRPr lang="en-US" dirty="0"/>
@@ -2327,7 +2414,7 @@
           <a:p>
             <a:pPr algn="ctr"/>
             <a:r>
-              <a:rPr lang="en-US" sz="1200" b="0" i="0" dirty="0" smtClean="0">
+              <a:rPr lang="en-US" sz="1200" b="0" i="0" dirty="0">
                 <a:solidFill>
                   <a:schemeClr val="tx2"/>
                 </a:solidFill>
@@ -2380,13 +2467,6 @@
   <p:clrMapOvr>
     <a:masterClrMapping/>
   </p:clrMapOvr>
-  <p:timing>
-    <p:tnLst>
-      <p:par>
-        <p:cTn id="1" dur="indefinite" restart="never" nodeType="tmRoot"/>
-      </p:par>
-    </p:tnLst>
-  </p:timing>
 </p:sldLayout>
 </file>
 
@@ -2446,10 +2526,9 @@
           </a:lstStyle>
           <a:p>
             <a:r>
-              <a:rPr lang="en-US" dirty="0" smtClean="0"/>
+              <a:rPr lang="en-US" dirty="0"/>
               <a:t>Click to edit Section title style</a:t>
             </a:r>
-            <a:endParaRPr lang="en-US" dirty="0"/>
           </a:p>
         </p:txBody>
       </p:sp>
@@ -2504,13 +2583,6 @@
   <p:clrMapOvr>
     <a:masterClrMapping/>
   </p:clrMapOvr>
-  <p:timing>
-    <p:tnLst>
-      <p:par>
-        <p:cTn id="1" dur="indefinite" restart="never" nodeType="tmRoot"/>
-      </p:par>
-    </p:tnLst>
-  </p:timing>
 </p:sldLayout>
 </file>
 
@@ -2570,35 +2642,35 @@
           <a:p>
             <a:pPr lvl="0"/>
             <a:r>
-              <a:rPr lang="fr-FR" dirty="0" smtClean="0"/>
+              <a:rPr lang="fr-FR" dirty="0"/>
               <a:t>Cliquez et modifiez le contenu</a:t>
             </a:r>
           </a:p>
           <a:p>
             <a:pPr lvl="1"/>
             <a:r>
-              <a:rPr lang="fr-FR" dirty="0" smtClean="0"/>
+              <a:rPr lang="fr-FR" dirty="0"/>
               <a:t>Deuxième niveau</a:t>
             </a:r>
           </a:p>
           <a:p>
             <a:pPr lvl="2"/>
             <a:r>
-              <a:rPr lang="fr-FR" dirty="0" smtClean="0"/>
+              <a:rPr lang="fr-FR" dirty="0"/>
               <a:t>Troisième niveau</a:t>
             </a:r>
           </a:p>
           <a:p>
             <a:pPr lvl="3"/>
             <a:r>
-              <a:rPr lang="fr-FR" dirty="0" smtClean="0"/>
+              <a:rPr lang="fr-FR" dirty="0"/>
               <a:t>Quatrième niveau</a:t>
             </a:r>
           </a:p>
           <a:p>
             <a:pPr lvl="4"/>
             <a:r>
-              <a:rPr lang="fr-FR" dirty="0" smtClean="0"/>
+              <a:rPr lang="fr-FR" dirty="0"/>
               <a:t>Cinquième niveau</a:t>
             </a:r>
             <a:endParaRPr lang="en-US" dirty="0"/>
@@ -2709,7 +2781,7 @@
           <a:lstStyle/>
           <a:p>
             <a:r>
-              <a:rPr lang="en-US" smtClean="0"/>
+              <a:rPr lang="en-US"/>
               <a:t>Click to edit Master title style</a:t>
             </a:r>
             <a:endParaRPr lang="fr-FR" dirty="0"/>
@@ -2726,13 +2798,6 @@
   <p:clrMapOvr>
     <a:masterClrMapping/>
   </p:clrMapOvr>
-  <p:timing>
-    <p:tnLst>
-      <p:par>
-        <p:cTn id="1" dur="indefinite" restart="never" nodeType="tmRoot"/>
-      </p:par>
-    </p:tnLst>
-  </p:timing>
 </p:sldLayout>
 </file>
 
@@ -2816,7 +2881,7 @@
           <a:lstStyle/>
           <a:p>
             <a:r>
-              <a:rPr lang="en-US" smtClean="0"/>
+              <a:rPr lang="en-US"/>
               <a:t>Click to edit Master title style</a:t>
             </a:r>
             <a:endParaRPr lang="fr-FR"/>
@@ -2873,35 +2938,35 @@
           <a:p>
             <a:pPr lvl="0"/>
             <a:r>
-              <a:rPr lang="fr-FR" dirty="0" smtClean="0"/>
+              <a:rPr lang="fr-FR" dirty="0"/>
               <a:t>Cliquez et modifiez le contenu</a:t>
             </a:r>
           </a:p>
           <a:p>
             <a:pPr lvl="1"/>
             <a:r>
-              <a:rPr lang="fr-FR" dirty="0" smtClean="0"/>
+              <a:rPr lang="fr-FR" dirty="0"/>
               <a:t>Deuxième niveau</a:t>
             </a:r>
           </a:p>
           <a:p>
             <a:pPr lvl="2"/>
             <a:r>
-              <a:rPr lang="fr-FR" dirty="0" smtClean="0"/>
+              <a:rPr lang="fr-FR" dirty="0"/>
               <a:t>Troisième niveau</a:t>
             </a:r>
           </a:p>
           <a:p>
             <a:pPr lvl="3"/>
             <a:r>
-              <a:rPr lang="fr-FR" dirty="0" smtClean="0"/>
+              <a:rPr lang="fr-FR" dirty="0"/>
               <a:t>Quatrième niveau</a:t>
             </a:r>
           </a:p>
           <a:p>
             <a:pPr lvl="4"/>
             <a:r>
-              <a:rPr lang="fr-FR" dirty="0" smtClean="0"/>
+              <a:rPr lang="fr-FR" dirty="0"/>
               <a:t>Cinquième niveau</a:t>
             </a:r>
             <a:endParaRPr lang="en-US" dirty="0"/>
@@ -2958,35 +3023,35 @@
           <a:p>
             <a:pPr lvl="0"/>
             <a:r>
-              <a:rPr lang="fr-FR" dirty="0" smtClean="0"/>
+              <a:rPr lang="fr-FR" dirty="0"/>
               <a:t>Cliquez et modifiez le contenu</a:t>
             </a:r>
           </a:p>
           <a:p>
             <a:pPr lvl="1"/>
             <a:r>
-              <a:rPr lang="fr-FR" dirty="0" smtClean="0"/>
+              <a:rPr lang="fr-FR" dirty="0"/>
               <a:t>Deuxième niveau</a:t>
             </a:r>
           </a:p>
           <a:p>
             <a:pPr lvl="2"/>
             <a:r>
-              <a:rPr lang="fr-FR" dirty="0" smtClean="0"/>
+              <a:rPr lang="fr-FR" dirty="0"/>
               <a:t>Troisième niveau</a:t>
             </a:r>
           </a:p>
           <a:p>
             <a:pPr lvl="3"/>
             <a:r>
-              <a:rPr lang="fr-FR" dirty="0" smtClean="0"/>
+              <a:rPr lang="fr-FR" dirty="0"/>
               <a:t>Quatrième niveau</a:t>
             </a:r>
           </a:p>
           <a:p>
             <a:pPr lvl="4"/>
             <a:r>
-              <a:rPr lang="fr-FR" dirty="0" smtClean="0"/>
+              <a:rPr lang="fr-FR" dirty="0"/>
               <a:t>Cinquième niveau</a:t>
             </a:r>
             <a:endParaRPr lang="en-US" dirty="0"/>
@@ -3044,13 +3109,6 @@
   <p:clrMapOvr>
     <a:masterClrMapping/>
   </p:clrMapOvr>
-  <p:timing>
-    <p:tnLst>
-      <p:par>
-        <p:cTn id="1" dur="indefinite" restart="never" nodeType="tmRoot"/>
-      </p:par>
-    </p:tnLst>
-  </p:timing>
 </p:sldLayout>
 </file>
 
@@ -3091,7 +3149,7 @@
           </a:lstStyle>
           <a:p>
             <a:r>
-              <a:rPr lang="en-US" smtClean="0"/>
+              <a:rPr lang="en-US"/>
               <a:t>Click to edit Master title style</a:t>
             </a:r>
             <a:endParaRPr lang="en-US" dirty="0"/>
@@ -3163,15 +3221,15 @@
           <a:p>
             <a:pPr lvl="0"/>
             <a:r>
-              <a:rPr lang="fr-FR" dirty="0" smtClean="0"/>
+              <a:rPr lang="fr-FR" dirty="0"/>
               <a:t>Cliquez ET </a:t>
             </a:r>
             <a:r>
-              <a:rPr lang="fr-FR" dirty="0" err="1" smtClean="0"/>
+              <a:rPr lang="fr-FR" dirty="0" err="1"/>
               <a:t>modifieZ</a:t>
             </a:r>
             <a:r>
-              <a:rPr lang="fr-FR" dirty="0" smtClean="0"/>
+              <a:rPr lang="fr-FR" dirty="0"/>
               <a:t> LE TITRE</a:t>
             </a:r>
           </a:p>
@@ -3227,35 +3285,35 @@
           <a:p>
             <a:pPr lvl="0"/>
             <a:r>
-              <a:rPr lang="fr-FR" dirty="0" smtClean="0"/>
+              <a:rPr lang="fr-FR" dirty="0"/>
               <a:t>Cliquez et modifiez le contenu</a:t>
             </a:r>
           </a:p>
           <a:p>
             <a:pPr lvl="1"/>
             <a:r>
-              <a:rPr lang="fr-FR" dirty="0" smtClean="0"/>
+              <a:rPr lang="fr-FR" dirty="0"/>
               <a:t>Deuxième niveau</a:t>
             </a:r>
           </a:p>
           <a:p>
             <a:pPr lvl="2"/>
             <a:r>
-              <a:rPr lang="fr-FR" dirty="0" smtClean="0"/>
+              <a:rPr lang="fr-FR" dirty="0"/>
               <a:t>Troisième niveau</a:t>
             </a:r>
           </a:p>
           <a:p>
             <a:pPr lvl="3"/>
             <a:r>
-              <a:rPr lang="fr-FR" dirty="0" smtClean="0"/>
+              <a:rPr lang="fr-FR" dirty="0"/>
               <a:t>Quatrième niveau</a:t>
             </a:r>
           </a:p>
           <a:p>
             <a:pPr lvl="4"/>
             <a:r>
-              <a:rPr lang="fr-FR" dirty="0" smtClean="0"/>
+              <a:rPr lang="fr-FR" dirty="0"/>
               <a:t>Cinquième niveau</a:t>
             </a:r>
             <a:endParaRPr lang="en-US" dirty="0"/>
@@ -3327,15 +3385,15 @@
           <a:p>
             <a:pPr lvl="0"/>
             <a:r>
-              <a:rPr lang="fr-FR" dirty="0" smtClean="0"/>
+              <a:rPr lang="fr-FR" dirty="0"/>
               <a:t>Cliquez ET </a:t>
             </a:r>
             <a:r>
-              <a:rPr lang="fr-FR" dirty="0" err="1" smtClean="0"/>
+              <a:rPr lang="fr-FR" dirty="0" err="1"/>
               <a:t>modifieZ</a:t>
             </a:r>
             <a:r>
-              <a:rPr lang="fr-FR" dirty="0" smtClean="0"/>
+              <a:rPr lang="fr-FR" dirty="0"/>
               <a:t> LE TITRE</a:t>
             </a:r>
           </a:p>
@@ -3391,35 +3449,35 @@
           <a:p>
             <a:pPr lvl="0"/>
             <a:r>
-              <a:rPr lang="fr-FR" dirty="0" smtClean="0"/>
+              <a:rPr lang="fr-FR" dirty="0"/>
               <a:t>Cliquez et modifiez le contenu</a:t>
             </a:r>
           </a:p>
           <a:p>
             <a:pPr lvl="1"/>
             <a:r>
-              <a:rPr lang="fr-FR" dirty="0" smtClean="0"/>
+              <a:rPr lang="fr-FR" dirty="0"/>
               <a:t>Deuxième niveau</a:t>
             </a:r>
           </a:p>
           <a:p>
             <a:pPr lvl="2"/>
             <a:r>
-              <a:rPr lang="fr-FR" dirty="0" smtClean="0"/>
+              <a:rPr lang="fr-FR" dirty="0"/>
               <a:t>Troisième niveau</a:t>
             </a:r>
           </a:p>
           <a:p>
             <a:pPr lvl="3"/>
             <a:r>
-              <a:rPr lang="fr-FR" dirty="0" smtClean="0"/>
+              <a:rPr lang="fr-FR" dirty="0"/>
               <a:t>Quatrième niveau</a:t>
             </a:r>
           </a:p>
           <a:p>
             <a:pPr lvl="4"/>
             <a:r>
-              <a:rPr lang="fr-FR" dirty="0" smtClean="0"/>
+              <a:rPr lang="fr-FR" dirty="0"/>
               <a:t>Cinquième niveau</a:t>
             </a:r>
             <a:endParaRPr lang="en-US" dirty="0"/>
@@ -3524,13 +3582,6 @@
   <p:clrMapOvr>
     <a:masterClrMapping/>
   </p:clrMapOvr>
-  <p:timing>
-    <p:tnLst>
-      <p:par>
-        <p:cTn id="1" dur="indefinite" restart="never" nodeType="tmRoot"/>
-      </p:par>
-    </p:tnLst>
-  </p:timing>
 </p:sldLayout>
 </file>
 
@@ -3567,7 +3618,7 @@
           <a:lstStyle/>
           <a:p>
             <a:r>
-              <a:rPr lang="en-US" smtClean="0"/>
+              <a:rPr lang="en-US"/>
               <a:t>Click to edit Master title style</a:t>
             </a:r>
             <a:endParaRPr lang="fr-FR" dirty="0"/>
@@ -3672,13 +3723,6 @@
   <p:clrMapOvr>
     <a:masterClrMapping/>
   </p:clrMapOvr>
-  <p:timing>
-    <p:tnLst>
-      <p:par>
-        <p:cTn id="1" dur="indefinite" restart="never" nodeType="tmRoot"/>
-      </p:par>
-    </p:tnLst>
-  </p:timing>
 </p:sldLayout>
 </file>
 
@@ -3709,13 +3753,6 @@
   <p:clrMapOvr>
     <a:masterClrMapping/>
   </p:clrMapOvr>
-  <p:timing>
-    <p:tnLst>
-      <p:par>
-        <p:cTn id="1" dur="indefinite" restart="never" nodeType="tmRoot"/>
-      </p:par>
-    </p:tnLst>
-  </p:timing>
 </p:sldLayout>
 </file>
 
@@ -3767,7 +3804,7 @@
           <a:lstStyle/>
           <a:p>
             <a:r>
-              <a:rPr lang="fr-FR" dirty="0" smtClean="0"/>
+              <a:rPr lang="fr-FR" dirty="0"/>
               <a:t>Cliquez et modifiez le titre</a:t>
             </a:r>
             <a:endParaRPr lang="en-US" dirty="0"/>
@@ -3801,35 +3838,35 @@
           <a:p>
             <a:pPr lvl="0"/>
             <a:r>
-              <a:rPr lang="fr-FR" dirty="0" smtClean="0"/>
+              <a:rPr lang="fr-FR" dirty="0"/>
               <a:t>Cliquez et modifiez le contenu</a:t>
             </a:r>
           </a:p>
           <a:p>
             <a:pPr lvl="1"/>
             <a:r>
-              <a:rPr lang="fr-FR" dirty="0" smtClean="0"/>
+              <a:rPr lang="fr-FR" dirty="0"/>
               <a:t>Deuxième niveau</a:t>
             </a:r>
           </a:p>
           <a:p>
             <a:pPr lvl="2"/>
             <a:r>
-              <a:rPr lang="fr-FR" dirty="0" smtClean="0"/>
+              <a:rPr lang="fr-FR" dirty="0"/>
               <a:t>Troisième niveau</a:t>
             </a:r>
           </a:p>
           <a:p>
             <a:pPr lvl="3"/>
             <a:r>
-              <a:rPr lang="fr-FR" dirty="0" smtClean="0"/>
+              <a:rPr lang="fr-FR" dirty="0"/>
               <a:t>Quatrième niveau</a:t>
             </a:r>
           </a:p>
           <a:p>
             <a:pPr lvl="4"/>
             <a:r>
-              <a:rPr lang="fr-FR" dirty="0" smtClean="0"/>
+              <a:rPr lang="fr-FR" dirty="0"/>
               <a:t>Cinquième niveau</a:t>
             </a:r>
             <a:endParaRPr lang="en-US" dirty="0"/>
@@ -3958,14 +3995,8 @@
     <p:sldLayoutId id="2147483676" r:id="rId11"/>
     <p:sldLayoutId id="2147483677" r:id="rId12"/>
     <p:sldLayoutId id="2147483680" r:id="rId13"/>
+    <p:sldLayoutId id="2147483681" r:id="rId14"/>
   </p:sldLayoutIdLst>
-  <p:timing>
-    <p:tnLst>
-      <p:par>
-        <p:cTn id="1" dur="indefinite" restart="never" nodeType="tmRoot"/>
-      </p:par>
-    </p:tnLst>
-  </p:timing>
   <p:hf hdr="0" ftr="0"/>
   <p:txStyles>
     <p:titleStyle>
@@ -4255,28 +4286,39 @@
       </p:grpSpPr>
       <p:sp>
         <p:nvSpPr>
-          <p:cNvPr id="122" name="Rounded Rectangle 121"/>
+          <p:cNvPr id="65" name="Rounded Rectangle 64">
+            <a:extLst>
+              <a:ext uri="{FF2B5EF4-FFF2-40B4-BE49-F238E27FC236}">
+                <a16:creationId xmlns="" xmlns:a16="http://schemas.microsoft.com/office/drawing/2014/main" id="{68B161DF-0B04-DA43-8872-F08463775AF3}"/>
+              </a:ext>
+            </a:extLst>
+          </p:cNvPr>
           <p:cNvSpPr/>
           <p:nvPr/>
         </p:nvSpPr>
         <p:spPr>
           <a:xfrm>
-            <a:off x="922655" y="548681"/>
-            <a:ext cx="3185731" cy="1440160"/>
+            <a:off x="7061488" y="2099139"/>
+            <a:ext cx="3354992" cy="2295210"/>
           </a:xfrm>
           <a:prstGeom prst="roundRect">
             <a:avLst>
-              <a:gd name="adj" fmla="val 7458"/>
+              <a:gd name="adj" fmla="val 5167"/>
             </a:avLst>
           </a:prstGeom>
           <a:solidFill>
             <a:schemeClr val="bg1"/>
           </a:solidFill>
           <a:ln w="12700">
-            <a:solidFill>
-              <a:schemeClr val="bg2"/>
-            </a:solidFill>
+            <a:noFill/>
           </a:ln>
+          <a:effectLst>
+            <a:outerShdw blurRad="101600" algn="ctr" rotWithShape="0">
+              <a:prstClr val="black">
+                <a:alpha val="20000"/>
+              </a:prstClr>
+            </a:outerShdw>
+          </a:effectLst>
         </p:spPr>
         <p:style>
           <a:lnRef idx="2">
@@ -4299,32 +4341,238 @@
           <a:lstStyle/>
           <a:p>
             <a:pPr algn="ctr"/>
-            <a:r>
-              <a:rPr lang="en-US"/>
-              <a:t>vz</a:t>
-            </a:r>
-            <a:endParaRPr lang="en-US" dirty="0"/>
-          </a:p>
-        </p:txBody>
-      </p:sp>
-      <p:sp>
-        <p:nvSpPr>
-          <p:cNvPr id="124" name="Rounded Rectangle 123"/>
+            <a:endParaRPr lang="en-US" dirty="0">
+              <a:latin typeface="Source Sans Pro" panose="020B0503030403020204" pitchFamily="34" charset="0"/>
+              <a:ea typeface="Source Sans Pro" panose="020B0503030403020204" pitchFamily="34" charset="0"/>
+            </a:endParaRPr>
+          </a:p>
+        </p:txBody>
+      </p:sp>
+      <p:grpSp>
+        <p:nvGrpSpPr>
+          <p:cNvPr id="2" name="Group 1">
+            <a:extLst>
+              <a:ext uri="{FF2B5EF4-FFF2-40B4-BE49-F238E27FC236}">
+                <a16:creationId xmlns="" xmlns:a16="http://schemas.microsoft.com/office/drawing/2014/main" id="{6E5AB0B8-F4F9-BA4C-9369-31091AF1F911}"/>
+              </a:ext>
+            </a:extLst>
+          </p:cNvPr>
+          <p:cNvGrpSpPr/>
+          <p:nvPr/>
+        </p:nvGrpSpPr>
+        <p:grpSpPr>
+          <a:xfrm>
+            <a:off x="7198122" y="2375030"/>
+            <a:ext cx="3088402" cy="1907224"/>
+            <a:chOff x="7636455" y="1452709"/>
+            <a:chExt cx="3088402" cy="2140548"/>
+          </a:xfrm>
+        </p:grpSpPr>
+        <p:sp>
+          <p:nvSpPr>
+            <p:cNvPr id="50" name="Rounded Rectangle 49">
+              <a:extLst>
+                <a:ext uri="{FF2B5EF4-FFF2-40B4-BE49-F238E27FC236}">
+                  <a16:creationId xmlns="" xmlns:a16="http://schemas.microsoft.com/office/drawing/2014/main" id="{133BFD67-88E8-9540-86B6-8FFA8E76734A}"/>
+                </a:ext>
+              </a:extLst>
+            </p:cNvPr>
+            <p:cNvSpPr/>
+            <p:nvPr/>
+          </p:nvSpPr>
+          <p:spPr>
+            <a:xfrm>
+              <a:off x="7636455" y="2192448"/>
+              <a:ext cx="3088402" cy="661070"/>
+            </a:xfrm>
+            <a:prstGeom prst="roundRect">
+              <a:avLst>
+                <a:gd name="adj" fmla="val 8907"/>
+              </a:avLst>
+            </a:prstGeom>
+            <a:solidFill>
+              <a:schemeClr val="bg1"/>
+            </a:solidFill>
+            <a:ln w="12700">
+              <a:solidFill>
+                <a:schemeClr val="bg2"/>
+              </a:solidFill>
+            </a:ln>
+          </p:spPr>
+          <p:style>
+            <a:lnRef idx="2">
+              <a:schemeClr val="accent1">
+                <a:shade val="50000"/>
+              </a:schemeClr>
+            </a:lnRef>
+            <a:fillRef idx="1">
+              <a:schemeClr val="accent1"/>
+            </a:fillRef>
+            <a:effectRef idx="0">
+              <a:schemeClr val="accent1"/>
+            </a:effectRef>
+            <a:fontRef idx="minor">
+              <a:schemeClr val="lt1"/>
+            </a:fontRef>
+          </p:style>
+          <p:txBody>
+            <a:bodyPr rtlCol="0" anchor="ctr"/>
+            <a:lstStyle/>
+            <a:p>
+              <a:pPr algn="ctr"/>
+              <a:endParaRPr lang="en-US" dirty="0">
+                <a:latin typeface="Source Sans Pro" panose="020B0503030403020204" pitchFamily="34" charset="0"/>
+                <a:ea typeface="Source Sans Pro" panose="020B0503030403020204" pitchFamily="34" charset="0"/>
+              </a:endParaRPr>
+            </a:p>
+          </p:txBody>
+        </p:sp>
+        <p:sp>
+          <p:nvSpPr>
+            <p:cNvPr id="54" name="Rounded Rectangle 53">
+              <a:extLst>
+                <a:ext uri="{FF2B5EF4-FFF2-40B4-BE49-F238E27FC236}">
+                  <a16:creationId xmlns="" xmlns:a16="http://schemas.microsoft.com/office/drawing/2014/main" id="{0FF18F5A-C793-934C-8AEF-05C54219B54D}"/>
+                </a:ext>
+              </a:extLst>
+            </p:cNvPr>
+            <p:cNvSpPr/>
+            <p:nvPr/>
+          </p:nvSpPr>
+          <p:spPr>
+            <a:xfrm>
+              <a:off x="7636455" y="1452709"/>
+              <a:ext cx="3088402" cy="661070"/>
+            </a:xfrm>
+            <a:prstGeom prst="roundRect">
+              <a:avLst>
+                <a:gd name="adj" fmla="val 8907"/>
+              </a:avLst>
+            </a:prstGeom>
+            <a:solidFill>
+              <a:schemeClr val="bg1"/>
+            </a:solidFill>
+            <a:ln w="12700">
+              <a:solidFill>
+                <a:schemeClr val="bg2"/>
+              </a:solidFill>
+            </a:ln>
+          </p:spPr>
+          <p:style>
+            <a:lnRef idx="2">
+              <a:schemeClr val="accent1">
+                <a:shade val="50000"/>
+              </a:schemeClr>
+            </a:lnRef>
+            <a:fillRef idx="1">
+              <a:schemeClr val="accent1"/>
+            </a:fillRef>
+            <a:effectRef idx="0">
+              <a:schemeClr val="accent1"/>
+            </a:effectRef>
+            <a:fontRef idx="minor">
+              <a:schemeClr val="lt1"/>
+            </a:fontRef>
+          </p:style>
+          <p:txBody>
+            <a:bodyPr rtlCol="0" anchor="ctr"/>
+            <a:lstStyle/>
+            <a:p>
+              <a:pPr algn="ctr"/>
+              <a:endParaRPr lang="en-US" dirty="0">
+                <a:latin typeface="Source Sans Pro" panose="020B0503030403020204" pitchFamily="34" charset="0"/>
+                <a:ea typeface="Source Sans Pro" panose="020B0503030403020204" pitchFamily="34" charset="0"/>
+              </a:endParaRPr>
+            </a:p>
+          </p:txBody>
+        </p:sp>
+        <p:sp>
+          <p:nvSpPr>
+            <p:cNvPr id="53" name="Rounded Rectangle 52">
+              <a:extLst>
+                <a:ext uri="{FF2B5EF4-FFF2-40B4-BE49-F238E27FC236}">
+                  <a16:creationId xmlns="" xmlns:a16="http://schemas.microsoft.com/office/drawing/2014/main" id="{3FCE6755-151F-1A4C-B97A-DC3A68CDAFCB}"/>
+                </a:ext>
+              </a:extLst>
+            </p:cNvPr>
+            <p:cNvSpPr/>
+            <p:nvPr/>
+          </p:nvSpPr>
+          <p:spPr>
+            <a:xfrm>
+              <a:off x="7636455" y="2932187"/>
+              <a:ext cx="3088402" cy="661070"/>
+            </a:xfrm>
+            <a:prstGeom prst="roundRect">
+              <a:avLst>
+                <a:gd name="adj" fmla="val 8907"/>
+              </a:avLst>
+            </a:prstGeom>
+            <a:solidFill>
+              <a:schemeClr val="bg1"/>
+            </a:solidFill>
+            <a:ln w="12700">
+              <a:solidFill>
+                <a:schemeClr val="bg2"/>
+              </a:solidFill>
+            </a:ln>
+          </p:spPr>
+          <p:style>
+            <a:lnRef idx="2">
+              <a:schemeClr val="accent1">
+                <a:shade val="50000"/>
+              </a:schemeClr>
+            </a:lnRef>
+            <a:fillRef idx="1">
+              <a:schemeClr val="accent1"/>
+            </a:fillRef>
+            <a:effectRef idx="0">
+              <a:schemeClr val="accent1"/>
+            </a:effectRef>
+            <a:fontRef idx="minor">
+              <a:schemeClr val="lt1"/>
+            </a:fontRef>
+          </p:style>
+          <p:txBody>
+            <a:bodyPr rtlCol="0" anchor="ctr"/>
+            <a:lstStyle/>
+            <a:p>
+              <a:pPr algn="ctr"/>
+              <a:endParaRPr lang="en-US" dirty="0">
+                <a:latin typeface="Source Sans Pro" panose="020B0503030403020204" pitchFamily="34" charset="0"/>
+                <a:ea typeface="Source Sans Pro" panose="020B0503030403020204" pitchFamily="34" charset="0"/>
+              </a:endParaRPr>
+            </a:p>
+          </p:txBody>
+        </p:sp>
+      </p:grpSp>
+      <p:sp>
+        <p:nvSpPr>
+          <p:cNvPr id="51" name="Rounded Rectangle 50">
+            <a:extLst>
+              <a:ext uri="{FF2B5EF4-FFF2-40B4-BE49-F238E27FC236}">
+                <a16:creationId xmlns="" xmlns:a16="http://schemas.microsoft.com/office/drawing/2014/main" id="{F6B18FC4-0EC2-D842-9F91-793486EBD6C6}"/>
+              </a:ext>
+            </a:extLst>
+          </p:cNvPr>
           <p:cNvSpPr/>
           <p:nvPr/>
         </p:nvSpPr>
         <p:spPr>
           <a:xfrm>
-            <a:off x="6098094" y="2365023"/>
-            <a:ext cx="2439630" cy="534063"/>
+            <a:off x="1001065" y="2099138"/>
+            <a:ext cx="3433965" cy="2202105"/>
           </a:xfrm>
           <a:prstGeom prst="roundRect">
             <a:avLst>
-              <a:gd name="adj" fmla="val 15733"/>
+              <a:gd name="adj" fmla="val 5167"/>
             </a:avLst>
           </a:prstGeom>
           <a:solidFill>
-            <a:schemeClr val="bg1"/>
+            <a:schemeClr val="tx2">
+              <a:lumMod val="20000"/>
+              <a:lumOff val="80000"/>
+            </a:schemeClr>
           </a:solidFill>
           <a:ln w="12700">
             <a:solidFill>
@@ -4353,24 +4601,27 @@
           <a:lstStyle/>
           <a:p>
             <a:pPr algn="ctr"/>
-            <a:endParaRPr lang="en-US" dirty="0"/>
-          </a:p>
-        </p:txBody>
-      </p:sp>
-      <p:sp>
-        <p:nvSpPr>
-          <p:cNvPr id="32" name="Rounded Rectangle 31"/>
+            <a:endParaRPr lang="en-US" dirty="0">
+              <a:latin typeface="Source Sans Pro" panose="020B0503030403020204" pitchFamily="34" charset="0"/>
+              <a:ea typeface="Source Sans Pro" panose="020B0503030403020204" pitchFamily="34" charset="0"/>
+            </a:endParaRPr>
+          </a:p>
+        </p:txBody>
+      </p:sp>
+      <p:sp>
+        <p:nvSpPr>
+          <p:cNvPr id="122" name="Rounded Rectangle 121"/>
           <p:cNvSpPr/>
           <p:nvPr/>
         </p:nvSpPr>
         <p:spPr>
           <a:xfrm>
-            <a:off x="4358749" y="548680"/>
-            <a:ext cx="1449238" cy="1440161"/>
+            <a:off x="1039540" y="3004001"/>
+            <a:ext cx="3352551" cy="1259034"/>
           </a:xfrm>
           <a:prstGeom prst="roundRect">
             <a:avLst>
-              <a:gd name="adj" fmla="val 11341"/>
+              <a:gd name="adj" fmla="val 9197"/>
             </a:avLst>
           </a:prstGeom>
           <a:solidFill>
@@ -4413,18 +4664,18 @@
       </p:sp>
       <p:sp>
         <p:nvSpPr>
-          <p:cNvPr id="115" name="Rounded Rectangle 114"/>
+          <p:cNvPr id="32" name="Rounded Rectangle 31"/>
           <p:cNvSpPr/>
           <p:nvPr/>
         </p:nvSpPr>
         <p:spPr>
           <a:xfrm>
-            <a:off x="6100947" y="1544227"/>
-            <a:ext cx="2435650" cy="679909"/>
+            <a:off x="4563401" y="3004002"/>
+            <a:ext cx="2250756" cy="1278252"/>
           </a:xfrm>
           <a:prstGeom prst="roundRect">
             <a:avLst>
-              <a:gd name="adj" fmla="val 15733"/>
+              <a:gd name="adj" fmla="val 10476"/>
             </a:avLst>
           </a:prstGeom>
           <a:solidFill>
@@ -4456,10 +4707,14 @@
           <a:bodyPr rtlCol="0" anchor="ctr"/>
           <a:lstStyle/>
           <a:p>
-            <a:pPr algn="ctr"/>
-            <a:r>
-              <a:rPr lang="en-US"/>
-              <a:t>vz</a:t>
+            <a:r>
+              <a:rPr lang="en-US" sz="1400" b="1" dirty="0">
+                <a:solidFill>
+                  <a:schemeClr val="tx1"/>
+                </a:solidFill>
+                <a:latin typeface="Source Sans Pro" charset="0"/>
+              </a:rPr>
+              <a:t>   Architecture</a:t>
             </a:r>
             <a:endParaRPr lang="en-US" dirty="0"/>
           </a:p>
@@ -4467,23 +4722,131 @@
       </p:sp>
       <p:sp>
         <p:nvSpPr>
-          <p:cNvPr id="62" name="Rounded Rectangle 61"/>
+          <p:cNvPr id="78" name="TextBox 77"/>
+          <p:cNvSpPr txBox="1"/>
+          <p:nvPr/>
+        </p:nvSpPr>
+        <p:spPr>
+          <a:xfrm>
+            <a:off x="7331855" y="2465270"/>
+            <a:ext cx="1931600" cy="677108"/>
+          </a:xfrm>
+          <a:prstGeom prst="rect">
+            <a:avLst/>
+          </a:prstGeom>
+          <a:noFill/>
+        </p:spPr>
+        <p:txBody>
+          <a:bodyPr wrap="square" rtlCol="0">
+            <a:spAutoFit/>
+          </a:bodyPr>
+          <a:lstStyle/>
+          <a:p>
+            <a:r>
+              <a:rPr lang="en-US" sz="1400" b="1" dirty="0">
+                <a:latin typeface="Source Sans Pro" charset="0"/>
+                <a:ea typeface="Source Sans Pro" charset="0"/>
+                <a:cs typeface="Source Sans Pro" charset="0"/>
+              </a:rPr>
+              <a:t>Central Repository</a:t>
+            </a:r>
+          </a:p>
+          <a:p>
+            <a:r>
+              <a:rPr lang="en-US" sz="1000" i="1" dirty="0" smtClean="0">
+                <a:latin typeface="Source Sans Pro" panose="020B0503030403020204" pitchFamily="34" charset="0"/>
+              </a:rPr>
+              <a:t>Modules </a:t>
+            </a:r>
+            <a:r>
+              <a:rPr lang="en-US" sz="1000" i="1" dirty="0">
+                <a:latin typeface="Source Sans Pro" panose="020B0503030403020204" pitchFamily="34" charset="0"/>
+              </a:rPr>
+              <a:t>with </a:t>
+            </a:r>
+            <a:r>
+              <a:rPr lang="en-US" sz="1000" i="1" dirty="0">
+                <a:solidFill>
+                  <a:schemeClr val="accent1"/>
+                </a:solidFill>
+                <a:latin typeface="Source Sans Pro" panose="020B0503030403020204" pitchFamily="34" charset="0"/>
+              </a:rPr>
+              <a:t>SDK EULA </a:t>
+            </a:r>
+            <a:r>
+              <a:rPr lang="en-US" sz="1000" i="1" dirty="0">
+                <a:latin typeface="Source Sans Pro" panose="020B0503030403020204" pitchFamily="34" charset="0"/>
+              </a:rPr>
+              <a:t>License</a:t>
+            </a:r>
+          </a:p>
+          <a:p>
+            <a:endParaRPr lang="en-US" sz="1400" b="1" dirty="0">
+              <a:latin typeface="Source Sans Pro" charset="0"/>
+              <a:ea typeface="Source Sans Pro" charset="0"/>
+              <a:cs typeface="Source Sans Pro" charset="0"/>
+            </a:endParaRPr>
+          </a:p>
+        </p:txBody>
+      </p:sp>
+      <p:sp>
+        <p:nvSpPr>
+          <p:cNvPr id="120" name="TextBox 119"/>
+          <p:cNvSpPr txBox="1"/>
+          <p:nvPr/>
+        </p:nvSpPr>
+        <p:spPr>
+          <a:xfrm>
+            <a:off x="1229691" y="3170906"/>
+            <a:ext cx="1989658" cy="307777"/>
+          </a:xfrm>
+          <a:prstGeom prst="rect">
+            <a:avLst/>
+          </a:prstGeom>
+          <a:noFill/>
+        </p:spPr>
+        <p:txBody>
+          <a:bodyPr wrap="square" rtlCol="0">
+            <a:spAutoFit/>
+          </a:bodyPr>
+          <a:lstStyle/>
+          <a:p>
+            <a:r>
+              <a:rPr lang="en-US" sz="1400" b="1" dirty="0">
+                <a:latin typeface="Source Sans Pro" charset="0"/>
+                <a:ea typeface="Source Sans Pro" charset="0"/>
+                <a:cs typeface="Source Sans Pro" charset="0"/>
+              </a:rPr>
+              <a:t>SDK Version </a:t>
+            </a:r>
+            <a:r>
+              <a:rPr lang="en-US" sz="1400" b="1" dirty="0">
+                <a:latin typeface="Consolas" panose="020B0609020204030204" pitchFamily="49" charset="0"/>
+                <a:ea typeface="Source Sans Pro" charset="0"/>
+                <a:cs typeface="Source Sans Pro" charset="0"/>
+              </a:rPr>
+              <a:t>5.m.p</a:t>
+            </a:r>
+          </a:p>
+        </p:txBody>
+      </p:sp>
+      <p:sp>
+        <p:nvSpPr>
+          <p:cNvPr id="123" name="Rounded Rectangle 122"/>
           <p:cNvSpPr/>
           <p:nvPr/>
         </p:nvSpPr>
         <p:spPr>
           <a:xfrm>
-            <a:off x="6098094" y="708677"/>
-            <a:ext cx="2460363" cy="735378"/>
+            <a:off x="1229691" y="3595536"/>
+            <a:ext cx="2982729" cy="488331"/>
           </a:xfrm>
           <a:prstGeom prst="roundRect">
             <a:avLst>
-              <a:gd name="adj" fmla="val 15733"/>
+              <a:gd name="adj" fmla="val 0"/>
             </a:avLst>
           </a:prstGeom>
-          <a:solidFill>
-            <a:schemeClr val="bg1"/>
-          </a:solidFill>
+          <a:noFill/>
           <a:ln w="12700">
             <a:solidFill>
               <a:schemeClr val="bg2"/>
@@ -4511,37 +4874,32 @@
           <a:lstStyle/>
           <a:p>
             <a:pPr algn="ctr"/>
-            <a:r>
-              <a:rPr lang="en-US"/>
-              <a:t>vz</a:t>
-            </a:r>
             <a:endParaRPr lang="en-US" dirty="0"/>
           </a:p>
         </p:txBody>
       </p:sp>
       <p:sp>
         <p:nvSpPr>
-          <p:cNvPr id="61" name="Rounded Rectangle 60"/>
+          <p:cNvPr id="118" name="Rounded Rectangle 117"/>
           <p:cNvSpPr/>
           <p:nvPr/>
         </p:nvSpPr>
         <p:spPr>
           <a:xfrm>
-            <a:off x="1662314" y="2522063"/>
-            <a:ext cx="3301138" cy="530958"/>
+            <a:off x="900052" y="2828650"/>
+            <a:ext cx="6029249" cy="1565698"/>
           </a:xfrm>
           <a:prstGeom prst="roundRect">
             <a:avLst>
-              <a:gd name="adj" fmla="val 14031"/>
+              <a:gd name="adj" fmla="val 6443"/>
             </a:avLst>
           </a:prstGeom>
-          <a:solidFill>
-            <a:schemeClr val="bg1"/>
-          </a:solidFill>
+          <a:noFill/>
           <a:ln w="12700">
             <a:solidFill>
-              <a:schemeClr val="bg2"/>
+              <a:schemeClr val="accent1"/>
             </a:solidFill>
+            <a:prstDash val="solid"/>
           </a:ln>
         </p:spPr>
         <p:style>
@@ -4565,24 +4923,92 @@
           <a:lstStyle/>
           <a:p>
             <a:pPr algn="ctr"/>
-            <a:r>
-              <a:rPr lang="en-US" dirty="0" smtClean="0"/>
-              <a:t>z</a:t>
-            </a:r>
             <a:endParaRPr lang="en-US" dirty="0"/>
           </a:p>
         </p:txBody>
       </p:sp>
-      <p:sp>
-        <p:nvSpPr>
-          <p:cNvPr id="78" name="TextBox 77"/>
+      <p:pic>
+        <p:nvPicPr>
+          <p:cNvPr id="102" name="Picture 101">
+            <a:extLst>
+              <a:ext uri="{FF2B5EF4-FFF2-40B4-BE49-F238E27FC236}">
+                <a16:creationId xmlns="" xmlns:a16="http://schemas.microsoft.com/office/drawing/2014/main" id="{6E47523C-39E3-414E-8E44-2AF044AA7D00}"/>
+              </a:ext>
+            </a:extLst>
+          </p:cNvPr>
+          <p:cNvPicPr>
+            <a:picLocks noChangeAspect="1"/>
+          </p:cNvPicPr>
+          <p:nvPr/>
+        </p:nvPicPr>
+        <p:blipFill>
+          <a:blip r:embed="rId2" cstate="print">
+            <a:extLst>
+              <a:ext uri="{28A0092B-C50C-407E-A947-70E740481C1C}">
+                <a14:useLocalDpi xmlns:a14="http://schemas.microsoft.com/office/drawing/2010/main" val="0"/>
+              </a:ext>
+            </a:extLst>
+          </a:blip>
+          <a:stretch>
+            <a:fillRect/>
+          </a:stretch>
+        </p:blipFill>
+        <p:spPr>
+          <a:xfrm>
+            <a:off x="6072921" y="3413569"/>
+            <a:ext cx="455462" cy="459117"/>
+          </a:xfrm>
+          <a:prstGeom prst="rect">
+            <a:avLst/>
+          </a:prstGeom>
+        </p:spPr>
+      </p:pic>
+      <p:pic>
+        <p:nvPicPr>
+          <p:cNvPr id="43" name="Picture 42">
+            <a:extLst>
+              <a:ext uri="{FF2B5EF4-FFF2-40B4-BE49-F238E27FC236}">
+                <a16:creationId xmlns="" xmlns:a16="http://schemas.microsoft.com/office/drawing/2014/main" id="{12F00518-C1C0-8D40-A208-E7A5D1093A00}"/>
+              </a:ext>
+            </a:extLst>
+          </p:cNvPr>
+          <p:cNvPicPr>
+            <a:picLocks noChangeAspect="1"/>
+          </p:cNvPicPr>
+          <p:nvPr/>
+        </p:nvPicPr>
+        <p:blipFill>
+          <a:blip r:embed="rId3" cstate="print">
+            <a:extLst>
+              <a:ext uri="{28A0092B-C50C-407E-A947-70E740481C1C}">
+                <a14:useLocalDpi xmlns:a14="http://schemas.microsoft.com/office/drawing/2010/main" val="0"/>
+              </a:ext>
+            </a:extLst>
+          </a:blip>
+          <a:stretch>
+            <a:fillRect/>
+          </a:stretch>
+        </p:blipFill>
+        <p:spPr>
+          <a:xfrm>
+            <a:off x="9564229" y="2402527"/>
+            <a:ext cx="551138" cy="563813"/>
+          </a:xfrm>
+          <a:prstGeom prst="rect">
+            <a:avLst/>
+          </a:prstGeom>
+        </p:spPr>
+      </p:pic>
+      <p:sp>
+        <p:nvSpPr>
+          <p:cNvPr id="84" name="TextBox 83"/>
           <p:cNvSpPr txBox="1"/>
           <p:nvPr/>
         </p:nvSpPr>
         <p:spPr>
           <a:xfrm>
-            <a:off x="6167302" y="786535"/>
-            <a:ext cx="1931600" cy="307777"/>
+            <a:off x="7331855" y="3198562"/>
+            <a:ext cx="1909130" cy="307777"/>
           </a:xfrm>
           <a:prstGeom prst="rect">
             <a:avLst/>
@@ -4596,30 +5022,67 @@
           <a:lstStyle/>
           <a:p>
             <a:r>
-              <a:rPr lang="en-US" sz="1400" b="1" dirty="0" smtClean="0">
+              <a:rPr lang="en-US" sz="1400" b="1" dirty="0">
                 <a:latin typeface="Source Sans Pro" charset="0"/>
                 <a:ea typeface="Source Sans Pro" charset="0"/>
                 <a:cs typeface="Source Sans Pro" charset="0"/>
               </a:rPr>
-              <a:t>Central Repository</a:t>
-            </a:r>
-            <a:endParaRPr lang="en-US" sz="1400" b="1" dirty="0">
-              <a:latin typeface="Source Sans Pro" charset="0"/>
-              <a:ea typeface="Source Sans Pro" charset="0"/>
-              <a:cs typeface="Source Sans Pro" charset="0"/>
-            </a:endParaRPr>
-          </a:p>
-        </p:txBody>
-      </p:sp>
-      <p:sp>
-        <p:nvSpPr>
-          <p:cNvPr id="75" name="TextBox 74"/>
+              <a:t>Developer Repository</a:t>
+            </a:r>
+          </a:p>
+        </p:txBody>
+      </p:sp>
+      <p:pic>
+        <p:nvPicPr>
+          <p:cNvPr id="44" name="Picture 43">
+            <a:extLst>
+              <a:ext uri="{FF2B5EF4-FFF2-40B4-BE49-F238E27FC236}">
+                <a16:creationId xmlns="" xmlns:a16="http://schemas.microsoft.com/office/drawing/2014/main" id="{C4F5EE46-2BC5-DF40-93A6-0894A861A09D}"/>
+              </a:ext>
+            </a:extLst>
+          </p:cNvPr>
+          <p:cNvPicPr>
+            <a:picLocks noChangeAspect="1"/>
+          </p:cNvPicPr>
+          <p:nvPr/>
+        </p:nvPicPr>
+        <p:blipFill>
+          <a:blip r:embed="rId4" cstate="print">
+            <a:extLst>
+              <a:ext uri="{28A0092B-C50C-407E-A947-70E740481C1C}">
+                <a14:useLocalDpi xmlns:a14="http://schemas.microsoft.com/office/drawing/2010/main" val="0"/>
+              </a:ext>
+            </a:extLst>
+          </a:blip>
+          <a:stretch>
+            <a:fillRect/>
+          </a:stretch>
+        </p:blipFill>
+        <p:spPr>
+          <a:xfrm>
+            <a:off x="9564229" y="3034859"/>
+            <a:ext cx="580342" cy="593691"/>
+          </a:xfrm>
+          <a:prstGeom prst="rect">
+            <a:avLst/>
+          </a:prstGeom>
+        </p:spPr>
+      </p:pic>
+      <p:sp>
+        <p:nvSpPr>
+          <p:cNvPr id="46" name="TextBox 45">
+            <a:extLst>
+              <a:ext uri="{FF2B5EF4-FFF2-40B4-BE49-F238E27FC236}">
+                <a16:creationId xmlns="" xmlns:a16="http://schemas.microsoft.com/office/drawing/2014/main" id="{46D7B7A7-B133-1345-B9B7-0C004F631433}"/>
+              </a:ext>
+            </a:extLst>
+          </p:cNvPr>
           <p:cNvSpPr txBox="1"/>
           <p:nvPr/>
         </p:nvSpPr>
         <p:spPr>
           <a:xfrm>
-            <a:off x="1730758" y="2588359"/>
+            <a:off x="1229691" y="2427768"/>
             <a:ext cx="2260852" cy="307777"/>
           </a:xfrm>
           <a:prstGeom prst="rect">
@@ -4644,8 +5107,9 @@
             </a:lvl1pPr>
           </a:lstStyle>
           <a:p>
-            <a:r>
-              <a:rPr lang="en-US" b="1" dirty="0" smtClean="0"/>
+            <a:pPr algn="l"/>
+            <a:r>
+              <a:rPr lang="en-US" b="1" dirty="0"/>
               <a:t>SDK Distribution </a:t>
             </a:r>
             <a:r>
@@ -4657,16 +5121,475 @@
           </a:p>
         </p:txBody>
       </p:sp>
-      <p:sp>
-        <p:nvSpPr>
-          <p:cNvPr id="84" name="TextBox 83"/>
+      <p:pic>
+        <p:nvPicPr>
+          <p:cNvPr id="48" name="Picture 47">
+            <a:extLst>
+              <a:ext uri="{FF2B5EF4-FFF2-40B4-BE49-F238E27FC236}">
+                <a16:creationId xmlns="" xmlns:a16="http://schemas.microsoft.com/office/drawing/2014/main" id="{5E811C60-78CC-5B43-9764-9713335B9337}"/>
+              </a:ext>
+            </a:extLst>
+          </p:cNvPr>
+          <p:cNvPicPr>
+            <a:picLocks noChangeAspect="1"/>
+          </p:cNvPicPr>
+          <p:nvPr/>
+        </p:nvPicPr>
+        <p:blipFill>
+          <a:blip r:embed="rId5" cstate="print">
+            <a:extLst>
+              <a:ext uri="{28A0092B-C50C-407E-A947-70E740481C1C}">
+                <a14:useLocalDpi xmlns:a14="http://schemas.microsoft.com/office/drawing/2010/main" val="0"/>
+              </a:ext>
+            </a:extLst>
+          </a:blip>
+          <a:stretch>
+            <a:fillRect/>
+          </a:stretch>
+        </p:blipFill>
+        <p:spPr>
+          <a:xfrm>
+            <a:off x="3479595" y="2427768"/>
+            <a:ext cx="775336" cy="333888"/>
+          </a:xfrm>
+          <a:prstGeom prst="rect">
+            <a:avLst/>
+          </a:prstGeom>
+        </p:spPr>
+      </p:pic>
+      <p:sp>
+        <p:nvSpPr>
+          <p:cNvPr id="85" name="Rectangle 84">
+            <a:extLst>
+              <a:ext uri="{FF2B5EF4-FFF2-40B4-BE49-F238E27FC236}">
+                <a16:creationId xmlns="" xmlns:a16="http://schemas.microsoft.com/office/drawing/2014/main" id="{B2FE977E-CFE6-5841-8CE3-8D2664BD1B99}"/>
+              </a:ext>
+            </a:extLst>
+          </p:cNvPr>
+          <p:cNvSpPr/>
+          <p:nvPr/>
+        </p:nvSpPr>
+        <p:spPr>
+          <a:xfrm>
+            <a:off x="4692269" y="2472370"/>
+            <a:ext cx="2084742" cy="523220"/>
+          </a:xfrm>
+          <a:prstGeom prst="rect">
+            <a:avLst/>
+          </a:prstGeom>
+          <a:solidFill>
+            <a:schemeClr val="bg1"/>
+          </a:solidFill>
+        </p:spPr>
+        <p:txBody>
+          <a:bodyPr wrap="square">
+            <a:spAutoFit/>
+          </a:bodyPr>
+          <a:lstStyle/>
+          <a:p>
+            <a:pPr algn="ctr"/>
+            <a:r>
+              <a:rPr lang="en-US" sz="1400" b="1" dirty="0">
+                <a:solidFill>
+                  <a:schemeClr val="accent1"/>
+                </a:solidFill>
+                <a:latin typeface="Source Sans Pro" panose="020B0503030403020204" pitchFamily="34" charset="0"/>
+              </a:rPr>
+              <a:t>MICROEJ SDK EULA </a:t>
+            </a:r>
+            <a:br>
+              <a:rPr lang="en-US" sz="1400" b="1" dirty="0">
+                <a:solidFill>
+                  <a:schemeClr val="accent1"/>
+                </a:solidFill>
+                <a:latin typeface="Source Sans Pro" panose="020B0503030403020204" pitchFamily="34" charset="0"/>
+              </a:rPr>
+            </a:br>
+            <a:r>
+              <a:rPr lang="en-US" sz="1400" b="1" dirty="0">
+                <a:solidFill>
+                  <a:schemeClr val="accent1"/>
+                </a:solidFill>
+                <a:latin typeface="Source Sans Pro" panose="020B0503030403020204" pitchFamily="34" charset="0"/>
+              </a:rPr>
+              <a:t>(</a:t>
+            </a:r>
+            <a:r>
+              <a:rPr lang="en-US" sz="1100" b="1" dirty="0">
+                <a:solidFill>
+                  <a:schemeClr val="accent1"/>
+                </a:solidFill>
+                <a:latin typeface="Source Sans Pro" panose="020B0503030403020204" pitchFamily="34" charset="0"/>
+              </a:rPr>
+              <a:t>End User License Agreement)</a:t>
+            </a:r>
+          </a:p>
+        </p:txBody>
+      </p:sp>
+      <p:sp>
+        <p:nvSpPr>
+          <p:cNvPr id="86" name="Rounded Rectangle 85">
+            <a:extLst>
+              <a:ext uri="{FF2B5EF4-FFF2-40B4-BE49-F238E27FC236}">
+                <a16:creationId xmlns="" xmlns:a16="http://schemas.microsoft.com/office/drawing/2014/main" id="{500A1F69-90C8-614E-A109-B2AB4C011D21}"/>
+              </a:ext>
+            </a:extLst>
+          </p:cNvPr>
+          <p:cNvSpPr/>
+          <p:nvPr/>
+        </p:nvSpPr>
+        <p:spPr>
+          <a:xfrm>
+            <a:off x="1323177" y="1836118"/>
+            <a:ext cx="2723484" cy="498545"/>
+          </a:xfrm>
+          <a:prstGeom prst="roundRect">
+            <a:avLst>
+              <a:gd name="adj" fmla="val 50000"/>
+            </a:avLst>
+          </a:prstGeom>
+          <a:solidFill>
+            <a:schemeClr val="bg1"/>
+          </a:solidFill>
+          <a:ln w="12700">
+            <a:noFill/>
+          </a:ln>
+          <a:effectLst>
+            <a:outerShdw blurRad="101600" algn="ctr" rotWithShape="0">
+              <a:prstClr val="black">
+                <a:alpha val="20000"/>
+              </a:prstClr>
+            </a:outerShdw>
+          </a:effectLst>
+        </p:spPr>
+        <p:style>
+          <a:lnRef idx="2">
+            <a:schemeClr val="accent1">
+              <a:shade val="50000"/>
+            </a:schemeClr>
+          </a:lnRef>
+          <a:fillRef idx="1">
+            <a:schemeClr val="accent1"/>
+          </a:fillRef>
+          <a:effectRef idx="0">
+            <a:schemeClr val="accent1"/>
+          </a:effectRef>
+          <a:fontRef idx="minor">
+            <a:schemeClr val="lt1"/>
+          </a:fontRef>
+        </p:style>
+        <p:txBody>
+          <a:bodyPr rtlCol="0" anchor="ctr"/>
+          <a:lstStyle/>
+          <a:p>
+            <a:pPr algn="ctr"/>
+            <a:endParaRPr lang="en-US" dirty="0">
+              <a:latin typeface="Source Sans Pro" panose="020B0503030403020204" pitchFamily="34" charset="0"/>
+              <a:ea typeface="Source Sans Pro" panose="020B0503030403020204" pitchFamily="34" charset="0"/>
+            </a:endParaRPr>
+          </a:p>
+        </p:txBody>
+      </p:sp>
+      <p:pic>
+        <p:nvPicPr>
+          <p:cNvPr id="87" name="Picture 86">
+            <a:extLst>
+              <a:ext uri="{FF2B5EF4-FFF2-40B4-BE49-F238E27FC236}">
+                <a16:creationId xmlns="" xmlns:a16="http://schemas.microsoft.com/office/drawing/2014/main" id="{50E82368-37D9-DF47-81F6-6FDDE0883723}"/>
+              </a:ext>
+            </a:extLst>
+          </p:cNvPr>
+          <p:cNvPicPr>
+            <a:picLocks noChangeAspect="1"/>
+          </p:cNvPicPr>
+          <p:nvPr/>
+        </p:nvPicPr>
+        <p:blipFill>
+          <a:blip r:embed="rId6">
+            <a:extLst>
+              <a:ext uri="{28A0092B-C50C-407E-A947-70E740481C1C}">
+                <a14:useLocalDpi xmlns:a14="http://schemas.microsoft.com/office/drawing/2010/main" val="0"/>
+              </a:ext>
+            </a:extLst>
+          </a:blip>
+          <a:stretch>
+            <a:fillRect/>
+          </a:stretch>
+        </p:blipFill>
+        <p:spPr>
+          <a:xfrm>
+            <a:off x="1631504" y="1916832"/>
+            <a:ext cx="2344649" cy="356387"/>
+          </a:xfrm>
+          <a:prstGeom prst="rect">
+            <a:avLst/>
+          </a:prstGeom>
+        </p:spPr>
+      </p:pic>
+      <p:pic>
+        <p:nvPicPr>
+          <p:cNvPr id="88" name="Picture 87">
+            <a:extLst>
+              <a:ext uri="{FF2B5EF4-FFF2-40B4-BE49-F238E27FC236}">
+                <a16:creationId xmlns="" xmlns:a16="http://schemas.microsoft.com/office/drawing/2014/main" id="{5F434DB9-6B3D-CA47-B322-F3CC3A398948}"/>
+              </a:ext>
+            </a:extLst>
+          </p:cNvPr>
+          <p:cNvPicPr>
+            <a:picLocks noChangeAspect="1"/>
+          </p:cNvPicPr>
+          <p:nvPr/>
+        </p:nvPicPr>
+        <p:blipFill>
+          <a:blip r:embed="rId7" cstate="print">
+            <a:extLst>
+              <a:ext uri="{28A0092B-C50C-407E-A947-70E740481C1C}">
+                <a14:useLocalDpi xmlns:a14="http://schemas.microsoft.com/office/drawing/2010/main" val="0"/>
+              </a:ext>
+            </a:extLst>
+          </a:blip>
+          <a:stretch>
+            <a:fillRect/>
+          </a:stretch>
+        </p:blipFill>
+        <p:spPr>
+          <a:xfrm>
+            <a:off x="3611896" y="3068307"/>
+            <a:ext cx="622380" cy="557030"/>
+          </a:xfrm>
+          <a:prstGeom prst="rect">
+            <a:avLst/>
+          </a:prstGeom>
+        </p:spPr>
+      </p:pic>
+      <p:pic>
+        <p:nvPicPr>
+          <p:cNvPr id="96" name="Picture 95">
+            <a:extLst>
+              <a:ext uri="{FF2B5EF4-FFF2-40B4-BE49-F238E27FC236}">
+                <a16:creationId xmlns="" xmlns:a16="http://schemas.microsoft.com/office/drawing/2014/main" id="{159EF0D3-DB25-9A4F-89AC-5C47D43EFDEF}"/>
+              </a:ext>
+            </a:extLst>
+          </p:cNvPr>
+          <p:cNvPicPr>
+            <a:picLocks noChangeAspect="1"/>
+          </p:cNvPicPr>
+          <p:nvPr/>
+        </p:nvPicPr>
+        <p:blipFill>
+          <a:blip r:embed="rId8" cstate="print">
+            <a:extLst>
+              <a:ext uri="{28A0092B-C50C-407E-A947-70E740481C1C}">
+                <a14:useLocalDpi xmlns:a14="http://schemas.microsoft.com/office/drawing/2010/main" val="0"/>
+              </a:ext>
+            </a:extLst>
+          </a:blip>
+          <a:stretch>
+            <a:fillRect/>
+          </a:stretch>
+        </p:blipFill>
+        <p:spPr>
+          <a:xfrm>
+            <a:off x="3711021" y="3659465"/>
+            <a:ext cx="401766" cy="401766"/>
+          </a:xfrm>
+          <a:prstGeom prst="rect">
+            <a:avLst/>
+          </a:prstGeom>
+        </p:spPr>
+      </p:pic>
+      <p:sp>
+        <p:nvSpPr>
+          <p:cNvPr id="49" name="TextBox 48">
+            <a:extLst>
+              <a:ext uri="{FF2B5EF4-FFF2-40B4-BE49-F238E27FC236}">
+                <a16:creationId xmlns="" xmlns:a16="http://schemas.microsoft.com/office/drawing/2014/main" id="{51A558D5-DF53-A24D-9D28-08195F9DCDFF}"/>
+              </a:ext>
+            </a:extLst>
+          </p:cNvPr>
           <p:cNvSpPr txBox="1"/>
           <p:nvPr/>
         </p:nvSpPr>
         <p:spPr>
           <a:xfrm>
-            <a:off x="6142836" y="1651836"/>
-            <a:ext cx="1909130" cy="307777"/>
+            <a:off x="1323176" y="3697723"/>
+            <a:ext cx="1983044" cy="307777"/>
+          </a:xfrm>
+          <a:prstGeom prst="rect">
+            <a:avLst/>
+          </a:prstGeom>
+          <a:noFill/>
+        </p:spPr>
+        <p:txBody>
+          <a:bodyPr wrap="square" rtlCol="0">
+            <a:spAutoFit/>
+          </a:bodyPr>
+          <a:lstStyle/>
+          <a:p>
+            <a:r>
+              <a:rPr lang="en-US" sz="1400" b="1" dirty="0">
+                <a:latin typeface="Source Sans Pro" charset="0"/>
+              </a:rPr>
+              <a:t>Module Manager</a:t>
+            </a:r>
+          </a:p>
+        </p:txBody>
+      </p:sp>
+      <p:sp>
+        <p:nvSpPr>
+          <p:cNvPr id="57" name="TextBox 56">
+            <a:extLst>
+              <a:ext uri="{FF2B5EF4-FFF2-40B4-BE49-F238E27FC236}">
+                <a16:creationId xmlns="" xmlns:a16="http://schemas.microsoft.com/office/drawing/2014/main" id="{5E7F91F9-9726-764E-B1C6-BA00CBB7BED9}"/>
+              </a:ext>
+            </a:extLst>
+          </p:cNvPr>
+          <p:cNvSpPr txBox="1"/>
+          <p:nvPr/>
+        </p:nvSpPr>
+        <p:spPr>
+          <a:xfrm>
+            <a:off x="7331855" y="3839935"/>
+            <a:ext cx="1783362" cy="307777"/>
+          </a:xfrm>
+          <a:prstGeom prst="rect">
+            <a:avLst/>
+          </a:prstGeom>
+          <a:noFill/>
+        </p:spPr>
+        <p:txBody>
+          <a:bodyPr wrap="square" rtlCol="0">
+            <a:spAutoFit/>
+          </a:bodyPr>
+          <a:lstStyle/>
+          <a:p>
+            <a:r>
+              <a:rPr lang="en-US" sz="1400" b="1" dirty="0">
+                <a:latin typeface="Source Sans Pro" charset="0"/>
+                <a:ea typeface="Source Sans Pro" charset="0"/>
+                <a:cs typeface="Source Sans Pro" charset="0"/>
+              </a:rPr>
+              <a:t>GitHub Repository</a:t>
+            </a:r>
+          </a:p>
+        </p:txBody>
+      </p:sp>
+      <p:pic>
+        <p:nvPicPr>
+          <p:cNvPr id="58" name="Picture 57">
+            <a:extLst>
+              <a:ext uri="{FF2B5EF4-FFF2-40B4-BE49-F238E27FC236}">
+                <a16:creationId xmlns="" xmlns:a16="http://schemas.microsoft.com/office/drawing/2014/main" id="{F347593E-66C3-BD45-84FB-8FFEA19E6EEA}"/>
+              </a:ext>
+            </a:extLst>
+          </p:cNvPr>
+          <p:cNvPicPr>
+            <a:picLocks noChangeAspect="1"/>
+          </p:cNvPicPr>
+          <p:nvPr/>
+        </p:nvPicPr>
+        <p:blipFill>
+          <a:blip r:embed="rId9" cstate="print">
+            <a:extLst>
+              <a:ext uri="{28A0092B-C50C-407E-A947-70E740481C1C}">
+                <a14:useLocalDpi xmlns:a14="http://schemas.microsoft.com/office/drawing/2010/main" val="0"/>
+              </a:ext>
+            </a:extLst>
+          </a:blip>
+          <a:stretch>
+            <a:fillRect/>
+          </a:stretch>
+        </p:blipFill>
+        <p:spPr>
+          <a:xfrm>
+            <a:off x="9615554" y="3742262"/>
+            <a:ext cx="480575" cy="480575"/>
+          </a:xfrm>
+          <a:prstGeom prst="rect">
+            <a:avLst/>
+          </a:prstGeom>
+        </p:spPr>
+      </p:pic>
+      <p:sp>
+        <p:nvSpPr>
+          <p:cNvPr id="33" name="Rounded Rectangle 32">
+            <a:extLst>
+              <a:ext uri="{FF2B5EF4-FFF2-40B4-BE49-F238E27FC236}">
+                <a16:creationId xmlns="" xmlns:a16="http://schemas.microsoft.com/office/drawing/2014/main" id="{ABAC10A3-2F9D-8845-95D6-EA98A639CD92}"/>
+              </a:ext>
+            </a:extLst>
+          </p:cNvPr>
+          <p:cNvSpPr/>
+          <p:nvPr/>
+        </p:nvSpPr>
+        <p:spPr>
+          <a:xfrm>
+            <a:off x="7575324" y="1850335"/>
+            <a:ext cx="2280751" cy="498545"/>
+          </a:xfrm>
+          <a:prstGeom prst="roundRect">
+            <a:avLst>
+              <a:gd name="adj" fmla="val 50000"/>
+            </a:avLst>
+          </a:prstGeom>
+          <a:solidFill>
+            <a:schemeClr val="bg1"/>
+          </a:solidFill>
+          <a:ln w="12700">
+            <a:noFill/>
+          </a:ln>
+          <a:effectLst>
+            <a:outerShdw blurRad="101600" algn="ctr" rotWithShape="0">
+              <a:prstClr val="black">
+                <a:alpha val="20000"/>
+              </a:prstClr>
+            </a:outerShdw>
+          </a:effectLst>
+        </p:spPr>
+        <p:style>
+          <a:lnRef idx="2">
+            <a:schemeClr val="accent1">
+              <a:shade val="50000"/>
+            </a:schemeClr>
+          </a:lnRef>
+          <a:fillRef idx="1">
+            <a:schemeClr val="accent1"/>
+          </a:fillRef>
+          <a:effectRef idx="0">
+            <a:schemeClr val="accent1"/>
+          </a:effectRef>
+          <a:fontRef idx="minor">
+            <a:schemeClr val="lt1"/>
+          </a:fontRef>
+        </p:style>
+        <p:txBody>
+          <a:bodyPr rtlCol="0" anchor="ctr"/>
+          <a:lstStyle/>
+          <a:p>
+            <a:pPr algn="ctr"/>
+            <a:endParaRPr lang="en-US" dirty="0">
+              <a:latin typeface="Source Sans Pro" panose="020B0503030403020204" pitchFamily="34" charset="0"/>
+              <a:ea typeface="Source Sans Pro" panose="020B0503030403020204" pitchFamily="34" charset="0"/>
+            </a:endParaRPr>
+          </a:p>
+        </p:txBody>
+      </p:sp>
+      <p:sp>
+        <p:nvSpPr>
+          <p:cNvPr id="34" name="TextBox 33">
+            <a:extLst>
+              <a:ext uri="{FF2B5EF4-FFF2-40B4-BE49-F238E27FC236}">
+                <a16:creationId xmlns="" xmlns:a16="http://schemas.microsoft.com/office/drawing/2014/main" id="{67C95280-1B8D-1941-BF7A-21E0CE227DE4}"/>
+              </a:ext>
+            </a:extLst>
+          </p:cNvPr>
+          <p:cNvSpPr txBox="1"/>
+          <p:nvPr/>
+        </p:nvSpPr>
+        <p:spPr>
+          <a:xfrm>
+            <a:off x="8025575" y="1965903"/>
+            <a:ext cx="1963944" cy="307777"/>
           </a:xfrm>
           <a:prstGeom prst="rect">
             <a:avLst/>
@@ -4685,13 +5608,604 @@
                 <a:ea typeface="Source Sans Pro" charset="0"/>
                 <a:cs typeface="Source Sans Pro" charset="0"/>
               </a:rPr>
-              <a:t>Developer Repository</a:t>
+              <a:t>Module Repositories</a:t>
             </a:r>
             <a:endParaRPr lang="en-US" sz="1400" b="1" dirty="0">
               <a:latin typeface="Source Sans Pro" charset="0"/>
               <a:ea typeface="Source Sans Pro" charset="0"/>
               <a:cs typeface="Source Sans Pro" charset="0"/>
             </a:endParaRPr>
+          </a:p>
+        </p:txBody>
+      </p:sp>
+      <p:pic>
+        <p:nvPicPr>
+          <p:cNvPr id="35" name="Picture 34">
+            <a:extLst>
+              <a:ext uri="{FF2B5EF4-FFF2-40B4-BE49-F238E27FC236}">
+                <a16:creationId xmlns="" xmlns:a16="http://schemas.microsoft.com/office/drawing/2014/main" id="{4EA4C80E-71CE-6F43-AD4A-DABA38A275A2}"/>
+              </a:ext>
+            </a:extLst>
+          </p:cNvPr>
+          <p:cNvPicPr>
+            <a:picLocks noChangeAspect="1"/>
+          </p:cNvPicPr>
+          <p:nvPr/>
+        </p:nvPicPr>
+        <p:blipFill>
+          <a:blip r:embed="rId10" cstate="print">
+            <a:grayscl/>
+            <a:extLst>
+              <a:ext uri="{28A0092B-C50C-407E-A947-70E740481C1C}">
+                <a14:useLocalDpi xmlns:a14="http://schemas.microsoft.com/office/drawing/2010/main" val="0"/>
+              </a:ext>
+            </a:extLst>
+          </a:blip>
+          <a:stretch>
+            <a:fillRect/>
+          </a:stretch>
+        </p:blipFill>
+        <p:spPr>
+          <a:xfrm>
+            <a:off x="7644391" y="1922212"/>
+            <a:ext cx="370688" cy="351467"/>
+          </a:xfrm>
+          <a:prstGeom prst="rect">
+            <a:avLst/>
+          </a:prstGeom>
+        </p:spPr>
+      </p:pic>
+    </p:spTree>
+    <p:extLst>
+      <p:ext uri="{BB962C8B-B14F-4D97-AF65-F5344CB8AC3E}">
+        <p14:creationId xmlns:p14="http://schemas.microsoft.com/office/powerpoint/2010/main" val="1608610026"/>
+      </p:ext>
+    </p:extLst>
+  </p:cSld>
+  <p:clrMapOvr>
+    <a:masterClrMapping/>
+  </p:clrMapOvr>
+  <p:timing>
+    <p:tnLst>
+      <p:par>
+        <p:cTn id="1" dur="indefinite" restart="never" nodeType="tmRoot"/>
+      </p:par>
+    </p:tnLst>
+  </p:timing>
+</p:sld>
+</file>
+
+<file path=ppt/slides/slide2.xml><?xml version="1.0" encoding="utf-8"?>
+<p:sld xmlns:a="http://schemas.openxmlformats.org/drawingml/2006/main" xmlns:r="http://schemas.openxmlformats.org/officeDocument/2006/relationships" xmlns:p="http://schemas.openxmlformats.org/presentationml/2006/main">
+  <p:cSld>
+    <p:spTree>
+      <p:nvGrpSpPr>
+        <p:cNvPr id="1" name=""/>
+        <p:cNvGrpSpPr/>
+        <p:nvPr/>
+      </p:nvGrpSpPr>
+      <p:grpSpPr>
+        <a:xfrm>
+          <a:off x="0" y="0"/>
+          <a:ext cx="0" cy="0"/>
+          <a:chOff x="0" y="0"/>
+          <a:chExt cx="0" cy="0"/>
+        </a:xfrm>
+      </p:grpSpPr>
+      <p:sp>
+        <p:nvSpPr>
+          <p:cNvPr id="3" name="Title 2"/>
+          <p:cNvSpPr>
+            <a:spLocks noGrp="1"/>
+          </p:cNvSpPr>
+          <p:nvPr>
+            <p:ph type="title"/>
+          </p:nvPr>
+        </p:nvSpPr>
+        <p:spPr/>
+        <p:txBody>
+          <a:bodyPr/>
+          <a:lstStyle/>
+          <a:p>
+            <a:r>
+              <a:rPr lang="en-US" dirty="0" err="1" smtClean="0"/>
+              <a:t>Vrousseau</a:t>
+            </a:r>
+            <a:r>
+              <a:rPr lang="en-US" dirty="0" smtClean="0"/>
+              <a:t> v2</a:t>
+            </a:r>
+            <a:endParaRPr lang="en-US" dirty="0"/>
+          </a:p>
+        </p:txBody>
+      </p:sp>
+      <p:sp>
+        <p:nvSpPr>
+          <p:cNvPr id="2" name="Date Placeholder 1"/>
+          <p:cNvSpPr>
+            <a:spLocks noGrp="1"/>
+          </p:cNvSpPr>
+          <p:nvPr>
+            <p:ph type="dt" sz="half" idx="4294967295"/>
+          </p:nvPr>
+        </p:nvSpPr>
+        <p:spPr>
+          <a:xfrm>
+            <a:off x="10896600" y="6453188"/>
+            <a:ext cx="1295400" cy="144462"/>
+          </a:xfrm>
+        </p:spPr>
+        <p:txBody>
+          <a:bodyPr/>
+          <a:lstStyle/>
+          <a:p>
+            <a:fld id="{22DD8F49-BF83-0E4D-8954-2DA98C3220A2}" type="datetime6">
+              <a:rPr lang="fr-FR" smtClean="0"/>
+              <a:pPr/>
+              <a:t>avril 22</a:t>
+            </a:fld>
+            <a:endParaRPr lang="en-US" dirty="0"/>
+          </a:p>
+        </p:txBody>
+      </p:sp>
+    </p:spTree>
+    <p:extLst>
+      <p:ext uri="{BB962C8B-B14F-4D97-AF65-F5344CB8AC3E}">
+        <p14:creationId xmlns:p14="http://schemas.microsoft.com/office/powerpoint/2010/main" val="4036703023"/>
+      </p:ext>
+    </p:extLst>
+  </p:cSld>
+  <p:clrMapOvr>
+    <a:masterClrMapping/>
+  </p:clrMapOvr>
+</p:sld>
+</file>
+
+<file path=ppt/slides/slide3.xml><?xml version="1.0" encoding="utf-8"?>
+<p:sld xmlns:a="http://schemas.openxmlformats.org/drawingml/2006/main" xmlns:r="http://schemas.openxmlformats.org/officeDocument/2006/relationships" xmlns:p="http://schemas.openxmlformats.org/presentationml/2006/main">
+  <p:cSld>
+    <p:spTree>
+      <p:nvGrpSpPr>
+        <p:cNvPr id="1" name=""/>
+        <p:cNvGrpSpPr/>
+        <p:nvPr/>
+      </p:nvGrpSpPr>
+      <p:grpSpPr>
+        <a:xfrm>
+          <a:off x="0" y="0"/>
+          <a:ext cx="0" cy="0"/>
+          <a:chOff x="0" y="0"/>
+          <a:chExt cx="0" cy="0"/>
+        </a:xfrm>
+      </p:grpSpPr>
+      <p:sp>
+        <p:nvSpPr>
+          <p:cNvPr id="122" name="Rounded Rectangle 121"/>
+          <p:cNvSpPr/>
+          <p:nvPr/>
+        </p:nvSpPr>
+        <p:spPr>
+          <a:xfrm>
+            <a:off x="922655" y="548681"/>
+            <a:ext cx="3185731" cy="1440160"/>
+          </a:xfrm>
+          <a:prstGeom prst="roundRect">
+            <a:avLst>
+              <a:gd name="adj" fmla="val 7458"/>
+            </a:avLst>
+          </a:prstGeom>
+          <a:solidFill>
+            <a:schemeClr val="bg1"/>
+          </a:solidFill>
+          <a:ln w="12700">
+            <a:solidFill>
+              <a:schemeClr val="bg2"/>
+            </a:solidFill>
+          </a:ln>
+        </p:spPr>
+        <p:style>
+          <a:lnRef idx="2">
+            <a:schemeClr val="accent1">
+              <a:shade val="50000"/>
+            </a:schemeClr>
+          </a:lnRef>
+          <a:fillRef idx="1">
+            <a:schemeClr val="accent1"/>
+          </a:fillRef>
+          <a:effectRef idx="0">
+            <a:schemeClr val="accent1"/>
+          </a:effectRef>
+          <a:fontRef idx="minor">
+            <a:schemeClr val="lt1"/>
+          </a:fontRef>
+        </p:style>
+        <p:txBody>
+          <a:bodyPr rtlCol="0" anchor="ctr"/>
+          <a:lstStyle/>
+          <a:p>
+            <a:pPr algn="ctr"/>
+            <a:r>
+              <a:rPr lang="en-US"/>
+              <a:t>vz</a:t>
+            </a:r>
+            <a:endParaRPr lang="en-US" dirty="0"/>
+          </a:p>
+        </p:txBody>
+      </p:sp>
+      <p:sp>
+        <p:nvSpPr>
+          <p:cNvPr id="124" name="Rounded Rectangle 123"/>
+          <p:cNvSpPr/>
+          <p:nvPr/>
+        </p:nvSpPr>
+        <p:spPr>
+          <a:xfrm>
+            <a:off x="6098094" y="2365023"/>
+            <a:ext cx="2439630" cy="534063"/>
+          </a:xfrm>
+          <a:prstGeom prst="roundRect">
+            <a:avLst>
+              <a:gd name="adj" fmla="val 15733"/>
+            </a:avLst>
+          </a:prstGeom>
+          <a:solidFill>
+            <a:schemeClr val="bg1"/>
+          </a:solidFill>
+          <a:ln w="12700">
+            <a:solidFill>
+              <a:schemeClr val="bg2"/>
+            </a:solidFill>
+          </a:ln>
+        </p:spPr>
+        <p:style>
+          <a:lnRef idx="2">
+            <a:schemeClr val="accent1">
+              <a:shade val="50000"/>
+            </a:schemeClr>
+          </a:lnRef>
+          <a:fillRef idx="1">
+            <a:schemeClr val="accent1"/>
+          </a:fillRef>
+          <a:effectRef idx="0">
+            <a:schemeClr val="accent1"/>
+          </a:effectRef>
+          <a:fontRef idx="minor">
+            <a:schemeClr val="lt1"/>
+          </a:fontRef>
+        </p:style>
+        <p:txBody>
+          <a:bodyPr rtlCol="0" anchor="ctr"/>
+          <a:lstStyle/>
+          <a:p>
+            <a:pPr algn="ctr"/>
+            <a:endParaRPr lang="en-US" dirty="0"/>
+          </a:p>
+        </p:txBody>
+      </p:sp>
+      <p:sp>
+        <p:nvSpPr>
+          <p:cNvPr id="32" name="Rounded Rectangle 31"/>
+          <p:cNvSpPr/>
+          <p:nvPr/>
+        </p:nvSpPr>
+        <p:spPr>
+          <a:xfrm>
+            <a:off x="4358749" y="548680"/>
+            <a:ext cx="1449238" cy="1440161"/>
+          </a:xfrm>
+          <a:prstGeom prst="roundRect">
+            <a:avLst>
+              <a:gd name="adj" fmla="val 11341"/>
+            </a:avLst>
+          </a:prstGeom>
+          <a:solidFill>
+            <a:schemeClr val="bg1"/>
+          </a:solidFill>
+          <a:ln w="12700">
+            <a:solidFill>
+              <a:schemeClr val="bg2"/>
+            </a:solidFill>
+          </a:ln>
+        </p:spPr>
+        <p:style>
+          <a:lnRef idx="2">
+            <a:schemeClr val="accent1">
+              <a:shade val="50000"/>
+            </a:schemeClr>
+          </a:lnRef>
+          <a:fillRef idx="1">
+            <a:schemeClr val="accent1"/>
+          </a:fillRef>
+          <a:effectRef idx="0">
+            <a:schemeClr val="accent1"/>
+          </a:effectRef>
+          <a:fontRef idx="minor">
+            <a:schemeClr val="lt1"/>
+          </a:fontRef>
+        </p:style>
+        <p:txBody>
+          <a:bodyPr rtlCol="0" anchor="ctr"/>
+          <a:lstStyle/>
+          <a:p>
+            <a:pPr algn="ctr"/>
+            <a:r>
+              <a:rPr lang="en-US"/>
+              <a:t>vz</a:t>
+            </a:r>
+            <a:endParaRPr lang="en-US" dirty="0"/>
+          </a:p>
+        </p:txBody>
+      </p:sp>
+      <p:sp>
+        <p:nvSpPr>
+          <p:cNvPr id="115" name="Rounded Rectangle 114"/>
+          <p:cNvSpPr/>
+          <p:nvPr/>
+        </p:nvSpPr>
+        <p:spPr>
+          <a:xfrm>
+            <a:off x="6100947" y="1544227"/>
+            <a:ext cx="2435650" cy="679909"/>
+          </a:xfrm>
+          <a:prstGeom prst="roundRect">
+            <a:avLst>
+              <a:gd name="adj" fmla="val 15733"/>
+            </a:avLst>
+          </a:prstGeom>
+          <a:solidFill>
+            <a:schemeClr val="bg1"/>
+          </a:solidFill>
+          <a:ln w="12700">
+            <a:solidFill>
+              <a:schemeClr val="bg2"/>
+            </a:solidFill>
+          </a:ln>
+        </p:spPr>
+        <p:style>
+          <a:lnRef idx="2">
+            <a:schemeClr val="accent1">
+              <a:shade val="50000"/>
+            </a:schemeClr>
+          </a:lnRef>
+          <a:fillRef idx="1">
+            <a:schemeClr val="accent1"/>
+          </a:fillRef>
+          <a:effectRef idx="0">
+            <a:schemeClr val="accent1"/>
+          </a:effectRef>
+          <a:fontRef idx="minor">
+            <a:schemeClr val="lt1"/>
+          </a:fontRef>
+        </p:style>
+        <p:txBody>
+          <a:bodyPr rtlCol="0" anchor="ctr"/>
+          <a:lstStyle/>
+          <a:p>
+            <a:pPr algn="ctr"/>
+            <a:r>
+              <a:rPr lang="en-US"/>
+              <a:t>vz</a:t>
+            </a:r>
+            <a:endParaRPr lang="en-US" dirty="0"/>
+          </a:p>
+        </p:txBody>
+      </p:sp>
+      <p:sp>
+        <p:nvSpPr>
+          <p:cNvPr id="62" name="Rounded Rectangle 61"/>
+          <p:cNvSpPr/>
+          <p:nvPr/>
+        </p:nvSpPr>
+        <p:spPr>
+          <a:xfrm>
+            <a:off x="6098094" y="708677"/>
+            <a:ext cx="2460363" cy="735378"/>
+          </a:xfrm>
+          <a:prstGeom prst="roundRect">
+            <a:avLst>
+              <a:gd name="adj" fmla="val 15733"/>
+            </a:avLst>
+          </a:prstGeom>
+          <a:solidFill>
+            <a:schemeClr val="bg1"/>
+          </a:solidFill>
+          <a:ln w="12700">
+            <a:solidFill>
+              <a:schemeClr val="bg2"/>
+            </a:solidFill>
+          </a:ln>
+        </p:spPr>
+        <p:style>
+          <a:lnRef idx="2">
+            <a:schemeClr val="accent1">
+              <a:shade val="50000"/>
+            </a:schemeClr>
+          </a:lnRef>
+          <a:fillRef idx="1">
+            <a:schemeClr val="accent1"/>
+          </a:fillRef>
+          <a:effectRef idx="0">
+            <a:schemeClr val="accent1"/>
+          </a:effectRef>
+          <a:fontRef idx="minor">
+            <a:schemeClr val="lt1"/>
+          </a:fontRef>
+        </p:style>
+        <p:txBody>
+          <a:bodyPr rtlCol="0" anchor="ctr"/>
+          <a:lstStyle/>
+          <a:p>
+            <a:pPr algn="ctr"/>
+            <a:r>
+              <a:rPr lang="en-US"/>
+              <a:t>vz</a:t>
+            </a:r>
+            <a:endParaRPr lang="en-US" dirty="0"/>
+          </a:p>
+        </p:txBody>
+      </p:sp>
+      <p:sp>
+        <p:nvSpPr>
+          <p:cNvPr id="61" name="Rounded Rectangle 60"/>
+          <p:cNvSpPr/>
+          <p:nvPr/>
+        </p:nvSpPr>
+        <p:spPr>
+          <a:xfrm>
+            <a:off x="1662314" y="2522063"/>
+            <a:ext cx="3301138" cy="530958"/>
+          </a:xfrm>
+          <a:prstGeom prst="roundRect">
+            <a:avLst>
+              <a:gd name="adj" fmla="val 14031"/>
+            </a:avLst>
+          </a:prstGeom>
+          <a:solidFill>
+            <a:schemeClr val="bg1"/>
+          </a:solidFill>
+          <a:ln w="12700">
+            <a:solidFill>
+              <a:schemeClr val="bg2"/>
+            </a:solidFill>
+          </a:ln>
+        </p:spPr>
+        <p:style>
+          <a:lnRef idx="2">
+            <a:schemeClr val="accent1">
+              <a:shade val="50000"/>
+            </a:schemeClr>
+          </a:lnRef>
+          <a:fillRef idx="1">
+            <a:schemeClr val="accent1"/>
+          </a:fillRef>
+          <a:effectRef idx="0">
+            <a:schemeClr val="accent1"/>
+          </a:effectRef>
+          <a:fontRef idx="minor">
+            <a:schemeClr val="lt1"/>
+          </a:fontRef>
+        </p:style>
+        <p:txBody>
+          <a:bodyPr rtlCol="0" anchor="ctr"/>
+          <a:lstStyle/>
+          <a:p>
+            <a:pPr algn="ctr"/>
+            <a:r>
+              <a:rPr lang="en-US" dirty="0"/>
+              <a:t>z</a:t>
+            </a:r>
+          </a:p>
+        </p:txBody>
+      </p:sp>
+      <p:sp>
+        <p:nvSpPr>
+          <p:cNvPr id="78" name="TextBox 77"/>
+          <p:cNvSpPr txBox="1"/>
+          <p:nvPr/>
+        </p:nvSpPr>
+        <p:spPr>
+          <a:xfrm>
+            <a:off x="6167302" y="786535"/>
+            <a:ext cx="1931600" cy="307777"/>
+          </a:xfrm>
+          <a:prstGeom prst="rect">
+            <a:avLst/>
+          </a:prstGeom>
+          <a:noFill/>
+        </p:spPr>
+        <p:txBody>
+          <a:bodyPr wrap="square" rtlCol="0">
+            <a:spAutoFit/>
+          </a:bodyPr>
+          <a:lstStyle/>
+          <a:p>
+            <a:r>
+              <a:rPr lang="en-US" sz="1400" b="1" dirty="0">
+                <a:latin typeface="Source Sans Pro" charset="0"/>
+                <a:ea typeface="Source Sans Pro" charset="0"/>
+                <a:cs typeface="Source Sans Pro" charset="0"/>
+              </a:rPr>
+              <a:t>Central Repository</a:t>
+            </a:r>
+          </a:p>
+        </p:txBody>
+      </p:sp>
+      <p:sp>
+        <p:nvSpPr>
+          <p:cNvPr id="75" name="TextBox 74"/>
+          <p:cNvSpPr txBox="1"/>
+          <p:nvPr/>
+        </p:nvSpPr>
+        <p:spPr>
+          <a:xfrm>
+            <a:off x="1730758" y="2588359"/>
+            <a:ext cx="2260852" cy="307777"/>
+          </a:xfrm>
+          <a:prstGeom prst="rect">
+            <a:avLst/>
+          </a:prstGeom>
+          <a:noFill/>
+        </p:spPr>
+        <p:txBody>
+          <a:bodyPr wrap="square" rtlCol="0">
+            <a:spAutoFit/>
+          </a:bodyPr>
+          <a:lstStyle>
+            <a:defPPr>
+              <a:defRPr lang="en-US"/>
+            </a:defPPr>
+            <a:lvl1pPr algn="ctr">
+              <a:defRPr sz="1400">
+                <a:latin typeface="Source Sans Pro" charset="0"/>
+                <a:ea typeface="Source Sans Pro" charset="0"/>
+                <a:cs typeface="Source Sans Pro" charset="0"/>
+              </a:defRPr>
+            </a:lvl1pPr>
+          </a:lstStyle>
+          <a:p>
+            <a:r>
+              <a:rPr lang="en-US" b="1" dirty="0"/>
+              <a:t>SDK Distribution </a:t>
+            </a:r>
+            <a:r>
+              <a:rPr lang="en-US" b="1" dirty="0">
+                <a:latin typeface="Consolas" panose="020B0609020204030204" pitchFamily="49" charset="0"/>
+              </a:rPr>
+              <a:t>YY.MM</a:t>
+            </a:r>
+          </a:p>
+        </p:txBody>
+      </p:sp>
+      <p:sp>
+        <p:nvSpPr>
+          <p:cNvPr id="84" name="TextBox 83"/>
+          <p:cNvSpPr txBox="1"/>
+          <p:nvPr/>
+        </p:nvSpPr>
+        <p:spPr>
+          <a:xfrm>
+            <a:off x="6142836" y="1651836"/>
+            <a:ext cx="1909130" cy="307777"/>
+          </a:xfrm>
+          <a:prstGeom prst="rect">
+            <a:avLst/>
+          </a:prstGeom>
+          <a:noFill/>
+        </p:spPr>
+        <p:txBody>
+          <a:bodyPr wrap="square" rtlCol="0">
+            <a:spAutoFit/>
+          </a:bodyPr>
+          <a:lstStyle/>
+          <a:p>
+            <a:r>
+              <a:rPr lang="en-US" sz="1400" b="1" dirty="0">
+                <a:latin typeface="Source Sans Pro" charset="0"/>
+                <a:ea typeface="Source Sans Pro" charset="0"/>
+                <a:cs typeface="Source Sans Pro" charset="0"/>
+              </a:rPr>
+              <a:t>Developer Repository</a:t>
+            </a:r>
           </a:p>
         </p:txBody>
       </p:sp>
@@ -4724,23 +6238,8 @@
                 </a:solidFill>
                 <a:latin typeface="Consolas" panose="020B0609020204030204" pitchFamily="49" charset="0"/>
               </a:rPr>
-              <a:t>MICROEJ SDK </a:t>
-            </a:r>
-            <a:r>
-              <a:rPr lang="en-US" sz="1000" dirty="0" smtClean="0">
-                <a:solidFill>
-                  <a:schemeClr val="accent1"/>
-                </a:solidFill>
-                <a:latin typeface="Consolas" panose="020B0609020204030204" pitchFamily="49" charset="0"/>
-              </a:rPr>
-              <a:t>End User License Agreement (EULA)</a:t>
-            </a:r>
-            <a:endParaRPr lang="en-US" sz="1000" dirty="0">
-              <a:solidFill>
-                <a:schemeClr val="accent1"/>
-              </a:solidFill>
-              <a:latin typeface="Consolas" panose="020B0609020204030204" pitchFamily="49" charset="0"/>
-            </a:endParaRPr>
+              <a:t>MICROEJ SDK End User License Agreement (EULA)</a:t>
+            </a:r>
           </a:p>
         </p:txBody>
       </p:sp>
@@ -4791,18 +6290,13 @@
           <a:lstStyle/>
           <a:p>
             <a:r>
-              <a:rPr lang="en-US" sz="1400" b="1" dirty="0" smtClean="0">
+              <a:rPr lang="en-US" sz="1400" b="1" dirty="0">
                 <a:latin typeface="Source Sans Pro" charset="0"/>
                 <a:ea typeface="Source Sans Pro" charset="0"/>
                 <a:cs typeface="Source Sans Pro" charset="0"/>
               </a:rPr>
               <a:t>GitHub Repository</a:t>
             </a:r>
-            <a:endParaRPr lang="en-US" sz="1400" b="1" dirty="0">
-              <a:latin typeface="Source Sans Pro" charset="0"/>
-              <a:ea typeface="Source Sans Pro" charset="0"/>
-              <a:cs typeface="Source Sans Pro" charset="0"/>
-            </a:endParaRPr>
           </a:p>
         </p:txBody>
       </p:sp>
@@ -4888,7 +6382,7 @@
           <a:p>
             <a:pPr algn="ctr"/>
             <a:r>
-              <a:rPr lang="en-US" sz="1400" b="1" dirty="0" smtClean="0">
+              <a:rPr lang="en-US" sz="1400" b="1" dirty="0">
                 <a:latin typeface="Source Sans Pro" charset="0"/>
                 <a:ea typeface="Source Sans Pro" charset="0"/>
                 <a:cs typeface="Source Sans Pro" charset="0"/>
@@ -4896,18 +6390,13 @@
               <a:t>SDK Version </a:t>
             </a:r>
             <a:r>
-              <a:rPr lang="en-US" sz="1400" b="1" dirty="0" smtClean="0">
+              <a:rPr lang="en-US" sz="1400" b="1" dirty="0">
                 <a:latin typeface="Consolas" panose="020B0609020204030204" pitchFamily="49" charset="0"/>
                 <a:ea typeface="Source Sans Pro" charset="0"/>
                 <a:cs typeface="Source Sans Pro" charset="0"/>
               </a:rPr>
               <a:t>5.m.p</a:t>
             </a:r>
-            <a:endParaRPr lang="en-US" sz="1400" b="1" dirty="0">
-              <a:latin typeface="Consolas" panose="020B0609020204030204" pitchFamily="49" charset="0"/>
-              <a:ea typeface="Source Sans Pro" charset="0"/>
-              <a:cs typeface="Source Sans Pro" charset="0"/>
-            </a:endParaRPr>
           </a:p>
         </p:txBody>
       </p:sp>
@@ -4958,7 +6447,7 @@
           <a:lstStyle/>
           <a:p>
             <a:r>
-              <a:rPr lang="en-US" sz="1400" dirty="0" smtClean="0">
+              <a:rPr lang="en-US" sz="1400" dirty="0">
                 <a:latin typeface="Source Sans Pro" charset="0"/>
                 <a:ea typeface="Source Sans Pro" charset="0"/>
                 <a:cs typeface="Source Sans Pro" charset="0"/>
@@ -5013,10 +6502,9 @@
           <a:p>
             <a:pPr algn="ctr"/>
             <a:r>
-              <a:rPr lang="en-US" dirty="0" smtClean="0"/>
+              <a:rPr lang="en-US" dirty="0"/>
               <a:t>z</a:t>
             </a:r>
-            <a:endParaRPr lang="en-US" dirty="0"/>
           </a:p>
         </p:txBody>
       </p:sp>
@@ -5025,7 +6513,7 @@
           <p:cNvPr id="30" name="Picture 29">
             <a:extLst>
               <a:ext uri="{FF2B5EF4-FFF2-40B4-BE49-F238E27FC236}">
-                <a16:creationId xmlns:a16="http://schemas.microsoft.com/office/drawing/2014/main" xmlns="" id="{72176D6D-182A-4BB5-8EA3-0ACC3EEFD101}"/>
+                <a16:creationId xmlns="" xmlns:a16="http://schemas.microsoft.com/office/drawing/2014/main" id="{72176D6D-182A-4BB5-8EA3-0ACC3EEFD101}"/>
               </a:ext>
             </a:extLst>
           </p:cNvPr>
@@ -5129,18 +6617,13 @@
           <a:p>
             <a:pPr algn="ctr"/>
             <a:r>
-              <a:rPr lang="en-US" sz="1400" b="1" dirty="0" smtClean="0">
+              <a:rPr lang="en-US" sz="1400" b="1" dirty="0">
                 <a:latin typeface="Source Sans Pro" charset="0"/>
                 <a:ea typeface="Source Sans Pro" charset="0"/>
                 <a:cs typeface="Source Sans Pro" charset="0"/>
               </a:rPr>
               <a:t>Architecture</a:t>
             </a:r>
-            <a:endParaRPr lang="en-US" sz="1400" b="1" dirty="0">
-              <a:latin typeface="Source Sans Pro" charset="0"/>
-              <a:ea typeface="Source Sans Pro" charset="0"/>
-              <a:cs typeface="Source Sans Pro" charset="0"/>
-            </a:endParaRPr>
           </a:p>
         </p:txBody>
       </p:sp>
@@ -5267,7 +6750,7 @@
         <p:spPr>
           <a:xfrm>
             <a:off x="6160663" y="969333"/>
-            <a:ext cx="2423178" cy="298864"/>
+            <a:ext cx="2423178" cy="303929"/>
           </a:xfrm>
           <a:prstGeom prst="rect">
             <a:avLst/>
@@ -5300,22 +6783,9 @@
               <a:buNone/>
             </a:pPr>
             <a:r>
-              <a:rPr lang="en-US" i="1" dirty="0" smtClean="0"/>
-              <a:t>Modules with </a:t>
-            </a:r>
-            <a:r>
-              <a:rPr lang="en-US" i="1" dirty="0" smtClean="0"/>
-              <a:t>SDK </a:t>
-            </a:r>
-            <a:r>
               <a:rPr lang="en-US" i="1" dirty="0"/>
-              <a:t>EULA </a:t>
-            </a:r>
-            <a:r>
-              <a:rPr lang="en-US" i="1" dirty="0" smtClean="0"/>
-              <a:t>License</a:t>
-            </a:r>
-            <a:endParaRPr lang="en-US" i="1" dirty="0" smtClean="0"/>
+              <a:t>Modules awith SDK EULA License</a:t>
+            </a:r>
           </a:p>
         </p:txBody>
       </p:sp>
@@ -5329,13 +6799,1503 @@
   <p:clrMapOvr>
     <a:masterClrMapping/>
   </p:clrMapOvr>
-  <p:timing>
-    <p:tnLst>
-      <p:par>
-        <p:cTn id="1" dur="indefinite" restart="never" nodeType="tmRoot"/>
-      </p:par>
-    </p:tnLst>
-  </p:timing>
+</p:sld>
+</file>
+
+<file path=ppt/slides/slide4.xml><?xml version="1.0" encoding="utf-8"?>
+<p:sld xmlns:a="http://schemas.openxmlformats.org/drawingml/2006/main" xmlns:r="http://schemas.openxmlformats.org/officeDocument/2006/relationships" xmlns:p="http://schemas.openxmlformats.org/presentationml/2006/main">
+  <p:cSld>
+    <p:spTree>
+      <p:nvGrpSpPr>
+        <p:cNvPr id="1" name=""/>
+        <p:cNvGrpSpPr/>
+        <p:nvPr/>
+      </p:nvGrpSpPr>
+      <p:grpSpPr>
+        <a:xfrm>
+          <a:off x="0" y="0"/>
+          <a:ext cx="0" cy="0"/>
+          <a:chOff x="0" y="0"/>
+          <a:chExt cx="0" cy="0"/>
+        </a:xfrm>
+      </p:grpSpPr>
+      <p:sp>
+        <p:nvSpPr>
+          <p:cNvPr id="3" name="Title 2"/>
+          <p:cNvSpPr>
+            <a:spLocks noGrp="1"/>
+          </p:cNvSpPr>
+          <p:nvPr>
+            <p:ph type="title"/>
+          </p:nvPr>
+        </p:nvSpPr>
+        <p:spPr/>
+        <p:txBody>
+          <a:bodyPr/>
+          <a:lstStyle/>
+          <a:p>
+            <a:r>
+              <a:rPr lang="en-US" dirty="0" err="1" smtClean="0"/>
+              <a:t>Friviere</a:t>
+            </a:r>
+            <a:r>
+              <a:rPr lang="en-US" dirty="0" smtClean="0"/>
+              <a:t> original</a:t>
+            </a:r>
+            <a:endParaRPr lang="en-US" dirty="0"/>
+          </a:p>
+        </p:txBody>
+      </p:sp>
+      <p:sp>
+        <p:nvSpPr>
+          <p:cNvPr id="2" name="Date Placeholder 1"/>
+          <p:cNvSpPr>
+            <a:spLocks noGrp="1"/>
+          </p:cNvSpPr>
+          <p:nvPr>
+            <p:ph type="dt" sz="half" idx="4294967295"/>
+          </p:nvPr>
+        </p:nvSpPr>
+        <p:spPr>
+          <a:xfrm>
+            <a:off x="10896600" y="6453188"/>
+            <a:ext cx="1295400" cy="144462"/>
+          </a:xfrm>
+        </p:spPr>
+        <p:txBody>
+          <a:bodyPr/>
+          <a:lstStyle/>
+          <a:p>
+            <a:fld id="{22DD8F49-BF83-0E4D-8954-2DA98C3220A2}" type="datetime6">
+              <a:rPr lang="fr-FR" smtClean="0"/>
+              <a:pPr/>
+              <a:t>avril 22</a:t>
+            </a:fld>
+            <a:endParaRPr lang="en-US" dirty="0"/>
+          </a:p>
+        </p:txBody>
+      </p:sp>
+    </p:spTree>
+    <p:extLst>
+      <p:ext uri="{BB962C8B-B14F-4D97-AF65-F5344CB8AC3E}">
+        <p14:creationId xmlns:p14="http://schemas.microsoft.com/office/powerpoint/2010/main" val="1941865368"/>
+      </p:ext>
+    </p:extLst>
+  </p:cSld>
+  <p:clrMapOvr>
+    <a:masterClrMapping/>
+  </p:clrMapOvr>
+</p:sld>
+</file>
+
+<file path=ppt/slides/slide5.xml><?xml version="1.0" encoding="utf-8"?>
+<p:sld xmlns:a="http://schemas.openxmlformats.org/drawingml/2006/main" xmlns:r="http://schemas.openxmlformats.org/officeDocument/2006/relationships" xmlns:p="http://schemas.openxmlformats.org/presentationml/2006/main">
+  <p:cSld>
+    <p:spTree>
+      <p:nvGrpSpPr>
+        <p:cNvPr id="1" name=""/>
+        <p:cNvGrpSpPr/>
+        <p:nvPr/>
+      </p:nvGrpSpPr>
+      <p:grpSpPr>
+        <a:xfrm>
+          <a:off x="0" y="0"/>
+          <a:ext cx="0" cy="0"/>
+          <a:chOff x="0" y="0"/>
+          <a:chExt cx="0" cy="0"/>
+        </a:xfrm>
+      </p:grpSpPr>
+      <p:sp>
+        <p:nvSpPr>
+          <p:cNvPr id="65" name="Rounded Rectangle 64">
+            <a:extLst>
+              <a:ext uri="{FF2B5EF4-FFF2-40B4-BE49-F238E27FC236}">
+                <a16:creationId xmlns="" xmlns:a16="http://schemas.microsoft.com/office/drawing/2014/main" id="{68B161DF-0B04-DA43-8872-F08463775AF3}"/>
+              </a:ext>
+            </a:extLst>
+          </p:cNvPr>
+          <p:cNvSpPr/>
+          <p:nvPr/>
+        </p:nvSpPr>
+        <p:spPr>
+          <a:xfrm>
+            <a:off x="7704473" y="2099139"/>
+            <a:ext cx="3354992" cy="2295210"/>
+          </a:xfrm>
+          <a:prstGeom prst="roundRect">
+            <a:avLst>
+              <a:gd name="adj" fmla="val 5167"/>
+            </a:avLst>
+          </a:prstGeom>
+          <a:solidFill>
+            <a:schemeClr val="bg1"/>
+          </a:solidFill>
+          <a:ln w="12700">
+            <a:noFill/>
+          </a:ln>
+          <a:effectLst>
+            <a:outerShdw blurRad="101600" algn="ctr" rotWithShape="0">
+              <a:prstClr val="black">
+                <a:alpha val="20000"/>
+              </a:prstClr>
+            </a:outerShdw>
+          </a:effectLst>
+        </p:spPr>
+        <p:style>
+          <a:lnRef idx="2">
+            <a:schemeClr val="accent1">
+              <a:shade val="50000"/>
+            </a:schemeClr>
+          </a:lnRef>
+          <a:fillRef idx="1">
+            <a:schemeClr val="accent1"/>
+          </a:fillRef>
+          <a:effectRef idx="0">
+            <a:schemeClr val="accent1"/>
+          </a:effectRef>
+          <a:fontRef idx="minor">
+            <a:schemeClr val="lt1"/>
+          </a:fontRef>
+        </p:style>
+        <p:txBody>
+          <a:bodyPr rtlCol="0" anchor="ctr"/>
+          <a:lstStyle/>
+          <a:p>
+            <a:pPr algn="ctr"/>
+            <a:endParaRPr lang="en-US" dirty="0">
+              <a:latin typeface="Source Sans Pro" panose="020B0503030403020204" pitchFamily="34" charset="0"/>
+              <a:ea typeface="Source Sans Pro" panose="020B0503030403020204" pitchFamily="34" charset="0"/>
+            </a:endParaRPr>
+          </a:p>
+        </p:txBody>
+      </p:sp>
+      <p:grpSp>
+        <p:nvGrpSpPr>
+          <p:cNvPr id="2" name="Group 1">
+            <a:extLst>
+              <a:ext uri="{FF2B5EF4-FFF2-40B4-BE49-F238E27FC236}">
+                <a16:creationId xmlns="" xmlns:a16="http://schemas.microsoft.com/office/drawing/2014/main" id="{6E5AB0B8-F4F9-BA4C-9369-31091AF1F911}"/>
+              </a:ext>
+            </a:extLst>
+          </p:cNvPr>
+          <p:cNvGrpSpPr/>
+          <p:nvPr/>
+        </p:nvGrpSpPr>
+        <p:grpSpPr>
+          <a:xfrm>
+            <a:off x="7841107" y="2375030"/>
+            <a:ext cx="3088402" cy="1907224"/>
+            <a:chOff x="7636455" y="1452709"/>
+            <a:chExt cx="3088402" cy="2140548"/>
+          </a:xfrm>
+        </p:grpSpPr>
+        <p:sp>
+          <p:nvSpPr>
+            <p:cNvPr id="50" name="Rounded Rectangle 49">
+              <a:extLst>
+                <a:ext uri="{FF2B5EF4-FFF2-40B4-BE49-F238E27FC236}">
+                  <a16:creationId xmlns="" xmlns:a16="http://schemas.microsoft.com/office/drawing/2014/main" id="{133BFD67-88E8-9540-86B6-8FFA8E76734A}"/>
+                </a:ext>
+              </a:extLst>
+            </p:cNvPr>
+            <p:cNvSpPr/>
+            <p:nvPr/>
+          </p:nvSpPr>
+          <p:spPr>
+            <a:xfrm>
+              <a:off x="7636455" y="2192448"/>
+              <a:ext cx="3088402" cy="661070"/>
+            </a:xfrm>
+            <a:prstGeom prst="roundRect">
+              <a:avLst>
+                <a:gd name="adj" fmla="val 8907"/>
+              </a:avLst>
+            </a:prstGeom>
+            <a:solidFill>
+              <a:schemeClr val="bg1"/>
+            </a:solidFill>
+            <a:ln w="12700">
+              <a:solidFill>
+                <a:schemeClr val="bg2"/>
+              </a:solidFill>
+            </a:ln>
+          </p:spPr>
+          <p:style>
+            <a:lnRef idx="2">
+              <a:schemeClr val="accent1">
+                <a:shade val="50000"/>
+              </a:schemeClr>
+            </a:lnRef>
+            <a:fillRef idx="1">
+              <a:schemeClr val="accent1"/>
+            </a:fillRef>
+            <a:effectRef idx="0">
+              <a:schemeClr val="accent1"/>
+            </a:effectRef>
+            <a:fontRef idx="minor">
+              <a:schemeClr val="lt1"/>
+            </a:fontRef>
+          </p:style>
+          <p:txBody>
+            <a:bodyPr rtlCol="0" anchor="ctr"/>
+            <a:lstStyle/>
+            <a:p>
+              <a:pPr algn="ctr"/>
+              <a:endParaRPr lang="en-US" dirty="0">
+                <a:latin typeface="Source Sans Pro" panose="020B0503030403020204" pitchFamily="34" charset="0"/>
+                <a:ea typeface="Source Sans Pro" panose="020B0503030403020204" pitchFamily="34" charset="0"/>
+              </a:endParaRPr>
+            </a:p>
+          </p:txBody>
+        </p:sp>
+        <p:sp>
+          <p:nvSpPr>
+            <p:cNvPr id="54" name="Rounded Rectangle 53">
+              <a:extLst>
+                <a:ext uri="{FF2B5EF4-FFF2-40B4-BE49-F238E27FC236}">
+                  <a16:creationId xmlns="" xmlns:a16="http://schemas.microsoft.com/office/drawing/2014/main" id="{0FF18F5A-C793-934C-8AEF-05C54219B54D}"/>
+                </a:ext>
+              </a:extLst>
+            </p:cNvPr>
+            <p:cNvSpPr/>
+            <p:nvPr/>
+          </p:nvSpPr>
+          <p:spPr>
+            <a:xfrm>
+              <a:off x="7636455" y="1452709"/>
+              <a:ext cx="3088402" cy="661070"/>
+            </a:xfrm>
+            <a:prstGeom prst="roundRect">
+              <a:avLst>
+                <a:gd name="adj" fmla="val 8907"/>
+              </a:avLst>
+            </a:prstGeom>
+            <a:solidFill>
+              <a:schemeClr val="bg1"/>
+            </a:solidFill>
+            <a:ln w="12700">
+              <a:solidFill>
+                <a:schemeClr val="bg2"/>
+              </a:solidFill>
+            </a:ln>
+          </p:spPr>
+          <p:style>
+            <a:lnRef idx="2">
+              <a:schemeClr val="accent1">
+                <a:shade val="50000"/>
+              </a:schemeClr>
+            </a:lnRef>
+            <a:fillRef idx="1">
+              <a:schemeClr val="accent1"/>
+            </a:fillRef>
+            <a:effectRef idx="0">
+              <a:schemeClr val="accent1"/>
+            </a:effectRef>
+            <a:fontRef idx="minor">
+              <a:schemeClr val="lt1"/>
+            </a:fontRef>
+          </p:style>
+          <p:txBody>
+            <a:bodyPr rtlCol="0" anchor="ctr"/>
+            <a:lstStyle/>
+            <a:p>
+              <a:pPr algn="ctr"/>
+              <a:endParaRPr lang="en-US" dirty="0">
+                <a:latin typeface="Source Sans Pro" panose="020B0503030403020204" pitchFamily="34" charset="0"/>
+                <a:ea typeface="Source Sans Pro" panose="020B0503030403020204" pitchFamily="34" charset="0"/>
+              </a:endParaRPr>
+            </a:p>
+          </p:txBody>
+        </p:sp>
+        <p:sp>
+          <p:nvSpPr>
+            <p:cNvPr id="53" name="Rounded Rectangle 52">
+              <a:extLst>
+                <a:ext uri="{FF2B5EF4-FFF2-40B4-BE49-F238E27FC236}">
+                  <a16:creationId xmlns="" xmlns:a16="http://schemas.microsoft.com/office/drawing/2014/main" id="{3FCE6755-151F-1A4C-B97A-DC3A68CDAFCB}"/>
+                </a:ext>
+              </a:extLst>
+            </p:cNvPr>
+            <p:cNvSpPr/>
+            <p:nvPr/>
+          </p:nvSpPr>
+          <p:spPr>
+            <a:xfrm>
+              <a:off x="7636455" y="2932187"/>
+              <a:ext cx="3088402" cy="661070"/>
+            </a:xfrm>
+            <a:prstGeom prst="roundRect">
+              <a:avLst>
+                <a:gd name="adj" fmla="val 8907"/>
+              </a:avLst>
+            </a:prstGeom>
+            <a:solidFill>
+              <a:schemeClr val="bg1"/>
+            </a:solidFill>
+            <a:ln w="12700">
+              <a:solidFill>
+                <a:schemeClr val="bg2"/>
+              </a:solidFill>
+            </a:ln>
+          </p:spPr>
+          <p:style>
+            <a:lnRef idx="2">
+              <a:schemeClr val="accent1">
+                <a:shade val="50000"/>
+              </a:schemeClr>
+            </a:lnRef>
+            <a:fillRef idx="1">
+              <a:schemeClr val="accent1"/>
+            </a:fillRef>
+            <a:effectRef idx="0">
+              <a:schemeClr val="accent1"/>
+            </a:effectRef>
+            <a:fontRef idx="minor">
+              <a:schemeClr val="lt1"/>
+            </a:fontRef>
+          </p:style>
+          <p:txBody>
+            <a:bodyPr rtlCol="0" anchor="ctr"/>
+            <a:lstStyle/>
+            <a:p>
+              <a:pPr algn="ctr"/>
+              <a:endParaRPr lang="en-US" dirty="0">
+                <a:latin typeface="Source Sans Pro" panose="020B0503030403020204" pitchFamily="34" charset="0"/>
+                <a:ea typeface="Source Sans Pro" panose="020B0503030403020204" pitchFamily="34" charset="0"/>
+              </a:endParaRPr>
+            </a:p>
+          </p:txBody>
+        </p:sp>
+      </p:grpSp>
+      <p:sp>
+        <p:nvSpPr>
+          <p:cNvPr id="51" name="Rounded Rectangle 50">
+            <a:extLst>
+              <a:ext uri="{FF2B5EF4-FFF2-40B4-BE49-F238E27FC236}">
+                <a16:creationId xmlns="" xmlns:a16="http://schemas.microsoft.com/office/drawing/2014/main" id="{F6B18FC4-0EC2-D842-9F91-793486EBD6C6}"/>
+              </a:ext>
+            </a:extLst>
+          </p:cNvPr>
+          <p:cNvSpPr/>
+          <p:nvPr/>
+        </p:nvSpPr>
+        <p:spPr>
+          <a:xfrm>
+            <a:off x="1001065" y="2099138"/>
+            <a:ext cx="3433965" cy="2424200"/>
+          </a:xfrm>
+          <a:prstGeom prst="roundRect">
+            <a:avLst>
+              <a:gd name="adj" fmla="val 5167"/>
+            </a:avLst>
+          </a:prstGeom>
+          <a:solidFill>
+            <a:schemeClr val="tx2">
+              <a:lumMod val="20000"/>
+              <a:lumOff val="80000"/>
+            </a:schemeClr>
+          </a:solidFill>
+          <a:ln w="12700">
+            <a:solidFill>
+              <a:schemeClr val="bg2"/>
+            </a:solidFill>
+          </a:ln>
+        </p:spPr>
+        <p:style>
+          <a:lnRef idx="2">
+            <a:schemeClr val="accent1">
+              <a:shade val="50000"/>
+            </a:schemeClr>
+          </a:lnRef>
+          <a:fillRef idx="1">
+            <a:schemeClr val="accent1"/>
+          </a:fillRef>
+          <a:effectRef idx="0">
+            <a:schemeClr val="accent1"/>
+          </a:effectRef>
+          <a:fontRef idx="minor">
+            <a:schemeClr val="lt1"/>
+          </a:fontRef>
+        </p:style>
+        <p:txBody>
+          <a:bodyPr rtlCol="0" anchor="ctr"/>
+          <a:lstStyle/>
+          <a:p>
+            <a:pPr algn="ctr"/>
+            <a:endParaRPr lang="en-US" dirty="0">
+              <a:latin typeface="Source Sans Pro" panose="020B0503030403020204" pitchFamily="34" charset="0"/>
+              <a:ea typeface="Source Sans Pro" panose="020B0503030403020204" pitchFamily="34" charset="0"/>
+            </a:endParaRPr>
+          </a:p>
+        </p:txBody>
+      </p:sp>
+      <p:sp>
+        <p:nvSpPr>
+          <p:cNvPr id="122" name="Rounded Rectangle 121"/>
+          <p:cNvSpPr/>
+          <p:nvPr/>
+        </p:nvSpPr>
+        <p:spPr>
+          <a:xfrm>
+            <a:off x="1039540" y="2623954"/>
+            <a:ext cx="3352551" cy="1259034"/>
+          </a:xfrm>
+          <a:prstGeom prst="roundRect">
+            <a:avLst>
+              <a:gd name="adj" fmla="val 9197"/>
+            </a:avLst>
+          </a:prstGeom>
+          <a:solidFill>
+            <a:schemeClr val="bg1"/>
+          </a:solidFill>
+          <a:ln w="12700">
+            <a:solidFill>
+              <a:schemeClr val="bg2"/>
+            </a:solidFill>
+          </a:ln>
+        </p:spPr>
+        <p:style>
+          <a:lnRef idx="2">
+            <a:schemeClr val="accent1">
+              <a:shade val="50000"/>
+            </a:schemeClr>
+          </a:lnRef>
+          <a:fillRef idx="1">
+            <a:schemeClr val="accent1"/>
+          </a:fillRef>
+          <a:effectRef idx="0">
+            <a:schemeClr val="accent1"/>
+          </a:effectRef>
+          <a:fontRef idx="minor">
+            <a:schemeClr val="lt1"/>
+          </a:fontRef>
+        </p:style>
+        <p:txBody>
+          <a:bodyPr rtlCol="0" anchor="ctr"/>
+          <a:lstStyle/>
+          <a:p>
+            <a:pPr algn="ctr"/>
+            <a:r>
+              <a:rPr lang="en-US"/>
+              <a:t>vz</a:t>
+            </a:r>
+            <a:endParaRPr lang="en-US" dirty="0"/>
+          </a:p>
+        </p:txBody>
+      </p:sp>
+      <p:sp>
+        <p:nvSpPr>
+          <p:cNvPr id="32" name="Rounded Rectangle 31"/>
+          <p:cNvSpPr/>
+          <p:nvPr/>
+        </p:nvSpPr>
+        <p:spPr>
+          <a:xfrm>
+            <a:off x="4563401" y="2623955"/>
+            <a:ext cx="2250756" cy="1278252"/>
+          </a:xfrm>
+          <a:prstGeom prst="roundRect">
+            <a:avLst>
+              <a:gd name="adj" fmla="val 10476"/>
+            </a:avLst>
+          </a:prstGeom>
+          <a:solidFill>
+            <a:schemeClr val="bg1"/>
+          </a:solidFill>
+          <a:ln w="12700">
+            <a:solidFill>
+              <a:schemeClr val="bg2"/>
+            </a:solidFill>
+          </a:ln>
+        </p:spPr>
+        <p:style>
+          <a:lnRef idx="2">
+            <a:schemeClr val="accent1">
+              <a:shade val="50000"/>
+            </a:schemeClr>
+          </a:lnRef>
+          <a:fillRef idx="1">
+            <a:schemeClr val="accent1"/>
+          </a:fillRef>
+          <a:effectRef idx="0">
+            <a:schemeClr val="accent1"/>
+          </a:effectRef>
+          <a:fontRef idx="minor">
+            <a:schemeClr val="lt1"/>
+          </a:fontRef>
+        </p:style>
+        <p:txBody>
+          <a:bodyPr rtlCol="0" anchor="ctr"/>
+          <a:lstStyle/>
+          <a:p>
+            <a:r>
+              <a:rPr lang="en-US" sz="1400" b="1" dirty="0">
+                <a:solidFill>
+                  <a:schemeClr val="tx1"/>
+                </a:solidFill>
+                <a:latin typeface="Source Sans Pro" charset="0"/>
+              </a:rPr>
+              <a:t>   Architecture</a:t>
+            </a:r>
+            <a:endParaRPr lang="en-US" dirty="0"/>
+          </a:p>
+        </p:txBody>
+      </p:sp>
+      <p:sp>
+        <p:nvSpPr>
+          <p:cNvPr id="78" name="TextBox 77"/>
+          <p:cNvSpPr txBox="1"/>
+          <p:nvPr/>
+        </p:nvSpPr>
+        <p:spPr>
+          <a:xfrm>
+            <a:off x="7974840" y="2465270"/>
+            <a:ext cx="1931600" cy="677108"/>
+          </a:xfrm>
+          <a:prstGeom prst="rect">
+            <a:avLst/>
+          </a:prstGeom>
+          <a:noFill/>
+        </p:spPr>
+        <p:txBody>
+          <a:bodyPr wrap="square" rtlCol="0">
+            <a:spAutoFit/>
+          </a:bodyPr>
+          <a:lstStyle/>
+          <a:p>
+            <a:r>
+              <a:rPr lang="en-US" sz="1400" b="1" dirty="0">
+                <a:latin typeface="Source Sans Pro" charset="0"/>
+                <a:ea typeface="Source Sans Pro" charset="0"/>
+                <a:cs typeface="Source Sans Pro" charset="0"/>
+              </a:rPr>
+              <a:t>Central Repository</a:t>
+            </a:r>
+          </a:p>
+          <a:p>
+            <a:r>
+              <a:rPr lang="en-US" sz="1000" i="1" dirty="0">
+                <a:latin typeface="Source Sans Pro" panose="020B0503030403020204" pitchFamily="34" charset="0"/>
+              </a:rPr>
+              <a:t>Module with </a:t>
+            </a:r>
+            <a:r>
+              <a:rPr lang="en-US" sz="1000" i="1" dirty="0">
+                <a:solidFill>
+                  <a:schemeClr val="accent1"/>
+                </a:solidFill>
+                <a:latin typeface="Source Sans Pro" panose="020B0503030403020204" pitchFamily="34" charset="0"/>
+              </a:rPr>
+              <a:t>SDK EULA </a:t>
+            </a:r>
+            <a:r>
+              <a:rPr lang="en-US" sz="1000" i="1" dirty="0">
+                <a:latin typeface="Source Sans Pro" panose="020B0503030403020204" pitchFamily="34" charset="0"/>
+              </a:rPr>
+              <a:t>License</a:t>
+            </a:r>
+          </a:p>
+          <a:p>
+            <a:endParaRPr lang="en-US" sz="1400" b="1" dirty="0">
+              <a:latin typeface="Source Sans Pro" charset="0"/>
+              <a:ea typeface="Source Sans Pro" charset="0"/>
+              <a:cs typeface="Source Sans Pro" charset="0"/>
+            </a:endParaRPr>
+          </a:p>
+        </p:txBody>
+      </p:sp>
+      <p:sp>
+        <p:nvSpPr>
+          <p:cNvPr id="120" name="TextBox 119"/>
+          <p:cNvSpPr txBox="1"/>
+          <p:nvPr/>
+        </p:nvSpPr>
+        <p:spPr>
+          <a:xfrm>
+            <a:off x="1229691" y="2790859"/>
+            <a:ext cx="1989658" cy="307777"/>
+          </a:xfrm>
+          <a:prstGeom prst="rect">
+            <a:avLst/>
+          </a:prstGeom>
+          <a:noFill/>
+        </p:spPr>
+        <p:txBody>
+          <a:bodyPr wrap="square" rtlCol="0">
+            <a:spAutoFit/>
+          </a:bodyPr>
+          <a:lstStyle/>
+          <a:p>
+            <a:r>
+              <a:rPr lang="en-US" sz="1400" b="1" dirty="0">
+                <a:latin typeface="Source Sans Pro" charset="0"/>
+                <a:ea typeface="Source Sans Pro" charset="0"/>
+                <a:cs typeface="Source Sans Pro" charset="0"/>
+              </a:rPr>
+              <a:t>SDK Version </a:t>
+            </a:r>
+            <a:r>
+              <a:rPr lang="en-US" sz="1400" b="1" dirty="0">
+                <a:latin typeface="Consolas" panose="020B0609020204030204" pitchFamily="49" charset="0"/>
+                <a:ea typeface="Source Sans Pro" charset="0"/>
+                <a:cs typeface="Source Sans Pro" charset="0"/>
+              </a:rPr>
+              <a:t>5.m.p</a:t>
+            </a:r>
+          </a:p>
+        </p:txBody>
+      </p:sp>
+      <p:sp>
+        <p:nvSpPr>
+          <p:cNvPr id="123" name="Rounded Rectangle 122"/>
+          <p:cNvSpPr/>
+          <p:nvPr/>
+        </p:nvSpPr>
+        <p:spPr>
+          <a:xfrm>
+            <a:off x="1229691" y="3215489"/>
+            <a:ext cx="2982729" cy="488331"/>
+          </a:xfrm>
+          <a:prstGeom prst="roundRect">
+            <a:avLst>
+              <a:gd name="adj" fmla="val 0"/>
+            </a:avLst>
+          </a:prstGeom>
+          <a:noFill/>
+          <a:ln w="12700">
+            <a:solidFill>
+              <a:schemeClr val="bg2"/>
+            </a:solidFill>
+          </a:ln>
+        </p:spPr>
+        <p:style>
+          <a:lnRef idx="2">
+            <a:schemeClr val="accent1">
+              <a:shade val="50000"/>
+            </a:schemeClr>
+          </a:lnRef>
+          <a:fillRef idx="1">
+            <a:schemeClr val="accent1"/>
+          </a:fillRef>
+          <a:effectRef idx="0">
+            <a:schemeClr val="accent1"/>
+          </a:effectRef>
+          <a:fontRef idx="minor">
+            <a:schemeClr val="lt1"/>
+          </a:fontRef>
+        </p:style>
+        <p:txBody>
+          <a:bodyPr rtlCol="0" anchor="ctr"/>
+          <a:lstStyle/>
+          <a:p>
+            <a:pPr algn="ctr"/>
+            <a:endParaRPr lang="en-US" dirty="0"/>
+          </a:p>
+        </p:txBody>
+      </p:sp>
+      <p:sp>
+        <p:nvSpPr>
+          <p:cNvPr id="118" name="Rounded Rectangle 117"/>
+          <p:cNvSpPr/>
+          <p:nvPr/>
+        </p:nvSpPr>
+        <p:spPr>
+          <a:xfrm>
+            <a:off x="900052" y="2448603"/>
+            <a:ext cx="6029249" cy="1565698"/>
+          </a:xfrm>
+          <a:prstGeom prst="roundRect">
+            <a:avLst>
+              <a:gd name="adj" fmla="val 6443"/>
+            </a:avLst>
+          </a:prstGeom>
+          <a:noFill/>
+          <a:ln w="12700">
+            <a:solidFill>
+              <a:schemeClr val="accent1"/>
+            </a:solidFill>
+            <a:prstDash val="solid"/>
+          </a:ln>
+        </p:spPr>
+        <p:style>
+          <a:lnRef idx="2">
+            <a:schemeClr val="accent1">
+              <a:shade val="50000"/>
+            </a:schemeClr>
+          </a:lnRef>
+          <a:fillRef idx="1">
+            <a:schemeClr val="accent1"/>
+          </a:fillRef>
+          <a:effectRef idx="0">
+            <a:schemeClr val="accent1"/>
+          </a:effectRef>
+          <a:fontRef idx="minor">
+            <a:schemeClr val="lt1"/>
+          </a:fontRef>
+        </p:style>
+        <p:txBody>
+          <a:bodyPr rtlCol="0" anchor="ctr"/>
+          <a:lstStyle/>
+          <a:p>
+            <a:pPr algn="ctr"/>
+            <a:endParaRPr lang="en-US" dirty="0"/>
+          </a:p>
+        </p:txBody>
+      </p:sp>
+      <p:pic>
+        <p:nvPicPr>
+          <p:cNvPr id="102" name="Picture 101">
+            <a:extLst>
+              <a:ext uri="{FF2B5EF4-FFF2-40B4-BE49-F238E27FC236}">
+                <a16:creationId xmlns="" xmlns:a16="http://schemas.microsoft.com/office/drawing/2014/main" id="{6E47523C-39E3-414E-8E44-2AF044AA7D00}"/>
+              </a:ext>
+            </a:extLst>
+          </p:cNvPr>
+          <p:cNvPicPr>
+            <a:picLocks noChangeAspect="1"/>
+          </p:cNvPicPr>
+          <p:nvPr/>
+        </p:nvPicPr>
+        <p:blipFill>
+          <a:blip r:embed="rId2" cstate="print">
+            <a:extLst>
+              <a:ext uri="{28A0092B-C50C-407E-A947-70E740481C1C}">
+                <a14:useLocalDpi xmlns:a14="http://schemas.microsoft.com/office/drawing/2010/main" val="0"/>
+              </a:ext>
+            </a:extLst>
+          </a:blip>
+          <a:stretch>
+            <a:fillRect/>
+          </a:stretch>
+        </p:blipFill>
+        <p:spPr>
+          <a:xfrm>
+            <a:off x="6072921" y="3033522"/>
+            <a:ext cx="455462" cy="459117"/>
+          </a:xfrm>
+          <a:prstGeom prst="rect">
+            <a:avLst/>
+          </a:prstGeom>
+        </p:spPr>
+      </p:pic>
+      <p:pic>
+        <p:nvPicPr>
+          <p:cNvPr id="43" name="Picture 42">
+            <a:extLst>
+              <a:ext uri="{FF2B5EF4-FFF2-40B4-BE49-F238E27FC236}">
+                <a16:creationId xmlns="" xmlns:a16="http://schemas.microsoft.com/office/drawing/2014/main" id="{12F00518-C1C0-8D40-A208-E7A5D1093A00}"/>
+              </a:ext>
+            </a:extLst>
+          </p:cNvPr>
+          <p:cNvPicPr>
+            <a:picLocks noChangeAspect="1"/>
+          </p:cNvPicPr>
+          <p:nvPr/>
+        </p:nvPicPr>
+        <p:blipFill>
+          <a:blip r:embed="rId3" cstate="print">
+            <a:extLst>
+              <a:ext uri="{28A0092B-C50C-407E-A947-70E740481C1C}">
+                <a14:useLocalDpi xmlns:a14="http://schemas.microsoft.com/office/drawing/2010/main" val="0"/>
+              </a:ext>
+            </a:extLst>
+          </a:blip>
+          <a:stretch>
+            <a:fillRect/>
+          </a:stretch>
+        </p:blipFill>
+        <p:spPr>
+          <a:xfrm>
+            <a:off x="10207214" y="2402527"/>
+            <a:ext cx="551138" cy="563813"/>
+          </a:xfrm>
+          <a:prstGeom prst="rect">
+            <a:avLst/>
+          </a:prstGeom>
+        </p:spPr>
+      </p:pic>
+      <p:sp>
+        <p:nvSpPr>
+          <p:cNvPr id="84" name="TextBox 83"/>
+          <p:cNvSpPr txBox="1"/>
+          <p:nvPr/>
+        </p:nvSpPr>
+        <p:spPr>
+          <a:xfrm>
+            <a:off x="7974840" y="3198562"/>
+            <a:ext cx="1909130" cy="307777"/>
+          </a:xfrm>
+          <a:prstGeom prst="rect">
+            <a:avLst/>
+          </a:prstGeom>
+          <a:noFill/>
+        </p:spPr>
+        <p:txBody>
+          <a:bodyPr wrap="square" rtlCol="0">
+            <a:spAutoFit/>
+          </a:bodyPr>
+          <a:lstStyle/>
+          <a:p>
+            <a:r>
+              <a:rPr lang="en-US" sz="1400" b="1" dirty="0">
+                <a:latin typeface="Source Sans Pro" charset="0"/>
+                <a:ea typeface="Source Sans Pro" charset="0"/>
+                <a:cs typeface="Source Sans Pro" charset="0"/>
+              </a:rPr>
+              <a:t>Developer Repository</a:t>
+            </a:r>
+          </a:p>
+        </p:txBody>
+      </p:sp>
+      <p:pic>
+        <p:nvPicPr>
+          <p:cNvPr id="44" name="Picture 43">
+            <a:extLst>
+              <a:ext uri="{FF2B5EF4-FFF2-40B4-BE49-F238E27FC236}">
+                <a16:creationId xmlns="" xmlns:a16="http://schemas.microsoft.com/office/drawing/2014/main" id="{C4F5EE46-2BC5-DF40-93A6-0894A861A09D}"/>
+              </a:ext>
+            </a:extLst>
+          </p:cNvPr>
+          <p:cNvPicPr>
+            <a:picLocks noChangeAspect="1"/>
+          </p:cNvPicPr>
+          <p:nvPr/>
+        </p:nvPicPr>
+        <p:blipFill>
+          <a:blip r:embed="rId4" cstate="print">
+            <a:extLst>
+              <a:ext uri="{28A0092B-C50C-407E-A947-70E740481C1C}">
+                <a14:useLocalDpi xmlns:a14="http://schemas.microsoft.com/office/drawing/2010/main" val="0"/>
+              </a:ext>
+            </a:extLst>
+          </a:blip>
+          <a:stretch>
+            <a:fillRect/>
+          </a:stretch>
+        </p:blipFill>
+        <p:spPr>
+          <a:xfrm>
+            <a:off x="10207214" y="3034859"/>
+            <a:ext cx="580342" cy="593691"/>
+          </a:xfrm>
+          <a:prstGeom prst="rect">
+            <a:avLst/>
+          </a:prstGeom>
+        </p:spPr>
+      </p:pic>
+      <p:sp>
+        <p:nvSpPr>
+          <p:cNvPr id="46" name="TextBox 45">
+            <a:extLst>
+              <a:ext uri="{FF2B5EF4-FFF2-40B4-BE49-F238E27FC236}">
+                <a16:creationId xmlns="" xmlns:a16="http://schemas.microsoft.com/office/drawing/2014/main" id="{46D7B7A7-B133-1345-B9B7-0C004F631433}"/>
+              </a:ext>
+            </a:extLst>
+          </p:cNvPr>
+          <p:cNvSpPr txBox="1"/>
+          <p:nvPr/>
+        </p:nvSpPr>
+        <p:spPr>
+          <a:xfrm>
+            <a:off x="1229691" y="4103973"/>
+            <a:ext cx="2260852" cy="307777"/>
+          </a:xfrm>
+          <a:prstGeom prst="rect">
+            <a:avLst/>
+          </a:prstGeom>
+          <a:noFill/>
+        </p:spPr>
+        <p:txBody>
+          <a:bodyPr wrap="square" rtlCol="0">
+            <a:spAutoFit/>
+          </a:bodyPr>
+          <a:lstStyle>
+            <a:defPPr>
+              <a:defRPr lang="en-US"/>
+            </a:defPPr>
+            <a:lvl1pPr algn="ctr">
+              <a:defRPr sz="1400">
+                <a:latin typeface="Source Sans Pro" charset="0"/>
+                <a:ea typeface="Source Sans Pro" charset="0"/>
+                <a:cs typeface="Source Sans Pro" charset="0"/>
+              </a:defRPr>
+            </a:lvl1pPr>
+          </a:lstStyle>
+          <a:p>
+            <a:pPr algn="l"/>
+            <a:r>
+              <a:rPr lang="en-US" b="1" dirty="0"/>
+              <a:t>SDK Distribution </a:t>
+            </a:r>
+            <a:r>
+              <a:rPr lang="en-US" b="1" dirty="0">
+                <a:latin typeface="Consolas" panose="020B0609020204030204" pitchFamily="49" charset="0"/>
+              </a:rPr>
+              <a:t>YY.MM</a:t>
+            </a:r>
+          </a:p>
+        </p:txBody>
+      </p:sp>
+      <p:pic>
+        <p:nvPicPr>
+          <p:cNvPr id="48" name="Picture 47">
+            <a:extLst>
+              <a:ext uri="{FF2B5EF4-FFF2-40B4-BE49-F238E27FC236}">
+                <a16:creationId xmlns="" xmlns:a16="http://schemas.microsoft.com/office/drawing/2014/main" id="{5E811C60-78CC-5B43-9764-9713335B9337}"/>
+              </a:ext>
+            </a:extLst>
+          </p:cNvPr>
+          <p:cNvPicPr>
+            <a:picLocks noChangeAspect="1"/>
+          </p:cNvPicPr>
+          <p:nvPr/>
+        </p:nvPicPr>
+        <p:blipFill>
+          <a:blip r:embed="rId5" cstate="print">
+            <a:extLst>
+              <a:ext uri="{28A0092B-C50C-407E-A947-70E740481C1C}">
+                <a14:useLocalDpi xmlns:a14="http://schemas.microsoft.com/office/drawing/2010/main" val="0"/>
+              </a:ext>
+            </a:extLst>
+          </a:blip>
+          <a:stretch>
+            <a:fillRect/>
+          </a:stretch>
+        </p:blipFill>
+        <p:spPr>
+          <a:xfrm>
+            <a:off x="3479595" y="4103973"/>
+            <a:ext cx="775336" cy="333888"/>
+          </a:xfrm>
+          <a:prstGeom prst="rect">
+            <a:avLst/>
+          </a:prstGeom>
+        </p:spPr>
+      </p:pic>
+      <p:sp>
+        <p:nvSpPr>
+          <p:cNvPr id="85" name="Rectangle 84">
+            <a:extLst>
+              <a:ext uri="{FF2B5EF4-FFF2-40B4-BE49-F238E27FC236}">
+                <a16:creationId xmlns="" xmlns:a16="http://schemas.microsoft.com/office/drawing/2014/main" id="{B2FE977E-CFE6-5841-8CE3-8D2664BD1B99}"/>
+              </a:ext>
+            </a:extLst>
+          </p:cNvPr>
+          <p:cNvSpPr/>
+          <p:nvPr/>
+        </p:nvSpPr>
+        <p:spPr>
+          <a:xfrm>
+            <a:off x="4692269" y="2092323"/>
+            <a:ext cx="2084742" cy="523220"/>
+          </a:xfrm>
+          <a:prstGeom prst="rect">
+            <a:avLst/>
+          </a:prstGeom>
+          <a:solidFill>
+            <a:schemeClr val="bg1"/>
+          </a:solidFill>
+        </p:spPr>
+        <p:txBody>
+          <a:bodyPr wrap="square">
+            <a:spAutoFit/>
+          </a:bodyPr>
+          <a:lstStyle/>
+          <a:p>
+            <a:pPr algn="ctr"/>
+            <a:r>
+              <a:rPr lang="en-US" sz="1400" b="1" dirty="0">
+                <a:solidFill>
+                  <a:schemeClr val="accent1"/>
+                </a:solidFill>
+                <a:latin typeface="Source Sans Pro" panose="020B0503030403020204" pitchFamily="34" charset="0"/>
+              </a:rPr>
+              <a:t>MICROEJ SDK EULA </a:t>
+            </a:r>
+            <a:br>
+              <a:rPr lang="en-US" sz="1400" b="1" dirty="0">
+                <a:solidFill>
+                  <a:schemeClr val="accent1"/>
+                </a:solidFill>
+                <a:latin typeface="Source Sans Pro" panose="020B0503030403020204" pitchFamily="34" charset="0"/>
+              </a:rPr>
+            </a:br>
+            <a:r>
+              <a:rPr lang="en-US" sz="1400" b="1" dirty="0">
+                <a:solidFill>
+                  <a:schemeClr val="accent1"/>
+                </a:solidFill>
+                <a:latin typeface="Source Sans Pro" panose="020B0503030403020204" pitchFamily="34" charset="0"/>
+              </a:rPr>
+              <a:t>(</a:t>
+            </a:r>
+            <a:r>
+              <a:rPr lang="en-US" sz="1100" b="1" dirty="0">
+                <a:solidFill>
+                  <a:schemeClr val="accent1"/>
+                </a:solidFill>
+                <a:latin typeface="Source Sans Pro" panose="020B0503030403020204" pitchFamily="34" charset="0"/>
+              </a:rPr>
+              <a:t>End User License Agreement)</a:t>
+            </a:r>
+          </a:p>
+        </p:txBody>
+      </p:sp>
+      <p:sp>
+        <p:nvSpPr>
+          <p:cNvPr id="86" name="Rounded Rectangle 85">
+            <a:extLst>
+              <a:ext uri="{FF2B5EF4-FFF2-40B4-BE49-F238E27FC236}">
+                <a16:creationId xmlns="" xmlns:a16="http://schemas.microsoft.com/office/drawing/2014/main" id="{500A1F69-90C8-614E-A109-B2AB4C011D21}"/>
+              </a:ext>
+            </a:extLst>
+          </p:cNvPr>
+          <p:cNvSpPr/>
+          <p:nvPr/>
+        </p:nvSpPr>
+        <p:spPr>
+          <a:xfrm>
+            <a:off x="1323177" y="1836118"/>
+            <a:ext cx="2723484" cy="498545"/>
+          </a:xfrm>
+          <a:prstGeom prst="roundRect">
+            <a:avLst>
+              <a:gd name="adj" fmla="val 50000"/>
+            </a:avLst>
+          </a:prstGeom>
+          <a:solidFill>
+            <a:schemeClr val="bg1"/>
+          </a:solidFill>
+          <a:ln w="12700">
+            <a:noFill/>
+          </a:ln>
+          <a:effectLst>
+            <a:outerShdw blurRad="101600" algn="ctr" rotWithShape="0">
+              <a:prstClr val="black">
+                <a:alpha val="20000"/>
+              </a:prstClr>
+            </a:outerShdw>
+          </a:effectLst>
+        </p:spPr>
+        <p:style>
+          <a:lnRef idx="2">
+            <a:schemeClr val="accent1">
+              <a:shade val="50000"/>
+            </a:schemeClr>
+          </a:lnRef>
+          <a:fillRef idx="1">
+            <a:schemeClr val="accent1"/>
+          </a:fillRef>
+          <a:effectRef idx="0">
+            <a:schemeClr val="accent1"/>
+          </a:effectRef>
+          <a:fontRef idx="minor">
+            <a:schemeClr val="lt1"/>
+          </a:fontRef>
+        </p:style>
+        <p:txBody>
+          <a:bodyPr rtlCol="0" anchor="ctr"/>
+          <a:lstStyle/>
+          <a:p>
+            <a:pPr algn="ctr"/>
+            <a:endParaRPr lang="en-US" dirty="0">
+              <a:latin typeface="Source Sans Pro" panose="020B0503030403020204" pitchFamily="34" charset="0"/>
+              <a:ea typeface="Source Sans Pro" panose="020B0503030403020204" pitchFamily="34" charset="0"/>
+            </a:endParaRPr>
+          </a:p>
+        </p:txBody>
+      </p:sp>
+      <p:pic>
+        <p:nvPicPr>
+          <p:cNvPr id="87" name="Picture 86">
+            <a:extLst>
+              <a:ext uri="{FF2B5EF4-FFF2-40B4-BE49-F238E27FC236}">
+                <a16:creationId xmlns="" xmlns:a16="http://schemas.microsoft.com/office/drawing/2014/main" id="{50E82368-37D9-DF47-81F6-6FDDE0883723}"/>
+              </a:ext>
+            </a:extLst>
+          </p:cNvPr>
+          <p:cNvPicPr>
+            <a:picLocks noChangeAspect="1"/>
+          </p:cNvPicPr>
+          <p:nvPr/>
+        </p:nvPicPr>
+        <p:blipFill>
+          <a:blip r:embed="rId6">
+            <a:extLst>
+              <a:ext uri="{28A0092B-C50C-407E-A947-70E740481C1C}">
+                <a14:useLocalDpi xmlns:a14="http://schemas.microsoft.com/office/drawing/2010/main" val="0"/>
+              </a:ext>
+            </a:extLst>
+          </a:blip>
+          <a:stretch>
+            <a:fillRect/>
+          </a:stretch>
+        </p:blipFill>
+        <p:spPr>
+          <a:xfrm>
+            <a:off x="1631504" y="1916832"/>
+            <a:ext cx="2344649" cy="356387"/>
+          </a:xfrm>
+          <a:prstGeom prst="rect">
+            <a:avLst/>
+          </a:prstGeom>
+        </p:spPr>
+      </p:pic>
+      <p:pic>
+        <p:nvPicPr>
+          <p:cNvPr id="88" name="Picture 87">
+            <a:extLst>
+              <a:ext uri="{FF2B5EF4-FFF2-40B4-BE49-F238E27FC236}">
+                <a16:creationId xmlns="" xmlns:a16="http://schemas.microsoft.com/office/drawing/2014/main" id="{5F434DB9-6B3D-CA47-B322-F3CC3A398948}"/>
+              </a:ext>
+            </a:extLst>
+          </p:cNvPr>
+          <p:cNvPicPr>
+            <a:picLocks noChangeAspect="1"/>
+          </p:cNvPicPr>
+          <p:nvPr/>
+        </p:nvPicPr>
+        <p:blipFill>
+          <a:blip r:embed="rId7" cstate="print">
+            <a:extLst>
+              <a:ext uri="{28A0092B-C50C-407E-A947-70E740481C1C}">
+                <a14:useLocalDpi xmlns:a14="http://schemas.microsoft.com/office/drawing/2010/main" val="0"/>
+              </a:ext>
+            </a:extLst>
+          </a:blip>
+          <a:stretch>
+            <a:fillRect/>
+          </a:stretch>
+        </p:blipFill>
+        <p:spPr>
+          <a:xfrm>
+            <a:off x="3611896" y="2688260"/>
+            <a:ext cx="622380" cy="557030"/>
+          </a:xfrm>
+          <a:prstGeom prst="rect">
+            <a:avLst/>
+          </a:prstGeom>
+        </p:spPr>
+      </p:pic>
+      <p:sp>
+        <p:nvSpPr>
+          <p:cNvPr id="90" name="Rounded Rectangle 89">
+            <a:extLst>
+              <a:ext uri="{FF2B5EF4-FFF2-40B4-BE49-F238E27FC236}">
+                <a16:creationId xmlns="" xmlns:a16="http://schemas.microsoft.com/office/drawing/2014/main" id="{ABAC10A3-2F9D-8845-95D6-EA98A639CD92}"/>
+              </a:ext>
+            </a:extLst>
+          </p:cNvPr>
+          <p:cNvSpPr/>
+          <p:nvPr/>
+        </p:nvSpPr>
+        <p:spPr>
+          <a:xfrm>
+            <a:off x="8515315" y="1836118"/>
+            <a:ext cx="1860908" cy="498545"/>
+          </a:xfrm>
+          <a:prstGeom prst="roundRect">
+            <a:avLst>
+              <a:gd name="adj" fmla="val 50000"/>
+            </a:avLst>
+          </a:prstGeom>
+          <a:solidFill>
+            <a:schemeClr val="bg1"/>
+          </a:solidFill>
+          <a:ln w="12700">
+            <a:noFill/>
+          </a:ln>
+          <a:effectLst>
+            <a:outerShdw blurRad="101600" algn="ctr" rotWithShape="0">
+              <a:prstClr val="black">
+                <a:alpha val="20000"/>
+              </a:prstClr>
+            </a:outerShdw>
+          </a:effectLst>
+        </p:spPr>
+        <p:style>
+          <a:lnRef idx="2">
+            <a:schemeClr val="accent1">
+              <a:shade val="50000"/>
+            </a:schemeClr>
+          </a:lnRef>
+          <a:fillRef idx="1">
+            <a:schemeClr val="accent1"/>
+          </a:fillRef>
+          <a:effectRef idx="0">
+            <a:schemeClr val="accent1"/>
+          </a:effectRef>
+          <a:fontRef idx="minor">
+            <a:schemeClr val="lt1"/>
+          </a:fontRef>
+        </p:style>
+        <p:txBody>
+          <a:bodyPr rtlCol="0" anchor="ctr"/>
+          <a:lstStyle/>
+          <a:p>
+            <a:pPr algn="ctr"/>
+            <a:endParaRPr lang="en-US" dirty="0">
+              <a:latin typeface="Source Sans Pro" panose="020B0503030403020204" pitchFamily="34" charset="0"/>
+              <a:ea typeface="Source Sans Pro" panose="020B0503030403020204" pitchFamily="34" charset="0"/>
+            </a:endParaRPr>
+          </a:p>
+        </p:txBody>
+      </p:sp>
+      <p:grpSp>
+        <p:nvGrpSpPr>
+          <p:cNvPr id="91" name="Group 90">
+            <a:extLst>
+              <a:ext uri="{FF2B5EF4-FFF2-40B4-BE49-F238E27FC236}">
+                <a16:creationId xmlns="" xmlns:a16="http://schemas.microsoft.com/office/drawing/2014/main" id="{9BABB850-6D7E-AA47-9E69-1BA74731B17C}"/>
+              </a:ext>
+            </a:extLst>
+          </p:cNvPr>
+          <p:cNvGrpSpPr/>
+          <p:nvPr/>
+        </p:nvGrpSpPr>
+        <p:grpSpPr>
+          <a:xfrm>
+            <a:off x="8584381" y="1907995"/>
+            <a:ext cx="1397207" cy="351468"/>
+            <a:chOff x="7732833" y="483174"/>
+            <a:chExt cx="1397207" cy="351468"/>
+          </a:xfrm>
+        </p:grpSpPr>
+        <p:sp>
+          <p:nvSpPr>
+            <p:cNvPr id="92" name="TextBox 91">
+              <a:extLst>
+                <a:ext uri="{FF2B5EF4-FFF2-40B4-BE49-F238E27FC236}">
+                  <a16:creationId xmlns="" xmlns:a16="http://schemas.microsoft.com/office/drawing/2014/main" id="{67C95280-1B8D-1941-BF7A-21E0CE227DE4}"/>
+                </a:ext>
+              </a:extLst>
+            </p:cNvPr>
+            <p:cNvSpPr txBox="1"/>
+            <p:nvPr/>
+          </p:nvSpPr>
+          <p:spPr>
+            <a:xfrm>
+              <a:off x="8114017" y="526865"/>
+              <a:ext cx="1016023" cy="307777"/>
+            </a:xfrm>
+            <a:prstGeom prst="rect">
+              <a:avLst/>
+            </a:prstGeom>
+            <a:noFill/>
+          </p:spPr>
+          <p:txBody>
+            <a:bodyPr wrap="square" rtlCol="0">
+              <a:spAutoFit/>
+            </a:bodyPr>
+            <a:lstStyle/>
+            <a:p>
+              <a:r>
+                <a:rPr lang="en-US" sz="1400" b="1" dirty="0">
+                  <a:latin typeface="Source Sans Pro" charset="0"/>
+                  <a:ea typeface="Source Sans Pro" charset="0"/>
+                  <a:cs typeface="Source Sans Pro" charset="0"/>
+                </a:rPr>
+                <a:t>NETWORK</a:t>
+              </a:r>
+            </a:p>
+          </p:txBody>
+        </p:sp>
+        <p:pic>
+          <p:nvPicPr>
+            <p:cNvPr id="93" name="Picture 92">
+              <a:extLst>
+                <a:ext uri="{FF2B5EF4-FFF2-40B4-BE49-F238E27FC236}">
+                  <a16:creationId xmlns="" xmlns:a16="http://schemas.microsoft.com/office/drawing/2014/main" id="{4EA4C80E-71CE-6F43-AD4A-DABA38A275A2}"/>
+                </a:ext>
+              </a:extLst>
+            </p:cNvPr>
+            <p:cNvPicPr>
+              <a:picLocks noChangeAspect="1"/>
+            </p:cNvPicPr>
+            <p:nvPr/>
+          </p:nvPicPr>
+          <p:blipFill>
+            <a:blip r:embed="rId8" cstate="print">
+              <a:grayscl/>
+              <a:extLst>
+                <a:ext uri="{28A0092B-C50C-407E-A947-70E740481C1C}">
+                  <a14:useLocalDpi xmlns:a14="http://schemas.microsoft.com/office/drawing/2010/main" val="0"/>
+                </a:ext>
+              </a:extLst>
+            </a:blip>
+            <a:stretch>
+              <a:fillRect/>
+            </a:stretch>
+          </p:blipFill>
+          <p:spPr>
+            <a:xfrm>
+              <a:off x="7732833" y="483174"/>
+              <a:ext cx="370688" cy="351467"/>
+            </a:xfrm>
+            <a:prstGeom prst="rect">
+              <a:avLst/>
+            </a:prstGeom>
+          </p:spPr>
+        </p:pic>
+      </p:grpSp>
+      <p:pic>
+        <p:nvPicPr>
+          <p:cNvPr id="96" name="Picture 95">
+            <a:extLst>
+              <a:ext uri="{FF2B5EF4-FFF2-40B4-BE49-F238E27FC236}">
+                <a16:creationId xmlns="" xmlns:a16="http://schemas.microsoft.com/office/drawing/2014/main" id="{159EF0D3-DB25-9A4F-89AC-5C47D43EFDEF}"/>
+              </a:ext>
+            </a:extLst>
+          </p:cNvPr>
+          <p:cNvPicPr>
+            <a:picLocks noChangeAspect="1"/>
+          </p:cNvPicPr>
+          <p:nvPr/>
+        </p:nvPicPr>
+        <p:blipFill>
+          <a:blip r:embed="rId9" cstate="print">
+            <a:extLst>
+              <a:ext uri="{28A0092B-C50C-407E-A947-70E740481C1C}">
+                <a14:useLocalDpi xmlns:a14="http://schemas.microsoft.com/office/drawing/2010/main" val="0"/>
+              </a:ext>
+            </a:extLst>
+          </a:blip>
+          <a:stretch>
+            <a:fillRect/>
+          </a:stretch>
+        </p:blipFill>
+        <p:spPr>
+          <a:xfrm>
+            <a:off x="3711021" y="3279418"/>
+            <a:ext cx="401766" cy="401766"/>
+          </a:xfrm>
+          <a:prstGeom prst="rect">
+            <a:avLst/>
+          </a:prstGeom>
+        </p:spPr>
+      </p:pic>
+      <p:sp>
+        <p:nvSpPr>
+          <p:cNvPr id="49" name="TextBox 48">
+            <a:extLst>
+              <a:ext uri="{FF2B5EF4-FFF2-40B4-BE49-F238E27FC236}">
+                <a16:creationId xmlns="" xmlns:a16="http://schemas.microsoft.com/office/drawing/2014/main" id="{51A558D5-DF53-A24D-9D28-08195F9DCDFF}"/>
+              </a:ext>
+            </a:extLst>
+          </p:cNvPr>
+          <p:cNvSpPr txBox="1"/>
+          <p:nvPr/>
+        </p:nvSpPr>
+        <p:spPr>
+          <a:xfrm>
+            <a:off x="1323176" y="3317676"/>
+            <a:ext cx="1983044" cy="307777"/>
+          </a:xfrm>
+          <a:prstGeom prst="rect">
+            <a:avLst/>
+          </a:prstGeom>
+          <a:noFill/>
+        </p:spPr>
+        <p:txBody>
+          <a:bodyPr wrap="square" rtlCol="0">
+            <a:spAutoFit/>
+          </a:bodyPr>
+          <a:lstStyle/>
+          <a:p>
+            <a:r>
+              <a:rPr lang="en-US" sz="1400" b="1" dirty="0">
+                <a:latin typeface="Source Sans Pro" charset="0"/>
+              </a:rPr>
+              <a:t>Module Manager</a:t>
+            </a:r>
+          </a:p>
+        </p:txBody>
+      </p:sp>
+      <p:sp>
+        <p:nvSpPr>
+          <p:cNvPr id="57" name="TextBox 56">
+            <a:extLst>
+              <a:ext uri="{FF2B5EF4-FFF2-40B4-BE49-F238E27FC236}">
+                <a16:creationId xmlns="" xmlns:a16="http://schemas.microsoft.com/office/drawing/2014/main" id="{5E7F91F9-9726-764E-B1C6-BA00CBB7BED9}"/>
+              </a:ext>
+            </a:extLst>
+          </p:cNvPr>
+          <p:cNvSpPr txBox="1"/>
+          <p:nvPr/>
+        </p:nvSpPr>
+        <p:spPr>
+          <a:xfrm>
+            <a:off x="7974840" y="3839935"/>
+            <a:ext cx="1783362" cy="307777"/>
+          </a:xfrm>
+          <a:prstGeom prst="rect">
+            <a:avLst/>
+          </a:prstGeom>
+          <a:noFill/>
+        </p:spPr>
+        <p:txBody>
+          <a:bodyPr wrap="square" rtlCol="0">
+            <a:spAutoFit/>
+          </a:bodyPr>
+          <a:lstStyle/>
+          <a:p>
+            <a:r>
+              <a:rPr lang="en-US" sz="1400" b="1" dirty="0">
+                <a:latin typeface="Source Sans Pro" charset="0"/>
+                <a:ea typeface="Source Sans Pro" charset="0"/>
+                <a:cs typeface="Source Sans Pro" charset="0"/>
+              </a:rPr>
+              <a:t>GitHub Repository</a:t>
+            </a:r>
+          </a:p>
+        </p:txBody>
+      </p:sp>
+      <p:pic>
+        <p:nvPicPr>
+          <p:cNvPr id="58" name="Picture 57">
+            <a:extLst>
+              <a:ext uri="{FF2B5EF4-FFF2-40B4-BE49-F238E27FC236}">
+                <a16:creationId xmlns="" xmlns:a16="http://schemas.microsoft.com/office/drawing/2014/main" id="{F347593E-66C3-BD45-84FB-8FFEA19E6EEA}"/>
+              </a:ext>
+            </a:extLst>
+          </p:cNvPr>
+          <p:cNvPicPr>
+            <a:picLocks noChangeAspect="1"/>
+          </p:cNvPicPr>
+          <p:nvPr/>
+        </p:nvPicPr>
+        <p:blipFill>
+          <a:blip r:embed="rId10" cstate="print">
+            <a:extLst>
+              <a:ext uri="{28A0092B-C50C-407E-A947-70E740481C1C}">
+                <a14:useLocalDpi xmlns:a14="http://schemas.microsoft.com/office/drawing/2010/main" val="0"/>
+              </a:ext>
+            </a:extLst>
+          </a:blip>
+          <a:stretch>
+            <a:fillRect/>
+          </a:stretch>
+        </p:blipFill>
+        <p:spPr>
+          <a:xfrm>
+            <a:off x="10258539" y="3742262"/>
+            <a:ext cx="480575" cy="480575"/>
+          </a:xfrm>
+          <a:prstGeom prst="rect">
+            <a:avLst/>
+          </a:prstGeom>
+        </p:spPr>
+      </p:pic>
+    </p:spTree>
+    <p:extLst>
+      <p:ext uri="{BB962C8B-B14F-4D97-AF65-F5344CB8AC3E}">
+        <p14:creationId xmlns:p14="http://schemas.microsoft.com/office/powerpoint/2010/main" val="2605192561"/>
+      </p:ext>
+    </p:extLst>
+  </p:cSld>
+  <p:clrMapOvr>
+    <a:masterClrMapping/>
+  </p:clrMapOvr>
 </p:sld>
 </file>
 

</xml_diff>

<commit_message>
update with "various licenses including SDK EULA"
</commit_message>
<xml_diff>
--- a/SDKUserGuide/images/sdk_eula_content.pptx
+++ b/SDKUserGuide/images/sdk_eula_content.pptx
@@ -4289,7 +4289,7 @@
           <p:cNvPr id="65" name="Rounded Rectangle 64">
             <a:extLst>
               <a:ext uri="{FF2B5EF4-FFF2-40B4-BE49-F238E27FC236}">
-                <a16:creationId xmlns="" xmlns:a16="http://schemas.microsoft.com/office/drawing/2014/main" id="{68B161DF-0B04-DA43-8872-F08463775AF3}"/>
+                <a16:creationId xmlns:a16="http://schemas.microsoft.com/office/drawing/2014/main" xmlns="" id="{68B161DF-0B04-DA43-8872-F08463775AF3}"/>
               </a:ext>
             </a:extLst>
           </p:cNvPr>
@@ -4353,7 +4353,7 @@
           <p:cNvPr id="2" name="Group 1">
             <a:extLst>
               <a:ext uri="{FF2B5EF4-FFF2-40B4-BE49-F238E27FC236}">
-                <a16:creationId xmlns="" xmlns:a16="http://schemas.microsoft.com/office/drawing/2014/main" id="{6E5AB0B8-F4F9-BA4C-9369-31091AF1F911}"/>
+                <a16:creationId xmlns:a16="http://schemas.microsoft.com/office/drawing/2014/main" xmlns="" id="{6E5AB0B8-F4F9-BA4C-9369-31091AF1F911}"/>
               </a:ext>
             </a:extLst>
           </p:cNvPr>
@@ -4373,7 +4373,7 @@
             <p:cNvPr id="50" name="Rounded Rectangle 49">
               <a:extLst>
                 <a:ext uri="{FF2B5EF4-FFF2-40B4-BE49-F238E27FC236}">
-                  <a16:creationId xmlns="" xmlns:a16="http://schemas.microsoft.com/office/drawing/2014/main" id="{133BFD67-88E8-9540-86B6-8FFA8E76734A}"/>
+                  <a16:creationId xmlns:a16="http://schemas.microsoft.com/office/drawing/2014/main" xmlns="" id="{133BFD67-88E8-9540-86B6-8FFA8E76734A}"/>
                 </a:ext>
               </a:extLst>
             </p:cNvPr>
@@ -4432,7 +4432,7 @@
             <p:cNvPr id="54" name="Rounded Rectangle 53">
               <a:extLst>
                 <a:ext uri="{FF2B5EF4-FFF2-40B4-BE49-F238E27FC236}">
-                  <a16:creationId xmlns="" xmlns:a16="http://schemas.microsoft.com/office/drawing/2014/main" id="{0FF18F5A-C793-934C-8AEF-05C54219B54D}"/>
+                  <a16:creationId xmlns:a16="http://schemas.microsoft.com/office/drawing/2014/main" xmlns="" id="{0FF18F5A-C793-934C-8AEF-05C54219B54D}"/>
                 </a:ext>
               </a:extLst>
             </p:cNvPr>
@@ -4491,7 +4491,7 @@
             <p:cNvPr id="53" name="Rounded Rectangle 52">
               <a:extLst>
                 <a:ext uri="{FF2B5EF4-FFF2-40B4-BE49-F238E27FC236}">
-                  <a16:creationId xmlns="" xmlns:a16="http://schemas.microsoft.com/office/drawing/2014/main" id="{3FCE6755-151F-1A4C-B97A-DC3A68CDAFCB}"/>
+                  <a16:creationId xmlns:a16="http://schemas.microsoft.com/office/drawing/2014/main" xmlns="" id="{3FCE6755-151F-1A4C-B97A-DC3A68CDAFCB}"/>
                 </a:ext>
               </a:extLst>
             </p:cNvPr>
@@ -4551,7 +4551,7 @@
           <p:cNvPr id="51" name="Rounded Rectangle 50">
             <a:extLst>
               <a:ext uri="{FF2B5EF4-FFF2-40B4-BE49-F238E27FC236}">
-                <a16:creationId xmlns="" xmlns:a16="http://schemas.microsoft.com/office/drawing/2014/main" id="{F6B18FC4-0EC2-D842-9F91-793486EBD6C6}"/>
+                <a16:creationId xmlns:a16="http://schemas.microsoft.com/office/drawing/2014/main" xmlns="" id="{F6B18FC4-0EC2-D842-9F91-793486EBD6C6}"/>
               </a:ext>
             </a:extLst>
           </p:cNvPr>
@@ -4729,7 +4729,7 @@
         <p:spPr>
           <a:xfrm>
             <a:off x="7331855" y="2465270"/>
-            <a:ext cx="1931600" cy="677108"/>
+            <a:ext cx="2232374" cy="461665"/>
           </a:xfrm>
           <a:prstGeom prst="rect">
             <a:avLst/>
@@ -4753,34 +4753,17 @@
           </a:p>
           <a:p>
             <a:r>
+              <a:rPr lang="en-US" sz="1000" i="1" dirty="0" smtClean="0"/>
+              <a:t>Various Licenses including </a:t>
+            </a:r>
+            <a:r>
               <a:rPr lang="en-US" sz="1000" i="1" dirty="0" smtClean="0">
-                <a:latin typeface="Source Sans Pro" panose="020B0503030403020204" pitchFamily="34" charset="0"/>
-              </a:rPr>
-              <a:t>Modules </a:t>
-            </a:r>
-            <a:r>
-              <a:rPr lang="en-US" sz="1000" i="1" dirty="0">
-                <a:latin typeface="Source Sans Pro" panose="020B0503030403020204" pitchFamily="34" charset="0"/>
-              </a:rPr>
-              <a:t>with </a:t>
-            </a:r>
-            <a:r>
-              <a:rPr lang="en-US" sz="1000" i="1" dirty="0">
                 <a:solidFill>
                   <a:schemeClr val="accent1"/>
                 </a:solidFill>
-                <a:latin typeface="Source Sans Pro" panose="020B0503030403020204" pitchFamily="34" charset="0"/>
               </a:rPr>
-              <a:t>SDK EULA </a:t>
-            </a:r>
-            <a:r>
-              <a:rPr lang="en-US" sz="1000" i="1" dirty="0">
-                <a:latin typeface="Source Sans Pro" panose="020B0503030403020204" pitchFamily="34" charset="0"/>
-              </a:rPr>
-              <a:t>License</a:t>
-            </a:r>
-          </a:p>
-          <a:p>
+              <a:t>SDK EULA</a:t>
+            </a:r>
             <a:endParaRPr lang="en-US" sz="1400" b="1" dirty="0">
               <a:latin typeface="Source Sans Pro" charset="0"/>
               <a:ea typeface="Source Sans Pro" charset="0"/>
@@ -4932,7 +4915,7 @@
           <p:cNvPr id="102" name="Picture 101">
             <a:extLst>
               <a:ext uri="{FF2B5EF4-FFF2-40B4-BE49-F238E27FC236}">
-                <a16:creationId xmlns="" xmlns:a16="http://schemas.microsoft.com/office/drawing/2014/main" id="{6E47523C-39E3-414E-8E44-2AF044AA7D00}"/>
+                <a16:creationId xmlns:a16="http://schemas.microsoft.com/office/drawing/2014/main" xmlns="" id="{6E47523C-39E3-414E-8E44-2AF044AA7D00}"/>
               </a:ext>
             </a:extLst>
           </p:cNvPr>
@@ -4968,7 +4951,7 @@
           <p:cNvPr id="43" name="Picture 42">
             <a:extLst>
               <a:ext uri="{FF2B5EF4-FFF2-40B4-BE49-F238E27FC236}">
-                <a16:creationId xmlns="" xmlns:a16="http://schemas.microsoft.com/office/drawing/2014/main" id="{12F00518-C1C0-8D40-A208-E7A5D1093A00}"/>
+                <a16:creationId xmlns:a16="http://schemas.microsoft.com/office/drawing/2014/main" xmlns="" id="{12F00518-C1C0-8D40-A208-E7A5D1093A00}"/>
               </a:ext>
             </a:extLst>
           </p:cNvPr>
@@ -5037,7 +5020,7 @@
           <p:cNvPr id="44" name="Picture 43">
             <a:extLst>
               <a:ext uri="{FF2B5EF4-FFF2-40B4-BE49-F238E27FC236}">
-                <a16:creationId xmlns="" xmlns:a16="http://schemas.microsoft.com/office/drawing/2014/main" id="{C4F5EE46-2BC5-DF40-93A6-0894A861A09D}"/>
+                <a16:creationId xmlns:a16="http://schemas.microsoft.com/office/drawing/2014/main" xmlns="" id="{C4F5EE46-2BC5-DF40-93A6-0894A861A09D}"/>
               </a:ext>
             </a:extLst>
           </p:cNvPr>
@@ -5073,7 +5056,7 @@
           <p:cNvPr id="46" name="TextBox 45">
             <a:extLst>
               <a:ext uri="{FF2B5EF4-FFF2-40B4-BE49-F238E27FC236}">
-                <a16:creationId xmlns="" xmlns:a16="http://schemas.microsoft.com/office/drawing/2014/main" id="{46D7B7A7-B133-1345-B9B7-0C004F631433}"/>
+                <a16:creationId xmlns:a16="http://schemas.microsoft.com/office/drawing/2014/main" xmlns="" id="{46D7B7A7-B133-1345-B9B7-0C004F631433}"/>
               </a:ext>
             </a:extLst>
           </p:cNvPr>
@@ -5121,48 +5104,12 @@
           </a:p>
         </p:txBody>
       </p:sp>
-      <p:pic>
-        <p:nvPicPr>
-          <p:cNvPr id="48" name="Picture 47">
-            <a:extLst>
-              <a:ext uri="{FF2B5EF4-FFF2-40B4-BE49-F238E27FC236}">
-                <a16:creationId xmlns="" xmlns:a16="http://schemas.microsoft.com/office/drawing/2014/main" id="{5E811C60-78CC-5B43-9764-9713335B9337}"/>
-              </a:ext>
-            </a:extLst>
-          </p:cNvPr>
-          <p:cNvPicPr>
-            <a:picLocks noChangeAspect="1"/>
-          </p:cNvPicPr>
-          <p:nvPr/>
-        </p:nvPicPr>
-        <p:blipFill>
-          <a:blip r:embed="rId5" cstate="print">
-            <a:extLst>
-              <a:ext uri="{28A0092B-C50C-407E-A947-70E740481C1C}">
-                <a14:useLocalDpi xmlns:a14="http://schemas.microsoft.com/office/drawing/2010/main" val="0"/>
-              </a:ext>
-            </a:extLst>
-          </a:blip>
-          <a:stretch>
-            <a:fillRect/>
-          </a:stretch>
-        </p:blipFill>
-        <p:spPr>
-          <a:xfrm>
-            <a:off x="3479595" y="2427768"/>
-            <a:ext cx="775336" cy="333888"/>
-          </a:xfrm>
-          <a:prstGeom prst="rect">
-            <a:avLst/>
-          </a:prstGeom>
-        </p:spPr>
-      </p:pic>
       <p:sp>
         <p:nvSpPr>
           <p:cNvPr id="85" name="Rectangle 84">
             <a:extLst>
               <a:ext uri="{FF2B5EF4-FFF2-40B4-BE49-F238E27FC236}">
-                <a16:creationId xmlns="" xmlns:a16="http://schemas.microsoft.com/office/drawing/2014/main" id="{B2FE977E-CFE6-5841-8CE3-8D2664BD1B99}"/>
+                <a16:creationId xmlns:a16="http://schemas.microsoft.com/office/drawing/2014/main" xmlns="" id="{B2FE977E-CFE6-5841-8CE3-8D2664BD1B99}"/>
               </a:ext>
             </a:extLst>
           </p:cNvPr>
@@ -5231,7 +5178,7 @@
           <p:cNvPr id="86" name="Rounded Rectangle 85">
             <a:extLst>
               <a:ext uri="{FF2B5EF4-FFF2-40B4-BE49-F238E27FC236}">
-                <a16:creationId xmlns="" xmlns:a16="http://schemas.microsoft.com/office/drawing/2014/main" id="{500A1F69-90C8-614E-A109-B2AB4C011D21}"/>
+                <a16:creationId xmlns:a16="http://schemas.microsoft.com/office/drawing/2014/main" xmlns="" id="{500A1F69-90C8-614E-A109-B2AB4C011D21}"/>
               </a:ext>
             </a:extLst>
           </p:cNvPr>
@@ -5295,7 +5242,7 @@
           <p:cNvPr id="87" name="Picture 86">
             <a:extLst>
               <a:ext uri="{FF2B5EF4-FFF2-40B4-BE49-F238E27FC236}">
-                <a16:creationId xmlns="" xmlns:a16="http://schemas.microsoft.com/office/drawing/2014/main" id="{50E82368-37D9-DF47-81F6-6FDDE0883723}"/>
+                <a16:creationId xmlns:a16="http://schemas.microsoft.com/office/drawing/2014/main" xmlns="" id="{50E82368-37D9-DF47-81F6-6FDDE0883723}"/>
               </a:ext>
             </a:extLst>
           </p:cNvPr>
@@ -5305,7 +5252,7 @@
           <p:nvPr/>
         </p:nvPicPr>
         <p:blipFill>
-          <a:blip r:embed="rId6">
+          <a:blip r:embed="rId5">
             <a:extLst>
               <a:ext uri="{28A0092B-C50C-407E-A947-70E740481C1C}">
                 <a14:useLocalDpi xmlns:a14="http://schemas.microsoft.com/office/drawing/2010/main" val="0"/>
@@ -5331,7 +5278,43 @@
           <p:cNvPr id="88" name="Picture 87">
             <a:extLst>
               <a:ext uri="{FF2B5EF4-FFF2-40B4-BE49-F238E27FC236}">
-                <a16:creationId xmlns="" xmlns:a16="http://schemas.microsoft.com/office/drawing/2014/main" id="{5F434DB9-6B3D-CA47-B322-F3CC3A398948}"/>
+                <a16:creationId xmlns:a16="http://schemas.microsoft.com/office/drawing/2014/main" xmlns="" id="{5F434DB9-6B3D-CA47-B322-F3CC3A398948}"/>
+              </a:ext>
+            </a:extLst>
+          </p:cNvPr>
+          <p:cNvPicPr>
+            <a:picLocks noChangeAspect="1"/>
+          </p:cNvPicPr>
+          <p:nvPr/>
+        </p:nvPicPr>
+        <p:blipFill>
+          <a:blip r:embed="rId6" cstate="print">
+            <a:extLst>
+              <a:ext uri="{28A0092B-C50C-407E-A947-70E740481C1C}">
+                <a14:useLocalDpi xmlns:a14="http://schemas.microsoft.com/office/drawing/2010/main" val="0"/>
+              </a:ext>
+            </a:extLst>
+          </a:blip>
+          <a:stretch>
+            <a:fillRect/>
+          </a:stretch>
+        </p:blipFill>
+        <p:spPr>
+          <a:xfrm>
+            <a:off x="3611896" y="3068307"/>
+            <a:ext cx="622380" cy="557030"/>
+          </a:xfrm>
+          <a:prstGeom prst="rect">
+            <a:avLst/>
+          </a:prstGeom>
+        </p:spPr>
+      </p:pic>
+      <p:pic>
+        <p:nvPicPr>
+          <p:cNvPr id="96" name="Picture 95">
+            <a:extLst>
+              <a:ext uri="{FF2B5EF4-FFF2-40B4-BE49-F238E27FC236}">
+                <a16:creationId xmlns:a16="http://schemas.microsoft.com/office/drawing/2014/main" xmlns="" id="{159EF0D3-DB25-9A4F-89AC-5C47D43EFDEF}"/>
               </a:ext>
             </a:extLst>
           </p:cNvPr>
@@ -5354,20 +5337,96 @@
         </p:blipFill>
         <p:spPr>
           <a:xfrm>
-            <a:off x="3611896" y="3068307"/>
-            <a:ext cx="622380" cy="557030"/>
+            <a:off x="3711021" y="3659465"/>
+            <a:ext cx="401766" cy="401766"/>
           </a:xfrm>
           <a:prstGeom prst="rect">
             <a:avLst/>
           </a:prstGeom>
         </p:spPr>
       </p:pic>
+      <p:sp>
+        <p:nvSpPr>
+          <p:cNvPr id="49" name="TextBox 48">
+            <a:extLst>
+              <a:ext uri="{FF2B5EF4-FFF2-40B4-BE49-F238E27FC236}">
+                <a16:creationId xmlns:a16="http://schemas.microsoft.com/office/drawing/2014/main" xmlns="" id="{51A558D5-DF53-A24D-9D28-08195F9DCDFF}"/>
+              </a:ext>
+            </a:extLst>
+          </p:cNvPr>
+          <p:cNvSpPr txBox="1"/>
+          <p:nvPr/>
+        </p:nvSpPr>
+        <p:spPr>
+          <a:xfrm>
+            <a:off x="1323176" y="3697723"/>
+            <a:ext cx="1983044" cy="307777"/>
+          </a:xfrm>
+          <a:prstGeom prst="rect">
+            <a:avLst/>
+          </a:prstGeom>
+          <a:noFill/>
+        </p:spPr>
+        <p:txBody>
+          <a:bodyPr wrap="square" rtlCol="0">
+            <a:spAutoFit/>
+          </a:bodyPr>
+          <a:lstStyle/>
+          <a:p>
+            <a:r>
+              <a:rPr lang="en-US" sz="1400" b="1" dirty="0">
+                <a:latin typeface="Source Sans Pro" charset="0"/>
+              </a:rPr>
+              <a:t>Module Manager</a:t>
+            </a:r>
+          </a:p>
+        </p:txBody>
+      </p:sp>
+      <p:sp>
+        <p:nvSpPr>
+          <p:cNvPr id="57" name="TextBox 56">
+            <a:extLst>
+              <a:ext uri="{FF2B5EF4-FFF2-40B4-BE49-F238E27FC236}">
+                <a16:creationId xmlns:a16="http://schemas.microsoft.com/office/drawing/2014/main" xmlns="" id="{5E7F91F9-9726-764E-B1C6-BA00CBB7BED9}"/>
+              </a:ext>
+            </a:extLst>
+          </p:cNvPr>
+          <p:cNvSpPr txBox="1"/>
+          <p:nvPr/>
+        </p:nvSpPr>
+        <p:spPr>
+          <a:xfrm>
+            <a:off x="7331855" y="3839935"/>
+            <a:ext cx="1783362" cy="307777"/>
+          </a:xfrm>
+          <a:prstGeom prst="rect">
+            <a:avLst/>
+          </a:prstGeom>
+          <a:noFill/>
+        </p:spPr>
+        <p:txBody>
+          <a:bodyPr wrap="square" rtlCol="0">
+            <a:spAutoFit/>
+          </a:bodyPr>
+          <a:lstStyle/>
+          <a:p>
+            <a:r>
+              <a:rPr lang="en-US" sz="1400" b="1" dirty="0">
+                <a:latin typeface="Source Sans Pro" charset="0"/>
+                <a:ea typeface="Source Sans Pro" charset="0"/>
+                <a:cs typeface="Source Sans Pro" charset="0"/>
+              </a:rPr>
+              <a:t>GitHub Repository</a:t>
+            </a:r>
+          </a:p>
+        </p:txBody>
+      </p:sp>
       <p:pic>
         <p:nvPicPr>
-          <p:cNvPr id="96" name="Picture 95">
+          <p:cNvPr id="58" name="Picture 57">
             <a:extLst>
               <a:ext uri="{FF2B5EF4-FFF2-40B4-BE49-F238E27FC236}">
-                <a16:creationId xmlns="" xmlns:a16="http://schemas.microsoft.com/office/drawing/2014/main" id="{159EF0D3-DB25-9A4F-89AC-5C47D43EFDEF}"/>
+                <a16:creationId xmlns:a16="http://schemas.microsoft.com/office/drawing/2014/main" xmlns="" id="{F347593E-66C3-BD45-84FB-8FFEA19E6EEA}"/>
               </a:ext>
             </a:extLst>
           </p:cNvPr>
@@ -5390,118 +5449,6 @@
         </p:blipFill>
         <p:spPr>
           <a:xfrm>
-            <a:off x="3711021" y="3659465"/>
-            <a:ext cx="401766" cy="401766"/>
-          </a:xfrm>
-          <a:prstGeom prst="rect">
-            <a:avLst/>
-          </a:prstGeom>
-        </p:spPr>
-      </p:pic>
-      <p:sp>
-        <p:nvSpPr>
-          <p:cNvPr id="49" name="TextBox 48">
-            <a:extLst>
-              <a:ext uri="{FF2B5EF4-FFF2-40B4-BE49-F238E27FC236}">
-                <a16:creationId xmlns="" xmlns:a16="http://schemas.microsoft.com/office/drawing/2014/main" id="{51A558D5-DF53-A24D-9D28-08195F9DCDFF}"/>
-              </a:ext>
-            </a:extLst>
-          </p:cNvPr>
-          <p:cNvSpPr txBox="1"/>
-          <p:nvPr/>
-        </p:nvSpPr>
-        <p:spPr>
-          <a:xfrm>
-            <a:off x="1323176" y="3697723"/>
-            <a:ext cx="1983044" cy="307777"/>
-          </a:xfrm>
-          <a:prstGeom prst="rect">
-            <a:avLst/>
-          </a:prstGeom>
-          <a:noFill/>
-        </p:spPr>
-        <p:txBody>
-          <a:bodyPr wrap="square" rtlCol="0">
-            <a:spAutoFit/>
-          </a:bodyPr>
-          <a:lstStyle/>
-          <a:p>
-            <a:r>
-              <a:rPr lang="en-US" sz="1400" b="1" dirty="0">
-                <a:latin typeface="Source Sans Pro" charset="0"/>
-              </a:rPr>
-              <a:t>Module Manager</a:t>
-            </a:r>
-          </a:p>
-        </p:txBody>
-      </p:sp>
-      <p:sp>
-        <p:nvSpPr>
-          <p:cNvPr id="57" name="TextBox 56">
-            <a:extLst>
-              <a:ext uri="{FF2B5EF4-FFF2-40B4-BE49-F238E27FC236}">
-                <a16:creationId xmlns="" xmlns:a16="http://schemas.microsoft.com/office/drawing/2014/main" id="{5E7F91F9-9726-764E-B1C6-BA00CBB7BED9}"/>
-              </a:ext>
-            </a:extLst>
-          </p:cNvPr>
-          <p:cNvSpPr txBox="1"/>
-          <p:nvPr/>
-        </p:nvSpPr>
-        <p:spPr>
-          <a:xfrm>
-            <a:off x="7331855" y="3839935"/>
-            <a:ext cx="1783362" cy="307777"/>
-          </a:xfrm>
-          <a:prstGeom prst="rect">
-            <a:avLst/>
-          </a:prstGeom>
-          <a:noFill/>
-        </p:spPr>
-        <p:txBody>
-          <a:bodyPr wrap="square" rtlCol="0">
-            <a:spAutoFit/>
-          </a:bodyPr>
-          <a:lstStyle/>
-          <a:p>
-            <a:r>
-              <a:rPr lang="en-US" sz="1400" b="1" dirty="0">
-                <a:latin typeface="Source Sans Pro" charset="0"/>
-                <a:ea typeface="Source Sans Pro" charset="0"/>
-                <a:cs typeface="Source Sans Pro" charset="0"/>
-              </a:rPr>
-              <a:t>GitHub Repository</a:t>
-            </a:r>
-          </a:p>
-        </p:txBody>
-      </p:sp>
-      <p:pic>
-        <p:nvPicPr>
-          <p:cNvPr id="58" name="Picture 57">
-            <a:extLst>
-              <a:ext uri="{FF2B5EF4-FFF2-40B4-BE49-F238E27FC236}">
-                <a16:creationId xmlns="" xmlns:a16="http://schemas.microsoft.com/office/drawing/2014/main" id="{F347593E-66C3-BD45-84FB-8FFEA19E6EEA}"/>
-              </a:ext>
-            </a:extLst>
-          </p:cNvPr>
-          <p:cNvPicPr>
-            <a:picLocks noChangeAspect="1"/>
-          </p:cNvPicPr>
-          <p:nvPr/>
-        </p:nvPicPr>
-        <p:blipFill>
-          <a:blip r:embed="rId9" cstate="print">
-            <a:extLst>
-              <a:ext uri="{28A0092B-C50C-407E-A947-70E740481C1C}">
-                <a14:useLocalDpi xmlns:a14="http://schemas.microsoft.com/office/drawing/2010/main" val="0"/>
-              </a:ext>
-            </a:extLst>
-          </a:blip>
-          <a:stretch>
-            <a:fillRect/>
-          </a:stretch>
-        </p:blipFill>
-        <p:spPr>
-          <a:xfrm>
             <a:off x="9615554" y="3742262"/>
             <a:ext cx="480575" cy="480575"/>
           </a:xfrm>
@@ -5515,7 +5462,7 @@
           <p:cNvPr id="33" name="Rounded Rectangle 32">
             <a:extLst>
               <a:ext uri="{FF2B5EF4-FFF2-40B4-BE49-F238E27FC236}">
-                <a16:creationId xmlns="" xmlns:a16="http://schemas.microsoft.com/office/drawing/2014/main" id="{ABAC10A3-2F9D-8845-95D6-EA98A639CD92}"/>
+                <a16:creationId xmlns:a16="http://schemas.microsoft.com/office/drawing/2014/main" xmlns="" id="{ABAC10A3-2F9D-8845-95D6-EA98A639CD92}"/>
               </a:ext>
             </a:extLst>
           </p:cNvPr>
@@ -5579,7 +5526,7 @@
           <p:cNvPr id="34" name="TextBox 33">
             <a:extLst>
               <a:ext uri="{FF2B5EF4-FFF2-40B4-BE49-F238E27FC236}">
-                <a16:creationId xmlns="" xmlns:a16="http://schemas.microsoft.com/office/drawing/2014/main" id="{67C95280-1B8D-1941-BF7A-21E0CE227DE4}"/>
+                <a16:creationId xmlns:a16="http://schemas.microsoft.com/office/drawing/2014/main" xmlns="" id="{67C95280-1B8D-1941-BF7A-21E0CE227DE4}"/>
               </a:ext>
             </a:extLst>
           </p:cNvPr>
@@ -5623,7 +5570,7 @@
           <p:cNvPr id="35" name="Picture 34">
             <a:extLst>
               <a:ext uri="{FF2B5EF4-FFF2-40B4-BE49-F238E27FC236}">
-                <a16:creationId xmlns="" xmlns:a16="http://schemas.microsoft.com/office/drawing/2014/main" id="{4EA4C80E-71CE-6F43-AD4A-DABA38A275A2}"/>
+                <a16:creationId xmlns:a16="http://schemas.microsoft.com/office/drawing/2014/main" xmlns="" id="{4EA4C80E-71CE-6F43-AD4A-DABA38A275A2}"/>
               </a:ext>
             </a:extLst>
           </p:cNvPr>
@@ -5633,7 +5580,7 @@
           <p:nvPr/>
         </p:nvPicPr>
         <p:blipFill>
-          <a:blip r:embed="rId10" cstate="print">
+          <a:blip r:embed="rId9" cstate="print">
             <a:grayscl/>
             <a:extLst>
               <a:ext uri="{28A0092B-C50C-407E-A947-70E740481C1C}">
@@ -5653,6 +5600,47 @@
           <a:prstGeom prst="rect">
             <a:avLst/>
           </a:prstGeom>
+        </p:spPr>
+      </p:pic>
+      <p:pic>
+        <p:nvPicPr>
+          <p:cNvPr id="36" name="Picture 2" descr="Eclipse Logos and Artwork | The Eclipse Foundation"/>
+          <p:cNvPicPr>
+            <a:picLocks noChangeAspect="1" noChangeArrowheads="1"/>
+          </p:cNvPicPr>
+          <p:nvPr/>
+        </p:nvPicPr>
+        <p:blipFill>
+          <a:blip r:embed="rId10" cstate="print">
+            <a:extLst>
+              <a:ext uri="{28A0092B-C50C-407E-A947-70E740481C1C}">
+                <a14:useLocalDpi xmlns:a14="http://schemas.microsoft.com/office/drawing/2010/main" val="0"/>
+              </a:ext>
+            </a:extLst>
+          </a:blip>
+          <a:srcRect/>
+          <a:stretch>
+            <a:fillRect/>
+          </a:stretch>
+        </p:blipFill>
+        <p:spPr bwMode="auto">
+          <a:xfrm>
+            <a:off x="3400078" y="2408995"/>
+            <a:ext cx="935796" cy="309866"/>
+          </a:xfrm>
+          <a:prstGeom prst="rect">
+            <a:avLst/>
+          </a:prstGeom>
+          <a:noFill/>
+          <a:extLst>
+            <a:ext uri="{909E8E84-426E-40DD-AFC4-6F175D3DCCD1}">
+              <a14:hiddenFill xmlns:a14="http://schemas.microsoft.com/office/drawing/2010/main">
+                <a:solidFill>
+                  <a:srgbClr val="FFFFFF"/>
+                </a:solidFill>
+              </a14:hiddenFill>
+            </a:ext>
+          </a:extLst>
         </p:spPr>
       </p:pic>
     </p:spTree>
@@ -6513,7 +6501,7 @@
           <p:cNvPr id="30" name="Picture 29">
             <a:extLst>
               <a:ext uri="{FF2B5EF4-FFF2-40B4-BE49-F238E27FC236}">
-                <a16:creationId xmlns="" xmlns:a16="http://schemas.microsoft.com/office/drawing/2014/main" id="{72176D6D-182A-4BB5-8EA3-0ACC3EEFD101}"/>
+                <a16:creationId xmlns:a16="http://schemas.microsoft.com/office/drawing/2014/main" xmlns="" id="{72176D6D-182A-4BB5-8EA3-0ACC3EEFD101}"/>
               </a:ext>
             </a:extLst>
           </p:cNvPr>
@@ -6632,7 +6620,7 @@
           <p:cNvPr id="102" name="Picture 101">
             <a:extLst>
               <a:ext uri="{FF2B5EF4-FFF2-40B4-BE49-F238E27FC236}">
-                <a16:creationId xmlns="" xmlns:a16="http://schemas.microsoft.com/office/drawing/2014/main" id="{6E47523C-39E3-414E-8E44-2AF044AA7D00}"/>
+                <a16:creationId xmlns:a16="http://schemas.microsoft.com/office/drawing/2014/main" xmlns="" id="{6E47523C-39E3-414E-8E44-2AF044AA7D00}"/>
               </a:ext>
             </a:extLst>
           </p:cNvPr>
@@ -6910,7 +6898,7 @@
           <p:cNvPr id="65" name="Rounded Rectangle 64">
             <a:extLst>
               <a:ext uri="{FF2B5EF4-FFF2-40B4-BE49-F238E27FC236}">
-                <a16:creationId xmlns="" xmlns:a16="http://schemas.microsoft.com/office/drawing/2014/main" id="{68B161DF-0B04-DA43-8872-F08463775AF3}"/>
+                <a16:creationId xmlns:a16="http://schemas.microsoft.com/office/drawing/2014/main" xmlns="" id="{68B161DF-0B04-DA43-8872-F08463775AF3}"/>
               </a:ext>
             </a:extLst>
           </p:cNvPr>
@@ -6974,7 +6962,7 @@
           <p:cNvPr id="2" name="Group 1">
             <a:extLst>
               <a:ext uri="{FF2B5EF4-FFF2-40B4-BE49-F238E27FC236}">
-                <a16:creationId xmlns="" xmlns:a16="http://schemas.microsoft.com/office/drawing/2014/main" id="{6E5AB0B8-F4F9-BA4C-9369-31091AF1F911}"/>
+                <a16:creationId xmlns:a16="http://schemas.microsoft.com/office/drawing/2014/main" xmlns="" id="{6E5AB0B8-F4F9-BA4C-9369-31091AF1F911}"/>
               </a:ext>
             </a:extLst>
           </p:cNvPr>
@@ -6994,7 +6982,7 @@
             <p:cNvPr id="50" name="Rounded Rectangle 49">
               <a:extLst>
                 <a:ext uri="{FF2B5EF4-FFF2-40B4-BE49-F238E27FC236}">
-                  <a16:creationId xmlns="" xmlns:a16="http://schemas.microsoft.com/office/drawing/2014/main" id="{133BFD67-88E8-9540-86B6-8FFA8E76734A}"/>
+                  <a16:creationId xmlns:a16="http://schemas.microsoft.com/office/drawing/2014/main" xmlns="" id="{133BFD67-88E8-9540-86B6-8FFA8E76734A}"/>
                 </a:ext>
               </a:extLst>
             </p:cNvPr>
@@ -7053,7 +7041,7 @@
             <p:cNvPr id="54" name="Rounded Rectangle 53">
               <a:extLst>
                 <a:ext uri="{FF2B5EF4-FFF2-40B4-BE49-F238E27FC236}">
-                  <a16:creationId xmlns="" xmlns:a16="http://schemas.microsoft.com/office/drawing/2014/main" id="{0FF18F5A-C793-934C-8AEF-05C54219B54D}"/>
+                  <a16:creationId xmlns:a16="http://schemas.microsoft.com/office/drawing/2014/main" xmlns="" id="{0FF18F5A-C793-934C-8AEF-05C54219B54D}"/>
                 </a:ext>
               </a:extLst>
             </p:cNvPr>
@@ -7112,7 +7100,7 @@
             <p:cNvPr id="53" name="Rounded Rectangle 52">
               <a:extLst>
                 <a:ext uri="{FF2B5EF4-FFF2-40B4-BE49-F238E27FC236}">
-                  <a16:creationId xmlns="" xmlns:a16="http://schemas.microsoft.com/office/drawing/2014/main" id="{3FCE6755-151F-1A4C-B97A-DC3A68CDAFCB}"/>
+                  <a16:creationId xmlns:a16="http://schemas.microsoft.com/office/drawing/2014/main" xmlns="" id="{3FCE6755-151F-1A4C-B97A-DC3A68CDAFCB}"/>
                 </a:ext>
               </a:extLst>
             </p:cNvPr>
@@ -7172,7 +7160,7 @@
           <p:cNvPr id="51" name="Rounded Rectangle 50">
             <a:extLst>
               <a:ext uri="{FF2B5EF4-FFF2-40B4-BE49-F238E27FC236}">
-                <a16:creationId xmlns="" xmlns:a16="http://schemas.microsoft.com/office/drawing/2014/main" id="{F6B18FC4-0EC2-D842-9F91-793486EBD6C6}"/>
+                <a16:creationId xmlns:a16="http://schemas.microsoft.com/office/drawing/2014/main" xmlns="" id="{F6B18FC4-0EC2-D842-9F91-793486EBD6C6}"/>
               </a:ext>
             </a:extLst>
           </p:cNvPr>
@@ -7547,7 +7535,7 @@
           <p:cNvPr id="102" name="Picture 101">
             <a:extLst>
               <a:ext uri="{FF2B5EF4-FFF2-40B4-BE49-F238E27FC236}">
-                <a16:creationId xmlns="" xmlns:a16="http://schemas.microsoft.com/office/drawing/2014/main" id="{6E47523C-39E3-414E-8E44-2AF044AA7D00}"/>
+                <a16:creationId xmlns:a16="http://schemas.microsoft.com/office/drawing/2014/main" xmlns="" id="{6E47523C-39E3-414E-8E44-2AF044AA7D00}"/>
               </a:ext>
             </a:extLst>
           </p:cNvPr>
@@ -7583,7 +7571,7 @@
           <p:cNvPr id="43" name="Picture 42">
             <a:extLst>
               <a:ext uri="{FF2B5EF4-FFF2-40B4-BE49-F238E27FC236}">
-                <a16:creationId xmlns="" xmlns:a16="http://schemas.microsoft.com/office/drawing/2014/main" id="{12F00518-C1C0-8D40-A208-E7A5D1093A00}"/>
+                <a16:creationId xmlns:a16="http://schemas.microsoft.com/office/drawing/2014/main" xmlns="" id="{12F00518-C1C0-8D40-A208-E7A5D1093A00}"/>
               </a:ext>
             </a:extLst>
           </p:cNvPr>
@@ -7652,7 +7640,7 @@
           <p:cNvPr id="44" name="Picture 43">
             <a:extLst>
               <a:ext uri="{FF2B5EF4-FFF2-40B4-BE49-F238E27FC236}">
-                <a16:creationId xmlns="" xmlns:a16="http://schemas.microsoft.com/office/drawing/2014/main" id="{C4F5EE46-2BC5-DF40-93A6-0894A861A09D}"/>
+                <a16:creationId xmlns:a16="http://schemas.microsoft.com/office/drawing/2014/main" xmlns="" id="{C4F5EE46-2BC5-DF40-93A6-0894A861A09D}"/>
               </a:ext>
             </a:extLst>
           </p:cNvPr>
@@ -7688,7 +7676,7 @@
           <p:cNvPr id="46" name="TextBox 45">
             <a:extLst>
               <a:ext uri="{FF2B5EF4-FFF2-40B4-BE49-F238E27FC236}">
-                <a16:creationId xmlns="" xmlns:a16="http://schemas.microsoft.com/office/drawing/2014/main" id="{46D7B7A7-B133-1345-B9B7-0C004F631433}"/>
+                <a16:creationId xmlns:a16="http://schemas.microsoft.com/office/drawing/2014/main" xmlns="" id="{46D7B7A7-B133-1345-B9B7-0C004F631433}"/>
               </a:ext>
             </a:extLst>
           </p:cNvPr>
@@ -7741,7 +7729,7 @@
           <p:cNvPr id="48" name="Picture 47">
             <a:extLst>
               <a:ext uri="{FF2B5EF4-FFF2-40B4-BE49-F238E27FC236}">
-                <a16:creationId xmlns="" xmlns:a16="http://schemas.microsoft.com/office/drawing/2014/main" id="{5E811C60-78CC-5B43-9764-9713335B9337}"/>
+                <a16:creationId xmlns:a16="http://schemas.microsoft.com/office/drawing/2014/main" xmlns="" id="{5E811C60-78CC-5B43-9764-9713335B9337}"/>
               </a:ext>
             </a:extLst>
           </p:cNvPr>
@@ -7777,7 +7765,7 @@
           <p:cNvPr id="85" name="Rectangle 84">
             <a:extLst>
               <a:ext uri="{FF2B5EF4-FFF2-40B4-BE49-F238E27FC236}">
-                <a16:creationId xmlns="" xmlns:a16="http://schemas.microsoft.com/office/drawing/2014/main" id="{B2FE977E-CFE6-5841-8CE3-8D2664BD1B99}"/>
+                <a16:creationId xmlns:a16="http://schemas.microsoft.com/office/drawing/2014/main" xmlns="" id="{B2FE977E-CFE6-5841-8CE3-8D2664BD1B99}"/>
               </a:ext>
             </a:extLst>
           </p:cNvPr>
@@ -7846,7 +7834,7 @@
           <p:cNvPr id="86" name="Rounded Rectangle 85">
             <a:extLst>
               <a:ext uri="{FF2B5EF4-FFF2-40B4-BE49-F238E27FC236}">
-                <a16:creationId xmlns="" xmlns:a16="http://schemas.microsoft.com/office/drawing/2014/main" id="{500A1F69-90C8-614E-A109-B2AB4C011D21}"/>
+                <a16:creationId xmlns:a16="http://schemas.microsoft.com/office/drawing/2014/main" xmlns="" id="{500A1F69-90C8-614E-A109-B2AB4C011D21}"/>
               </a:ext>
             </a:extLst>
           </p:cNvPr>
@@ -7910,7 +7898,7 @@
           <p:cNvPr id="87" name="Picture 86">
             <a:extLst>
               <a:ext uri="{FF2B5EF4-FFF2-40B4-BE49-F238E27FC236}">
-                <a16:creationId xmlns="" xmlns:a16="http://schemas.microsoft.com/office/drawing/2014/main" id="{50E82368-37D9-DF47-81F6-6FDDE0883723}"/>
+                <a16:creationId xmlns:a16="http://schemas.microsoft.com/office/drawing/2014/main" xmlns="" id="{50E82368-37D9-DF47-81F6-6FDDE0883723}"/>
               </a:ext>
             </a:extLst>
           </p:cNvPr>
@@ -7946,7 +7934,7 @@
           <p:cNvPr id="88" name="Picture 87">
             <a:extLst>
               <a:ext uri="{FF2B5EF4-FFF2-40B4-BE49-F238E27FC236}">
-                <a16:creationId xmlns="" xmlns:a16="http://schemas.microsoft.com/office/drawing/2014/main" id="{5F434DB9-6B3D-CA47-B322-F3CC3A398948}"/>
+                <a16:creationId xmlns:a16="http://schemas.microsoft.com/office/drawing/2014/main" xmlns="" id="{5F434DB9-6B3D-CA47-B322-F3CC3A398948}"/>
               </a:ext>
             </a:extLst>
           </p:cNvPr>
@@ -7982,7 +7970,7 @@
           <p:cNvPr id="90" name="Rounded Rectangle 89">
             <a:extLst>
               <a:ext uri="{FF2B5EF4-FFF2-40B4-BE49-F238E27FC236}">
-                <a16:creationId xmlns="" xmlns:a16="http://schemas.microsoft.com/office/drawing/2014/main" id="{ABAC10A3-2F9D-8845-95D6-EA98A639CD92}"/>
+                <a16:creationId xmlns:a16="http://schemas.microsoft.com/office/drawing/2014/main" xmlns="" id="{ABAC10A3-2F9D-8845-95D6-EA98A639CD92}"/>
               </a:ext>
             </a:extLst>
           </p:cNvPr>
@@ -8046,7 +8034,7 @@
           <p:cNvPr id="91" name="Group 90">
             <a:extLst>
               <a:ext uri="{FF2B5EF4-FFF2-40B4-BE49-F238E27FC236}">
-                <a16:creationId xmlns="" xmlns:a16="http://schemas.microsoft.com/office/drawing/2014/main" id="{9BABB850-6D7E-AA47-9E69-1BA74731B17C}"/>
+                <a16:creationId xmlns:a16="http://schemas.microsoft.com/office/drawing/2014/main" xmlns="" id="{9BABB850-6D7E-AA47-9E69-1BA74731B17C}"/>
               </a:ext>
             </a:extLst>
           </p:cNvPr>
@@ -8066,7 +8054,7 @@
             <p:cNvPr id="92" name="TextBox 91">
               <a:extLst>
                 <a:ext uri="{FF2B5EF4-FFF2-40B4-BE49-F238E27FC236}">
-                  <a16:creationId xmlns="" xmlns:a16="http://schemas.microsoft.com/office/drawing/2014/main" id="{67C95280-1B8D-1941-BF7A-21E0CE227DE4}"/>
+                  <a16:creationId xmlns:a16="http://schemas.microsoft.com/office/drawing/2014/main" xmlns="" id="{67C95280-1B8D-1941-BF7A-21E0CE227DE4}"/>
                 </a:ext>
               </a:extLst>
             </p:cNvPr>
@@ -8105,7 +8093,7 @@
             <p:cNvPr id="93" name="Picture 92">
               <a:extLst>
                 <a:ext uri="{FF2B5EF4-FFF2-40B4-BE49-F238E27FC236}">
-                  <a16:creationId xmlns="" xmlns:a16="http://schemas.microsoft.com/office/drawing/2014/main" id="{4EA4C80E-71CE-6F43-AD4A-DABA38A275A2}"/>
+                  <a16:creationId xmlns:a16="http://schemas.microsoft.com/office/drawing/2014/main" xmlns="" id="{4EA4C80E-71CE-6F43-AD4A-DABA38A275A2}"/>
                 </a:ext>
               </a:extLst>
             </p:cNvPr>
@@ -8143,7 +8131,7 @@
           <p:cNvPr id="96" name="Picture 95">
             <a:extLst>
               <a:ext uri="{FF2B5EF4-FFF2-40B4-BE49-F238E27FC236}">
-                <a16:creationId xmlns="" xmlns:a16="http://schemas.microsoft.com/office/drawing/2014/main" id="{159EF0D3-DB25-9A4F-89AC-5C47D43EFDEF}"/>
+                <a16:creationId xmlns:a16="http://schemas.microsoft.com/office/drawing/2014/main" xmlns="" id="{159EF0D3-DB25-9A4F-89AC-5C47D43EFDEF}"/>
               </a:ext>
             </a:extLst>
           </p:cNvPr>
@@ -8179,7 +8167,7 @@
           <p:cNvPr id="49" name="TextBox 48">
             <a:extLst>
               <a:ext uri="{FF2B5EF4-FFF2-40B4-BE49-F238E27FC236}">
-                <a16:creationId xmlns="" xmlns:a16="http://schemas.microsoft.com/office/drawing/2014/main" id="{51A558D5-DF53-A24D-9D28-08195F9DCDFF}"/>
+                <a16:creationId xmlns:a16="http://schemas.microsoft.com/office/drawing/2014/main" xmlns="" id="{51A558D5-DF53-A24D-9D28-08195F9DCDFF}"/>
               </a:ext>
             </a:extLst>
           </p:cNvPr>
@@ -8216,7 +8204,7 @@
           <p:cNvPr id="57" name="TextBox 56">
             <a:extLst>
               <a:ext uri="{FF2B5EF4-FFF2-40B4-BE49-F238E27FC236}">
-                <a16:creationId xmlns="" xmlns:a16="http://schemas.microsoft.com/office/drawing/2014/main" id="{5E7F91F9-9726-764E-B1C6-BA00CBB7BED9}"/>
+                <a16:creationId xmlns:a16="http://schemas.microsoft.com/office/drawing/2014/main" xmlns="" id="{5E7F91F9-9726-764E-B1C6-BA00CBB7BED9}"/>
               </a:ext>
             </a:extLst>
           </p:cNvPr>
@@ -8255,7 +8243,7 @@
           <p:cNvPr id="58" name="Picture 57">
             <a:extLst>
               <a:ext uri="{FF2B5EF4-FFF2-40B4-BE49-F238E27FC236}">
-                <a16:creationId xmlns="" xmlns:a16="http://schemas.microsoft.com/office/drawing/2014/main" id="{F347593E-66C3-BD45-84FB-8FFEA19E6EEA}"/>
+                <a16:creationId xmlns:a16="http://schemas.microsoft.com/office/drawing/2014/main" xmlns="" id="{F347593E-66C3-BD45-84FB-8FFEA19E6EEA}"/>
               </a:ext>
             </a:extLst>
           </p:cNvPr>

</xml_diff>